<commit_message>
Final additions to presentation. Also Avg dim size
</commit_message>
<xml_diff>
--- a/group_proj/presentations/projPres1.pptx
+++ b/group_proj/presentations/projPres1.pptx
@@ -2,7 +2,7 @@
 <file path=ppt/presentation.xml><?xml version="1.0" encoding="utf-8"?>
 <p:presentation xmlns:a="http://schemas.openxmlformats.org/drawingml/2006/main" xmlns:r="http://schemas.openxmlformats.org/officeDocument/2006/relationships" xmlns:p="http://schemas.openxmlformats.org/presentationml/2006/main" saveSubsetFonts="1" autoCompressPictures="0">
   <p:sldMasterIdLst>
-    <p:sldMasterId id="2147483648" r:id="rId1"/>
+    <p:sldMasterId id="2147483720" r:id="rId1"/>
   </p:sldMasterIdLst>
   <p:notesMasterIdLst>
     <p:notesMasterId r:id="rId9"/>
@@ -14,7 +14,7 @@
     <p:sldId id="262" r:id="rId5"/>
     <p:sldId id="266" r:id="rId6"/>
     <p:sldId id="264" r:id="rId7"/>
-    <p:sldId id="265" r:id="rId8"/>
+    <p:sldId id="268" r:id="rId8"/>
   </p:sldIdLst>
   <p:sldSz cx="12192000" cy="6858000"/>
   <p:notesSz cx="6858000" cy="9144000"/>
@@ -22,7 +22,7 @@
     <a:defPPr>
       <a:defRPr lang="en-US"/>
     </a:defPPr>
-    <a:lvl1pPr marL="0" algn="l" defTabSz="914400" rtl="0" eaLnBrk="1" latinLnBrk="0" hangingPunct="1">
+    <a:lvl1pPr marL="0" algn="l" defTabSz="457200" rtl="0" eaLnBrk="1" latinLnBrk="0" hangingPunct="1">
       <a:defRPr sz="1800" kern="1200">
         <a:solidFill>
           <a:schemeClr val="tx1"/>
@@ -32,7 +32,7 @@
         <a:cs typeface="+mn-cs"/>
       </a:defRPr>
     </a:lvl1pPr>
-    <a:lvl2pPr marL="457200" algn="l" defTabSz="914400" rtl="0" eaLnBrk="1" latinLnBrk="0" hangingPunct="1">
+    <a:lvl2pPr marL="457200" algn="l" defTabSz="457200" rtl="0" eaLnBrk="1" latinLnBrk="0" hangingPunct="1">
       <a:defRPr sz="1800" kern="1200">
         <a:solidFill>
           <a:schemeClr val="tx1"/>
@@ -42,7 +42,7 @@
         <a:cs typeface="+mn-cs"/>
       </a:defRPr>
     </a:lvl2pPr>
-    <a:lvl3pPr marL="914400" algn="l" defTabSz="914400" rtl="0" eaLnBrk="1" latinLnBrk="0" hangingPunct="1">
+    <a:lvl3pPr marL="914400" algn="l" defTabSz="457200" rtl="0" eaLnBrk="1" latinLnBrk="0" hangingPunct="1">
       <a:defRPr sz="1800" kern="1200">
         <a:solidFill>
           <a:schemeClr val="tx1"/>
@@ -52,7 +52,7 @@
         <a:cs typeface="+mn-cs"/>
       </a:defRPr>
     </a:lvl3pPr>
-    <a:lvl4pPr marL="1371600" algn="l" defTabSz="914400" rtl="0" eaLnBrk="1" latinLnBrk="0" hangingPunct="1">
+    <a:lvl4pPr marL="1371600" algn="l" defTabSz="457200" rtl="0" eaLnBrk="1" latinLnBrk="0" hangingPunct="1">
       <a:defRPr sz="1800" kern="1200">
         <a:solidFill>
           <a:schemeClr val="tx1"/>
@@ -62,7 +62,7 @@
         <a:cs typeface="+mn-cs"/>
       </a:defRPr>
     </a:lvl4pPr>
-    <a:lvl5pPr marL="1828800" algn="l" defTabSz="914400" rtl="0" eaLnBrk="1" latinLnBrk="0" hangingPunct="1">
+    <a:lvl5pPr marL="1828800" algn="l" defTabSz="457200" rtl="0" eaLnBrk="1" latinLnBrk="0" hangingPunct="1">
       <a:defRPr sz="1800" kern="1200">
         <a:solidFill>
           <a:schemeClr val="tx1"/>
@@ -72,7 +72,7 @@
         <a:cs typeface="+mn-cs"/>
       </a:defRPr>
     </a:lvl5pPr>
-    <a:lvl6pPr marL="2286000" algn="l" defTabSz="914400" rtl="0" eaLnBrk="1" latinLnBrk="0" hangingPunct="1">
+    <a:lvl6pPr marL="2286000" algn="l" defTabSz="457200" rtl="0" eaLnBrk="1" latinLnBrk="0" hangingPunct="1">
       <a:defRPr sz="1800" kern="1200">
         <a:solidFill>
           <a:schemeClr val="tx1"/>
@@ -82,7 +82,7 @@
         <a:cs typeface="+mn-cs"/>
       </a:defRPr>
     </a:lvl6pPr>
-    <a:lvl7pPr marL="2743200" algn="l" defTabSz="914400" rtl="0" eaLnBrk="1" latinLnBrk="0" hangingPunct="1">
+    <a:lvl7pPr marL="2743200" algn="l" defTabSz="457200" rtl="0" eaLnBrk="1" latinLnBrk="0" hangingPunct="1">
       <a:defRPr sz="1800" kern="1200">
         <a:solidFill>
           <a:schemeClr val="tx1"/>
@@ -92,7 +92,7 @@
         <a:cs typeface="+mn-cs"/>
       </a:defRPr>
     </a:lvl7pPr>
-    <a:lvl8pPr marL="3200400" algn="l" defTabSz="914400" rtl="0" eaLnBrk="1" latinLnBrk="0" hangingPunct="1">
+    <a:lvl8pPr marL="3200400" algn="l" defTabSz="457200" rtl="0" eaLnBrk="1" latinLnBrk="0" hangingPunct="1">
       <a:defRPr sz="1800" kern="1200">
         <a:solidFill>
           <a:schemeClr val="tx1"/>
@@ -102,7 +102,7 @@
         <a:cs typeface="+mn-cs"/>
       </a:defRPr>
     </a:lvl8pPr>
-    <a:lvl9pPr marL="3657600" algn="l" defTabSz="914400" rtl="0" eaLnBrk="1" latinLnBrk="0" hangingPunct="1">
+    <a:lvl9pPr marL="3657600" algn="l" defTabSz="457200" rtl="0" eaLnBrk="1" latinLnBrk="0" hangingPunct="1">
       <a:defRPr sz="1800" kern="1200">
         <a:solidFill>
           <a:schemeClr val="tx1"/>
@@ -203,7 +203,7 @@
           <a:p>
             <a:fld id="{B4F796A9-8EC0-5141-B45F-E32396FCD01A}" type="datetimeFigureOut">
               <a:rPr lang="en-US" smtClean="0"/>
-              <a:t>10/9/23</a:t>
+              <a:t>10/10/23</a:t>
             </a:fld>
             <a:endParaRPr lang="en-US"/>
           </a:p>
@@ -519,6 +519,29 @@
               <a:t>Some are partially hidden or not centered</a:t>
             </a:r>
           </a:p>
+          <a:p>
+            <a:pPr marL="0" marR="0" lvl="0" indent="0" algn="l" defTabSz="914400" rtl="0" eaLnBrk="1" fontAlgn="auto" latinLnBrk="0" hangingPunct="1">
+              <a:lnSpc>
+                <a:spcPct val="100000"/>
+              </a:lnSpc>
+              <a:spcBef>
+                <a:spcPts val="0"/>
+              </a:spcBef>
+              <a:spcAft>
+                <a:spcPts val="0"/>
+              </a:spcAft>
+              <a:buClrTx/>
+              <a:buSzTx/>
+              <a:buFontTx/>
+              <a:buNone/>
+              <a:tabLst/>
+              <a:defRPr/>
+            </a:pPr>
+            <a:r>
+              <a:rPr lang="en-US" dirty="0"/>
+              <a:t>No corrupt images</a:t>
+            </a:r>
+          </a:p>
         </p:txBody>
       </p:sp>
       <p:sp>
@@ -560,6 +583,14 @@
 <file path=ppt/slideLayouts/slideLayout1.xml><?xml version="1.0" encoding="utf-8"?>
 <p:sldLayout xmlns:a="http://schemas.openxmlformats.org/drawingml/2006/main" xmlns:r="http://schemas.openxmlformats.org/officeDocument/2006/relationships" xmlns:p="http://schemas.openxmlformats.org/presentationml/2006/main" type="title" preserve="1">
   <p:cSld name="Title Slide">
+    <p:bg>
+      <p:bgPr>
+        <a:solidFill>
+          <a:schemeClr val="accent2"/>
+        </a:solidFill>
+        <a:effectLst/>
+      </p:bgPr>
+    </p:bg>
     <p:spTree>
       <p:nvGrpSpPr>
         <p:cNvPr id="1" name=""/>
@@ -576,69 +607,82 @@
       </p:grpSpPr>
       <p:sp>
         <p:nvSpPr>
-          <p:cNvPr id="2" name="Title 1">
-            <a:extLst>
-              <a:ext uri="{FF2B5EF4-FFF2-40B4-BE49-F238E27FC236}">
-                <a16:creationId xmlns:a16="http://schemas.microsoft.com/office/drawing/2014/main" id="{78DB382C-62AC-6107-A078-F3705373303D}"/>
-              </a:ext>
-            </a:extLst>
-          </p:cNvPr>
+          <p:cNvPr id="2" name="Title 1"/>
           <p:cNvSpPr>
             <a:spLocks noGrp="1"/>
           </p:cNvSpPr>
           <p:nvPr>
             <p:ph type="ctrTitle"/>
+          </p:nvPr>
+        </p:nvSpPr>
+        <p:spPr bwMode="blackWhite">
+          <a:xfrm>
+            <a:off x="1600200" y="2386744"/>
+            <a:ext cx="8991600" cy="1645920"/>
+          </a:xfrm>
+          <a:solidFill>
+            <a:srgbClr val="FFFFFF"/>
+          </a:solidFill>
+          <a:ln w="38100">
+            <a:solidFill>
+              <a:srgbClr val="404040"/>
+            </a:solidFill>
+          </a:ln>
+        </p:spPr>
+        <p:txBody>
+          <a:bodyPr lIns="274320" rIns="274320" anchor="ctr" anchorCtr="1">
+            <a:normAutofit/>
+          </a:bodyPr>
+          <a:lstStyle>
+            <a:lvl1pPr algn="ctr">
+              <a:defRPr sz="3800">
+                <a:solidFill>
+                  <a:srgbClr val="262626"/>
+                </a:solidFill>
+              </a:defRPr>
+            </a:lvl1pPr>
+          </a:lstStyle>
+          <a:p>
+            <a:r>
+              <a:rPr lang="en-US"/>
+              <a:t>Click to edit Master title style</a:t>
+            </a:r>
+            <a:endParaRPr lang="en-US" dirty="0"/>
+          </a:p>
+        </p:txBody>
+      </p:sp>
+      <p:sp>
+        <p:nvSpPr>
+          <p:cNvPr id="3" name="Subtitle 2"/>
+          <p:cNvSpPr>
+            <a:spLocks noGrp="1"/>
+          </p:cNvSpPr>
+          <p:nvPr>
+            <p:ph type="subTitle" idx="1"/>
           </p:nvPr>
         </p:nvSpPr>
         <p:spPr>
           <a:xfrm>
-            <a:off x="1524000" y="1122363"/>
-            <a:ext cx="9144000" cy="2387600"/>
+            <a:off x="2695194" y="4352544"/>
+            <a:ext cx="6801612" cy="1239894"/>
           </a:xfrm>
+          <a:noFill/>
         </p:spPr>
         <p:txBody>
-          <a:bodyPr anchor="b"/>
-          <a:lstStyle>
-            <a:lvl1pPr algn="ctr">
-              <a:defRPr sz="6000"/>
-            </a:lvl1pPr>
-          </a:lstStyle>
-          <a:p>
-            <a:r>
-              <a:rPr lang="en-US"/>
-              <a:t>Click to edit Master title style</a:t>
-            </a:r>
-          </a:p>
-        </p:txBody>
-      </p:sp>
-      <p:sp>
-        <p:nvSpPr>
-          <p:cNvPr id="3" name="Subtitle 2">
-            <a:extLst>
-              <a:ext uri="{FF2B5EF4-FFF2-40B4-BE49-F238E27FC236}">
-                <a16:creationId xmlns:a16="http://schemas.microsoft.com/office/drawing/2014/main" id="{EBB8DE9B-7B71-EB90-CECE-6F8C819005B8}"/>
-              </a:ext>
-            </a:extLst>
-          </p:cNvPr>
-          <p:cNvSpPr>
-            <a:spLocks noGrp="1"/>
-          </p:cNvSpPr>
-          <p:nvPr>
-            <p:ph type="subTitle" idx="1"/>
-          </p:nvPr>
-        </p:nvSpPr>
-        <p:spPr>
-          <a:xfrm>
-            <a:off x="1524000" y="3602038"/>
-            <a:ext cx="9144000" cy="1655762"/>
-          </a:xfrm>
-        </p:spPr>
-        <p:txBody>
-          <a:bodyPr/>
+          <a:bodyPr>
+            <a:normAutofit/>
+          </a:bodyPr>
           <a:lstStyle>
             <a:lvl1pPr marL="0" indent="0" algn="ctr">
               <a:buNone/>
-              <a:defRPr sz="2400"/>
+              <a:defRPr sz="2000">
+                <a:solidFill>
+                  <a:schemeClr val="tx1">
+                    <a:lumMod val="75000"/>
+                    <a:lumOff val="25000"/>
+                  </a:schemeClr>
+                </a:solidFill>
+              </a:defRPr>
             </a:lvl1pPr>
             <a:lvl2pPr marL="457200" indent="0" algn="ctr">
               <a:buNone/>
@@ -678,18 +722,13 @@
               <a:rPr lang="en-US"/>
               <a:t>Click to edit Master subtitle style</a:t>
             </a:r>
-          </a:p>
-        </p:txBody>
-      </p:sp>
-      <p:sp>
-        <p:nvSpPr>
-          <p:cNvPr id="4" name="Date Placeholder 3">
-            <a:extLst>
-              <a:ext uri="{FF2B5EF4-FFF2-40B4-BE49-F238E27FC236}">
-                <a16:creationId xmlns:a16="http://schemas.microsoft.com/office/drawing/2014/main" id="{64A943AF-BB01-2F92-B39C-F9DF49148CE2}"/>
-              </a:ext>
-            </a:extLst>
-          </p:cNvPr>
+            <a:endParaRPr lang="en-US" dirty="0"/>
+          </a:p>
+        </p:txBody>
+      </p:sp>
+      <p:sp>
+        <p:nvSpPr>
+          <p:cNvPr id="7" name="Date Placeholder 6"/>
           <p:cNvSpPr>
             <a:spLocks noGrp="1"/>
           </p:cNvSpPr>
@@ -704,7 +743,7 @@
           <a:p>
             <a:fld id="{90053C86-C48F-3743-8746-2CA0384683DA}" type="datetimeFigureOut">
               <a:rPr lang="en-US" smtClean="0"/>
-              <a:t>10/9/23</a:t>
+              <a:t>10/10/23</a:t>
             </a:fld>
             <a:endParaRPr lang="en-US"/>
           </a:p>
@@ -712,13 +751,7 @@
       </p:sp>
       <p:sp>
         <p:nvSpPr>
-          <p:cNvPr id="5" name="Footer Placeholder 4">
-            <a:extLst>
-              <a:ext uri="{FF2B5EF4-FFF2-40B4-BE49-F238E27FC236}">
-                <a16:creationId xmlns:a16="http://schemas.microsoft.com/office/drawing/2014/main" id="{0920FFDA-711E-743F-3750-9DDE7A13E7A5}"/>
-              </a:ext>
-            </a:extLst>
-          </p:cNvPr>
+          <p:cNvPr id="8" name="Footer Placeholder 7"/>
           <p:cNvSpPr>
             <a:spLocks noGrp="1"/>
           </p:cNvSpPr>
@@ -737,13 +770,7 @@
       </p:sp>
       <p:sp>
         <p:nvSpPr>
-          <p:cNvPr id="6" name="Slide Number Placeholder 5">
-            <a:extLst>
-              <a:ext uri="{FF2B5EF4-FFF2-40B4-BE49-F238E27FC236}">
-                <a16:creationId xmlns:a16="http://schemas.microsoft.com/office/drawing/2014/main" id="{E586779E-2C02-2FFF-5EA0-B2CC2EF57AB3}"/>
-              </a:ext>
-            </a:extLst>
-          </p:cNvPr>
+          <p:cNvPr id="9" name="Slide Number Placeholder 8"/>
           <p:cNvSpPr>
             <a:spLocks noGrp="1"/>
           </p:cNvSpPr>
@@ -767,12 +794,12 @@
     </p:spTree>
     <p:extLst>
       <p:ext uri="{BB962C8B-B14F-4D97-AF65-F5344CB8AC3E}">
-        <p14:creationId xmlns:p14="http://schemas.microsoft.com/office/powerpoint/2010/main" val="310153785"/>
+        <p14:creationId xmlns:p14="http://schemas.microsoft.com/office/powerpoint/2010/main" val="2154673714"/>
       </p:ext>
     </p:extLst>
   </p:cSld>
   <p:clrMapOvr>
-    <a:masterClrMapping/>
+    <a:overrideClrMapping bg1="dk1" tx1="lt1" bg2="dk2" tx2="lt2" accent1="accent1" accent2="accent2" accent3="accent3" accent4="accent4" accent5="accent5" accent6="accent6" hlink="hlink" folHlink="folHlink"/>
   </p:clrMapOvr>
 </p:sldLayout>
 </file>
@@ -796,13 +823,7 @@
       </p:grpSpPr>
       <p:sp>
         <p:nvSpPr>
-          <p:cNvPr id="2" name="Title 1">
-            <a:extLst>
-              <a:ext uri="{FF2B5EF4-FFF2-40B4-BE49-F238E27FC236}">
-                <a16:creationId xmlns:a16="http://schemas.microsoft.com/office/drawing/2014/main" id="{C23B19E8-DB75-8AD9-AF0F-F8363810AB7C}"/>
-              </a:ext>
-            </a:extLst>
-          </p:cNvPr>
+          <p:cNvPr id="2" name="Title 1"/>
           <p:cNvSpPr>
             <a:spLocks noGrp="1"/>
           </p:cNvSpPr>
@@ -819,18 +840,13 @@
               <a:rPr lang="en-US"/>
               <a:t>Click to edit Master title style</a:t>
             </a:r>
-          </a:p>
-        </p:txBody>
-      </p:sp>
-      <p:sp>
-        <p:nvSpPr>
-          <p:cNvPr id="3" name="Vertical Text Placeholder 2">
-            <a:extLst>
-              <a:ext uri="{FF2B5EF4-FFF2-40B4-BE49-F238E27FC236}">
-                <a16:creationId xmlns:a16="http://schemas.microsoft.com/office/drawing/2014/main" id="{3F8F96B5-A391-42A8-8036-2013549D509C}"/>
-              </a:ext>
-            </a:extLst>
-          </p:cNvPr>
+            <a:endParaRPr lang="en-US" dirty="0"/>
+          </a:p>
+        </p:txBody>
+      </p:sp>
+      <p:sp>
+        <p:nvSpPr>
+          <p:cNvPr id="3" name="Vertical Text Placeholder 2"/>
           <p:cNvSpPr>
             <a:spLocks noGrp="1"/>
           </p:cNvSpPr>
@@ -876,18 +892,13 @@
               <a:rPr lang="en-US"/>
               <a:t>Fifth level</a:t>
             </a:r>
-          </a:p>
-        </p:txBody>
-      </p:sp>
-      <p:sp>
-        <p:nvSpPr>
-          <p:cNvPr id="4" name="Date Placeholder 3">
-            <a:extLst>
-              <a:ext uri="{FF2B5EF4-FFF2-40B4-BE49-F238E27FC236}">
-                <a16:creationId xmlns:a16="http://schemas.microsoft.com/office/drawing/2014/main" id="{60EA7D71-59BA-C271-1739-681BD73E822D}"/>
-              </a:ext>
-            </a:extLst>
-          </p:cNvPr>
+            <a:endParaRPr lang="en-US" dirty="0"/>
+          </a:p>
+        </p:txBody>
+      </p:sp>
+      <p:sp>
+        <p:nvSpPr>
+          <p:cNvPr id="4" name="Date Placeholder 3"/>
           <p:cNvSpPr>
             <a:spLocks noGrp="1"/>
           </p:cNvSpPr>
@@ -902,7 +913,7 @@
           <a:p>
             <a:fld id="{90053C86-C48F-3743-8746-2CA0384683DA}" type="datetimeFigureOut">
               <a:rPr lang="en-US" smtClean="0"/>
-              <a:t>10/9/23</a:t>
+              <a:t>10/10/23</a:t>
             </a:fld>
             <a:endParaRPr lang="en-US"/>
           </a:p>
@@ -910,13 +921,7 @@
       </p:sp>
       <p:sp>
         <p:nvSpPr>
-          <p:cNvPr id="5" name="Footer Placeholder 4">
-            <a:extLst>
-              <a:ext uri="{FF2B5EF4-FFF2-40B4-BE49-F238E27FC236}">
-                <a16:creationId xmlns:a16="http://schemas.microsoft.com/office/drawing/2014/main" id="{DC29CB41-8BB5-AFF3-0ACD-B7E4D1990A8F}"/>
-              </a:ext>
-            </a:extLst>
-          </p:cNvPr>
+          <p:cNvPr id="5" name="Footer Placeholder 4"/>
           <p:cNvSpPr>
             <a:spLocks noGrp="1"/>
           </p:cNvSpPr>
@@ -935,13 +940,7 @@
       </p:sp>
       <p:sp>
         <p:nvSpPr>
-          <p:cNvPr id="6" name="Slide Number Placeholder 5">
-            <a:extLst>
-              <a:ext uri="{FF2B5EF4-FFF2-40B4-BE49-F238E27FC236}">
-                <a16:creationId xmlns:a16="http://schemas.microsoft.com/office/drawing/2014/main" id="{8BF49E4A-4861-5125-5CF6-B139FABBC006}"/>
-              </a:ext>
-            </a:extLst>
-          </p:cNvPr>
+          <p:cNvPr id="6" name="Slide Number Placeholder 5"/>
           <p:cNvSpPr>
             <a:spLocks noGrp="1"/>
           </p:cNvSpPr>
@@ -965,7 +964,7 @@
     </p:spTree>
     <p:extLst>
       <p:ext uri="{BB962C8B-B14F-4D97-AF65-F5344CB8AC3E}">
-        <p14:creationId xmlns:p14="http://schemas.microsoft.com/office/powerpoint/2010/main" val="3254357447"/>
+        <p14:creationId xmlns:p14="http://schemas.microsoft.com/office/powerpoint/2010/main" val="1215540340"/>
       </p:ext>
     </p:extLst>
   </p:cSld>
@@ -994,13 +993,7 @@
       </p:grpSpPr>
       <p:sp>
         <p:nvSpPr>
-          <p:cNvPr id="2" name="Vertical Title 1">
-            <a:extLst>
-              <a:ext uri="{FF2B5EF4-FFF2-40B4-BE49-F238E27FC236}">
-                <a16:creationId xmlns:a16="http://schemas.microsoft.com/office/drawing/2014/main" id="{C6454D6D-F3D5-8D9B-33D5-DEBC0BB7026F}"/>
-              </a:ext>
-            </a:extLst>
-          </p:cNvPr>
+          <p:cNvPr id="2" name="Vertical Title 1"/>
           <p:cNvSpPr>
             <a:spLocks noGrp="1"/>
           </p:cNvSpPr>
@@ -1010,8 +1003,8 @@
         </p:nvSpPr>
         <p:spPr>
           <a:xfrm>
-            <a:off x="8724900" y="365125"/>
-            <a:ext cx="2628900" cy="5811838"/>
+            <a:off x="8653112" y="937260"/>
+            <a:ext cx="1298608" cy="4983480"/>
           </a:xfrm>
         </p:spPr>
         <p:txBody>
@@ -1022,18 +1015,13 @@
               <a:rPr lang="en-US"/>
               <a:t>Click to edit Master title style</a:t>
             </a:r>
-          </a:p>
-        </p:txBody>
-      </p:sp>
-      <p:sp>
-        <p:nvSpPr>
-          <p:cNvPr id="3" name="Vertical Text Placeholder 2">
-            <a:extLst>
-              <a:ext uri="{FF2B5EF4-FFF2-40B4-BE49-F238E27FC236}">
-                <a16:creationId xmlns:a16="http://schemas.microsoft.com/office/drawing/2014/main" id="{0E2AC87D-1B7B-2F0D-FB1A-F8587247FB92}"/>
-              </a:ext>
-            </a:extLst>
-          </p:cNvPr>
+            <a:endParaRPr lang="en-US" dirty="0"/>
+          </a:p>
+        </p:txBody>
+      </p:sp>
+      <p:sp>
+        <p:nvSpPr>
+          <p:cNvPr id="3" name="Vertical Text Placeholder 2"/>
           <p:cNvSpPr>
             <a:spLocks noGrp="1"/>
           </p:cNvSpPr>
@@ -1043,8 +1031,8 @@
         </p:nvSpPr>
         <p:spPr>
           <a:xfrm>
-            <a:off x="838200" y="365125"/>
-            <a:ext cx="7734300" cy="5811838"/>
+            <a:off x="2231136" y="937260"/>
+            <a:ext cx="6198489" cy="4983480"/>
           </a:xfrm>
         </p:spPr>
         <p:txBody>
@@ -1084,18 +1072,13 @@
               <a:rPr lang="en-US"/>
               <a:t>Fifth level</a:t>
             </a:r>
-          </a:p>
-        </p:txBody>
-      </p:sp>
-      <p:sp>
-        <p:nvSpPr>
-          <p:cNvPr id="4" name="Date Placeholder 3">
-            <a:extLst>
-              <a:ext uri="{FF2B5EF4-FFF2-40B4-BE49-F238E27FC236}">
-                <a16:creationId xmlns:a16="http://schemas.microsoft.com/office/drawing/2014/main" id="{302978FD-BC28-C807-B558-7C8C5A43F8DF}"/>
-              </a:ext>
-            </a:extLst>
-          </p:cNvPr>
+            <a:endParaRPr lang="en-US" dirty="0"/>
+          </a:p>
+        </p:txBody>
+      </p:sp>
+      <p:sp>
+        <p:nvSpPr>
+          <p:cNvPr id="4" name="Date Placeholder 3"/>
           <p:cNvSpPr>
             <a:spLocks noGrp="1"/>
           </p:cNvSpPr>
@@ -1110,7 +1093,7 @@
           <a:p>
             <a:fld id="{90053C86-C48F-3743-8746-2CA0384683DA}" type="datetimeFigureOut">
               <a:rPr lang="en-US" smtClean="0"/>
-              <a:t>10/9/23</a:t>
+              <a:t>10/10/23</a:t>
             </a:fld>
             <a:endParaRPr lang="en-US"/>
           </a:p>
@@ -1118,13 +1101,7 @@
       </p:sp>
       <p:sp>
         <p:nvSpPr>
-          <p:cNvPr id="5" name="Footer Placeholder 4">
-            <a:extLst>
-              <a:ext uri="{FF2B5EF4-FFF2-40B4-BE49-F238E27FC236}">
-                <a16:creationId xmlns:a16="http://schemas.microsoft.com/office/drawing/2014/main" id="{046811A0-0451-AAD5-EC89-678DE0F6EE6A}"/>
-              </a:ext>
-            </a:extLst>
-          </p:cNvPr>
+          <p:cNvPr id="5" name="Footer Placeholder 4"/>
           <p:cNvSpPr>
             <a:spLocks noGrp="1"/>
           </p:cNvSpPr>
@@ -1143,13 +1120,7 @@
       </p:sp>
       <p:sp>
         <p:nvSpPr>
-          <p:cNvPr id="6" name="Slide Number Placeholder 5">
-            <a:extLst>
-              <a:ext uri="{FF2B5EF4-FFF2-40B4-BE49-F238E27FC236}">
-                <a16:creationId xmlns:a16="http://schemas.microsoft.com/office/drawing/2014/main" id="{48DF9129-918E-EB61-A92D-C6E6CAE895D8}"/>
-              </a:ext>
-            </a:extLst>
-          </p:cNvPr>
+          <p:cNvPr id="6" name="Slide Number Placeholder 5"/>
           <p:cNvSpPr>
             <a:spLocks noGrp="1"/>
           </p:cNvSpPr>
@@ -1173,7 +1144,7 @@
     </p:spTree>
     <p:extLst>
       <p:ext uri="{BB962C8B-B14F-4D97-AF65-F5344CB8AC3E}">
-        <p14:creationId xmlns:p14="http://schemas.microsoft.com/office/powerpoint/2010/main" val="3222190231"/>
+        <p14:creationId xmlns:p14="http://schemas.microsoft.com/office/powerpoint/2010/main" val="3618077895"/>
       </p:ext>
     </p:extLst>
   </p:cSld>
@@ -1202,13 +1173,7 @@
       </p:grpSpPr>
       <p:sp>
         <p:nvSpPr>
-          <p:cNvPr id="2" name="Title 1">
-            <a:extLst>
-              <a:ext uri="{FF2B5EF4-FFF2-40B4-BE49-F238E27FC236}">
-                <a16:creationId xmlns:a16="http://schemas.microsoft.com/office/drawing/2014/main" id="{90D96653-3260-E5ED-D4E8-B0F23930F422}"/>
-              </a:ext>
-            </a:extLst>
-          </p:cNvPr>
+          <p:cNvPr id="2" name="Title 1"/>
           <p:cNvSpPr>
             <a:spLocks noGrp="1"/>
           </p:cNvSpPr>
@@ -1225,18 +1190,13 @@
               <a:rPr lang="en-US"/>
               <a:t>Click to edit Master title style</a:t>
             </a:r>
-          </a:p>
-        </p:txBody>
-      </p:sp>
-      <p:sp>
-        <p:nvSpPr>
-          <p:cNvPr id="3" name="Content Placeholder 2">
-            <a:extLst>
-              <a:ext uri="{FF2B5EF4-FFF2-40B4-BE49-F238E27FC236}">
-                <a16:creationId xmlns:a16="http://schemas.microsoft.com/office/drawing/2014/main" id="{A76DD486-655E-9296-F232-C9DF159A9327}"/>
-              </a:ext>
-            </a:extLst>
-          </p:cNvPr>
+            <a:endParaRPr lang="en-US" dirty="0"/>
+          </a:p>
+        </p:txBody>
+      </p:sp>
+      <p:sp>
+        <p:nvSpPr>
+          <p:cNvPr id="3" name="Content Placeholder 2"/>
           <p:cNvSpPr>
             <a:spLocks noGrp="1"/>
           </p:cNvSpPr>
@@ -1282,18 +1242,13 @@
               <a:rPr lang="en-US"/>
               <a:t>Fifth level</a:t>
             </a:r>
-          </a:p>
-        </p:txBody>
-      </p:sp>
-      <p:sp>
-        <p:nvSpPr>
-          <p:cNvPr id="4" name="Date Placeholder 3">
-            <a:extLst>
-              <a:ext uri="{FF2B5EF4-FFF2-40B4-BE49-F238E27FC236}">
-                <a16:creationId xmlns:a16="http://schemas.microsoft.com/office/drawing/2014/main" id="{FD08C497-A9AE-0753-78B0-3889B9EBC25F}"/>
-              </a:ext>
-            </a:extLst>
-          </p:cNvPr>
+            <a:endParaRPr lang="en-US" dirty="0"/>
+          </a:p>
+        </p:txBody>
+      </p:sp>
+      <p:sp>
+        <p:nvSpPr>
+          <p:cNvPr id="7" name="Date Placeholder 6"/>
           <p:cNvSpPr>
             <a:spLocks noGrp="1"/>
           </p:cNvSpPr>
@@ -1308,7 +1263,7 @@
           <a:p>
             <a:fld id="{90053C86-C48F-3743-8746-2CA0384683DA}" type="datetimeFigureOut">
               <a:rPr lang="en-US" smtClean="0"/>
-              <a:t>10/9/23</a:t>
+              <a:t>10/10/23</a:t>
             </a:fld>
             <a:endParaRPr lang="en-US"/>
           </a:p>
@@ -1316,13 +1271,7 @@
       </p:sp>
       <p:sp>
         <p:nvSpPr>
-          <p:cNvPr id="5" name="Footer Placeholder 4">
-            <a:extLst>
-              <a:ext uri="{FF2B5EF4-FFF2-40B4-BE49-F238E27FC236}">
-                <a16:creationId xmlns:a16="http://schemas.microsoft.com/office/drawing/2014/main" id="{0A1B024F-DAE5-9BE9-4974-E0EC9B406342}"/>
-              </a:ext>
-            </a:extLst>
-          </p:cNvPr>
+          <p:cNvPr id="8" name="Footer Placeholder 7"/>
           <p:cNvSpPr>
             <a:spLocks noGrp="1"/>
           </p:cNvSpPr>
@@ -1341,13 +1290,7 @@
       </p:sp>
       <p:sp>
         <p:nvSpPr>
-          <p:cNvPr id="6" name="Slide Number Placeholder 5">
-            <a:extLst>
-              <a:ext uri="{FF2B5EF4-FFF2-40B4-BE49-F238E27FC236}">
-                <a16:creationId xmlns:a16="http://schemas.microsoft.com/office/drawing/2014/main" id="{699AA812-B520-65AF-C187-8785D6F184DC}"/>
-              </a:ext>
-            </a:extLst>
-          </p:cNvPr>
+          <p:cNvPr id="9" name="Slide Number Placeholder 8"/>
           <p:cNvSpPr>
             <a:spLocks noGrp="1"/>
           </p:cNvSpPr>
@@ -1371,7 +1314,7 @@
     </p:spTree>
     <p:extLst>
       <p:ext uri="{BB962C8B-B14F-4D97-AF65-F5344CB8AC3E}">
-        <p14:creationId xmlns:p14="http://schemas.microsoft.com/office/powerpoint/2010/main" val="570394487"/>
+        <p14:creationId xmlns:p14="http://schemas.microsoft.com/office/powerpoint/2010/main" val="1285299825"/>
       </p:ext>
     </p:extLst>
   </p:cSld>
@@ -1384,6 +1327,14 @@
 <file path=ppt/slideLayouts/slideLayout3.xml><?xml version="1.0" encoding="utf-8"?>
 <p:sldLayout xmlns:a="http://schemas.openxmlformats.org/drawingml/2006/main" xmlns:r="http://schemas.openxmlformats.org/officeDocument/2006/relationships" xmlns:p="http://schemas.openxmlformats.org/presentationml/2006/main" type="secHead" preserve="1">
   <p:cSld name="Section Header">
+    <p:bg>
+      <p:bgPr>
+        <a:solidFill>
+          <a:schemeClr val="accent1"/>
+        </a:solidFill>
+        <a:effectLst/>
+      </p:bgPr>
+    </p:bg>
     <p:spTree>
       <p:nvGrpSpPr>
         <p:cNvPr id="1" name=""/>
@@ -1400,73 +1351,76 @@
       </p:grpSpPr>
       <p:sp>
         <p:nvSpPr>
-          <p:cNvPr id="2" name="Title 1">
-            <a:extLst>
-              <a:ext uri="{FF2B5EF4-FFF2-40B4-BE49-F238E27FC236}">
-                <a16:creationId xmlns:a16="http://schemas.microsoft.com/office/drawing/2014/main" id="{BB1945D4-9A31-BFA1-C1D2-E3AF14A6A30A}"/>
-              </a:ext>
-            </a:extLst>
-          </p:cNvPr>
+          <p:cNvPr id="2" name="Title 1"/>
           <p:cNvSpPr>
             <a:spLocks noGrp="1"/>
           </p:cNvSpPr>
           <p:nvPr>
             <p:ph type="title"/>
+          </p:nvPr>
+        </p:nvSpPr>
+        <p:spPr bwMode="blackWhite">
+          <a:xfrm>
+            <a:off x="1600200" y="2386744"/>
+            <a:ext cx="8991600" cy="1645920"/>
+          </a:xfrm>
+          <a:solidFill>
+            <a:srgbClr val="FFFFFF"/>
+          </a:solidFill>
+          <a:ln w="38100">
+            <a:solidFill>
+              <a:srgbClr val="404040"/>
+            </a:solidFill>
+          </a:ln>
+        </p:spPr>
+        <p:txBody>
+          <a:bodyPr lIns="274320" rIns="274320" anchor="ctr" anchorCtr="1">
+            <a:normAutofit/>
+          </a:bodyPr>
+          <a:lstStyle>
+            <a:lvl1pPr>
+              <a:defRPr sz="3800">
+                <a:solidFill>
+                  <a:srgbClr val="262626"/>
+                </a:solidFill>
+              </a:defRPr>
+            </a:lvl1pPr>
+          </a:lstStyle>
+          <a:p>
+            <a:r>
+              <a:rPr lang="en-US"/>
+              <a:t>Click to edit Master title style</a:t>
+            </a:r>
+            <a:endParaRPr lang="en-US" dirty="0"/>
+          </a:p>
+        </p:txBody>
+      </p:sp>
+      <p:sp>
+        <p:nvSpPr>
+          <p:cNvPr id="3" name="Text Placeholder 2"/>
+          <p:cNvSpPr>
+            <a:spLocks noGrp="1"/>
+          </p:cNvSpPr>
+          <p:nvPr>
+            <p:ph type="body" idx="1"/>
           </p:nvPr>
         </p:nvSpPr>
         <p:spPr>
           <a:xfrm>
-            <a:off x="831850" y="1709738"/>
-            <a:ext cx="10515600" cy="2852737"/>
+            <a:off x="2695194" y="4352465"/>
+            <a:ext cx="6801612" cy="1265082"/>
           </a:xfrm>
         </p:spPr>
         <p:txBody>
-          <a:bodyPr anchor="b"/>
-          <a:lstStyle>
-            <a:lvl1pPr>
-              <a:defRPr sz="6000"/>
-            </a:lvl1pPr>
-          </a:lstStyle>
-          <a:p>
-            <a:r>
-              <a:rPr lang="en-US"/>
-              <a:t>Click to edit Master title style</a:t>
-            </a:r>
-          </a:p>
-        </p:txBody>
-      </p:sp>
-      <p:sp>
-        <p:nvSpPr>
-          <p:cNvPr id="3" name="Text Placeholder 2">
-            <a:extLst>
-              <a:ext uri="{FF2B5EF4-FFF2-40B4-BE49-F238E27FC236}">
-                <a16:creationId xmlns:a16="http://schemas.microsoft.com/office/drawing/2014/main" id="{939E4E03-2C9B-C225-3E77-BE427381915A}"/>
-              </a:ext>
-            </a:extLst>
-          </p:cNvPr>
-          <p:cNvSpPr>
-            <a:spLocks noGrp="1"/>
-          </p:cNvSpPr>
-          <p:nvPr>
-            <p:ph type="body" idx="1"/>
-          </p:nvPr>
-        </p:nvSpPr>
-        <p:spPr>
-          <a:xfrm>
-            <a:off x="831850" y="4589463"/>
-            <a:ext cx="10515600" cy="1500187"/>
-          </a:xfrm>
-        </p:spPr>
-        <p:txBody>
-          <a:bodyPr/>
+          <a:bodyPr anchor="t" anchorCtr="1">
+            <a:normAutofit/>
+          </a:bodyPr>
           <a:lstStyle>
             <a:lvl1pPr marL="0" indent="0">
               <a:buNone/>
-              <a:defRPr sz="2400">
+              <a:defRPr sz="2000">
                 <a:solidFill>
-                  <a:schemeClr val="tx1">
-                    <a:tint val="75000"/>
-                  </a:schemeClr>
+                  <a:schemeClr val="tx1"/>
                 </a:solidFill>
               </a:defRPr>
             </a:lvl1pPr>
@@ -1562,13 +1516,7 @@
       </p:sp>
       <p:sp>
         <p:nvSpPr>
-          <p:cNvPr id="4" name="Date Placeholder 3">
-            <a:extLst>
-              <a:ext uri="{FF2B5EF4-FFF2-40B4-BE49-F238E27FC236}">
-                <a16:creationId xmlns:a16="http://schemas.microsoft.com/office/drawing/2014/main" id="{76872663-704E-0CE0-7295-8A20F267A50C}"/>
-              </a:ext>
-            </a:extLst>
-          </p:cNvPr>
+          <p:cNvPr id="7" name="Date Placeholder 6"/>
           <p:cNvSpPr>
             <a:spLocks noGrp="1"/>
           </p:cNvSpPr>
@@ -1583,7 +1531,7 @@
           <a:p>
             <a:fld id="{90053C86-C48F-3743-8746-2CA0384683DA}" type="datetimeFigureOut">
               <a:rPr lang="en-US" smtClean="0"/>
-              <a:t>10/9/23</a:t>
+              <a:t>10/10/23</a:t>
             </a:fld>
             <a:endParaRPr lang="en-US"/>
           </a:p>
@@ -1591,13 +1539,7 @@
       </p:sp>
       <p:sp>
         <p:nvSpPr>
-          <p:cNvPr id="5" name="Footer Placeholder 4">
-            <a:extLst>
-              <a:ext uri="{FF2B5EF4-FFF2-40B4-BE49-F238E27FC236}">
-                <a16:creationId xmlns:a16="http://schemas.microsoft.com/office/drawing/2014/main" id="{984AE364-B72F-93A6-49A0-63B54F47E13F}"/>
-              </a:ext>
-            </a:extLst>
-          </p:cNvPr>
+          <p:cNvPr id="8" name="Footer Placeholder 7"/>
           <p:cNvSpPr>
             <a:spLocks noGrp="1"/>
           </p:cNvSpPr>
@@ -1616,13 +1558,7 @@
       </p:sp>
       <p:sp>
         <p:nvSpPr>
-          <p:cNvPr id="6" name="Slide Number Placeholder 5">
-            <a:extLst>
-              <a:ext uri="{FF2B5EF4-FFF2-40B4-BE49-F238E27FC236}">
-                <a16:creationId xmlns:a16="http://schemas.microsoft.com/office/drawing/2014/main" id="{6970714B-A3A3-F3F5-57F9-9D4B4CBF82E6}"/>
-              </a:ext>
-            </a:extLst>
-          </p:cNvPr>
+          <p:cNvPr id="9" name="Slide Number Placeholder 8"/>
           <p:cNvSpPr>
             <a:spLocks noGrp="1"/>
           </p:cNvSpPr>
@@ -1646,12 +1582,12 @@
     </p:spTree>
     <p:extLst>
       <p:ext uri="{BB962C8B-B14F-4D97-AF65-F5344CB8AC3E}">
-        <p14:creationId xmlns:p14="http://schemas.microsoft.com/office/powerpoint/2010/main" val="3381306036"/>
+        <p14:creationId xmlns:p14="http://schemas.microsoft.com/office/powerpoint/2010/main" val="1465178186"/>
       </p:ext>
     </p:extLst>
   </p:cSld>
   <p:clrMapOvr>
-    <a:masterClrMapping/>
+    <a:overrideClrMapping bg1="dk1" tx1="lt1" bg2="dk2" tx2="lt2" accent1="accent1" accent2="accent2" accent3="accent3" accent4="accent4" accent5="accent5" accent6="accent6" hlink="hlink" folHlink="folHlink"/>
   </p:clrMapOvr>
 </p:sldLayout>
 </file>
@@ -1675,13 +1611,7 @@
       </p:grpSpPr>
       <p:sp>
         <p:nvSpPr>
-          <p:cNvPr id="2" name="Title 1">
-            <a:extLst>
-              <a:ext uri="{FF2B5EF4-FFF2-40B4-BE49-F238E27FC236}">
-                <a16:creationId xmlns:a16="http://schemas.microsoft.com/office/drawing/2014/main" id="{0B40BE28-A553-E940-4F9E-9CCBBE8A618C}"/>
-              </a:ext>
-            </a:extLst>
-          </p:cNvPr>
+          <p:cNvPr id="2" name="Title 1"/>
           <p:cNvSpPr>
             <a:spLocks noGrp="1"/>
           </p:cNvSpPr>
@@ -1698,18 +1628,13 @@
               <a:rPr lang="en-US"/>
               <a:t>Click to edit Master title style</a:t>
             </a:r>
-          </a:p>
-        </p:txBody>
-      </p:sp>
-      <p:sp>
-        <p:nvSpPr>
-          <p:cNvPr id="3" name="Content Placeholder 2">
-            <a:extLst>
-              <a:ext uri="{FF2B5EF4-FFF2-40B4-BE49-F238E27FC236}">
-                <a16:creationId xmlns:a16="http://schemas.microsoft.com/office/drawing/2014/main" id="{FEB79C28-C049-1344-E9D1-602C7CBE9124}"/>
-              </a:ext>
-            </a:extLst>
-          </p:cNvPr>
+            <a:endParaRPr lang="en-US" dirty="0"/>
+          </a:p>
+        </p:txBody>
+      </p:sp>
+      <p:sp>
+        <p:nvSpPr>
+          <p:cNvPr id="3" name="Content Placeholder 2"/>
           <p:cNvSpPr>
             <a:spLocks noGrp="1"/>
           </p:cNvSpPr>
@@ -1719,8 +1644,8 @@
         </p:nvSpPr>
         <p:spPr>
           <a:xfrm>
-            <a:off x="838200" y="1825625"/>
-            <a:ext cx="5181600" cy="4351338"/>
+            <a:off x="1581912" y="2638044"/>
+            <a:ext cx="4271771" cy="3101982"/>
           </a:xfrm>
         </p:spPr>
         <p:txBody>
@@ -1760,18 +1685,13 @@
               <a:rPr lang="en-US"/>
               <a:t>Fifth level</a:t>
             </a:r>
-          </a:p>
-        </p:txBody>
-      </p:sp>
-      <p:sp>
-        <p:nvSpPr>
-          <p:cNvPr id="4" name="Content Placeholder 3">
-            <a:extLst>
-              <a:ext uri="{FF2B5EF4-FFF2-40B4-BE49-F238E27FC236}">
-                <a16:creationId xmlns:a16="http://schemas.microsoft.com/office/drawing/2014/main" id="{50962DF0-F52B-EAF6-7F3B-72D65CDB6451}"/>
-              </a:ext>
-            </a:extLst>
-          </p:cNvPr>
+            <a:endParaRPr lang="en-US" dirty="0"/>
+          </a:p>
+        </p:txBody>
+      </p:sp>
+      <p:sp>
+        <p:nvSpPr>
+          <p:cNvPr id="4" name="Content Placeholder 3"/>
           <p:cNvSpPr>
             <a:spLocks noGrp="1"/>
           </p:cNvSpPr>
@@ -1781,8 +1701,8 @@
         </p:nvSpPr>
         <p:spPr>
           <a:xfrm>
-            <a:off x="6172200" y="1825625"/>
-            <a:ext cx="5181600" cy="4351338"/>
+            <a:off x="6338315" y="2638044"/>
+            <a:ext cx="4270247" cy="3101982"/>
           </a:xfrm>
         </p:spPr>
         <p:txBody>
@@ -1822,18 +1742,13 @@
               <a:rPr lang="en-US"/>
               <a:t>Fifth level</a:t>
             </a:r>
-          </a:p>
-        </p:txBody>
-      </p:sp>
-      <p:sp>
-        <p:nvSpPr>
-          <p:cNvPr id="5" name="Date Placeholder 4">
-            <a:extLst>
-              <a:ext uri="{FF2B5EF4-FFF2-40B4-BE49-F238E27FC236}">
-                <a16:creationId xmlns:a16="http://schemas.microsoft.com/office/drawing/2014/main" id="{6D63E0D9-5B96-604B-159A-00E661E7FC0B}"/>
-              </a:ext>
-            </a:extLst>
-          </p:cNvPr>
+            <a:endParaRPr lang="en-US" dirty="0"/>
+          </a:p>
+        </p:txBody>
+      </p:sp>
+      <p:sp>
+        <p:nvSpPr>
+          <p:cNvPr id="8" name="Date Placeholder 7"/>
           <p:cNvSpPr>
             <a:spLocks noGrp="1"/>
           </p:cNvSpPr>
@@ -1848,7 +1763,7 @@
           <a:p>
             <a:fld id="{90053C86-C48F-3743-8746-2CA0384683DA}" type="datetimeFigureOut">
               <a:rPr lang="en-US" smtClean="0"/>
-              <a:t>10/9/23</a:t>
+              <a:t>10/10/23</a:t>
             </a:fld>
             <a:endParaRPr lang="en-US"/>
           </a:p>
@@ -1856,13 +1771,7 @@
       </p:sp>
       <p:sp>
         <p:nvSpPr>
-          <p:cNvPr id="6" name="Footer Placeholder 5">
-            <a:extLst>
-              <a:ext uri="{FF2B5EF4-FFF2-40B4-BE49-F238E27FC236}">
-                <a16:creationId xmlns:a16="http://schemas.microsoft.com/office/drawing/2014/main" id="{F8C4D5D7-C3CE-8CE3-04E8-363740094C8D}"/>
-              </a:ext>
-            </a:extLst>
-          </p:cNvPr>
+          <p:cNvPr id="9" name="Footer Placeholder 8"/>
           <p:cNvSpPr>
             <a:spLocks noGrp="1"/>
           </p:cNvSpPr>
@@ -1881,13 +1790,7 @@
       </p:sp>
       <p:sp>
         <p:nvSpPr>
-          <p:cNvPr id="7" name="Slide Number Placeholder 6">
-            <a:extLst>
-              <a:ext uri="{FF2B5EF4-FFF2-40B4-BE49-F238E27FC236}">
-                <a16:creationId xmlns:a16="http://schemas.microsoft.com/office/drawing/2014/main" id="{98927DCA-1D5B-A9BB-5CA2-6F725A43EC1B}"/>
-              </a:ext>
-            </a:extLst>
-          </p:cNvPr>
+          <p:cNvPr id="10" name="Slide Number Placeholder 9"/>
           <p:cNvSpPr>
             <a:spLocks noGrp="1"/>
           </p:cNvSpPr>
@@ -1911,7 +1814,7 @@
     </p:spTree>
     <p:extLst>
       <p:ext uri="{BB962C8B-B14F-4D97-AF65-F5344CB8AC3E}">
-        <p14:creationId xmlns:p14="http://schemas.microsoft.com/office/powerpoint/2010/main" val="3424583520"/>
+        <p14:creationId xmlns:p14="http://schemas.microsoft.com/office/powerpoint/2010/main" val="3907327661"/>
       </p:ext>
     </p:extLst>
   </p:cSld>
@@ -1940,69 +1843,38 @@
       </p:grpSpPr>
       <p:sp>
         <p:nvSpPr>
-          <p:cNvPr id="2" name="Title 1">
-            <a:extLst>
-              <a:ext uri="{FF2B5EF4-FFF2-40B4-BE49-F238E27FC236}">
-                <a16:creationId xmlns:a16="http://schemas.microsoft.com/office/drawing/2014/main" id="{2EC4EBD6-E046-BF43-03DF-666DA991BC8B}"/>
-              </a:ext>
-            </a:extLst>
-          </p:cNvPr>
-          <p:cNvSpPr>
-            <a:spLocks noGrp="1"/>
-          </p:cNvSpPr>
-          <p:nvPr>
-            <p:ph type="title"/>
+          <p:cNvPr id="3" name="Text Placeholder 2"/>
+          <p:cNvSpPr>
+            <a:spLocks noGrp="1"/>
+          </p:cNvSpPr>
+          <p:nvPr>
+            <p:ph type="body" idx="1"/>
           </p:nvPr>
         </p:nvSpPr>
         <p:spPr>
           <a:xfrm>
-            <a:off x="839788" y="365125"/>
-            <a:ext cx="10515600" cy="1325563"/>
+            <a:off x="1583436" y="2313433"/>
+            <a:ext cx="4270248" cy="704087"/>
           </a:xfrm>
         </p:spPr>
         <p:txBody>
-          <a:bodyPr/>
-          <a:lstStyle/>
-          <a:p>
-            <a:r>
-              <a:rPr lang="en-US"/>
-              <a:t>Click to edit Master title style</a:t>
-            </a:r>
-          </a:p>
-        </p:txBody>
-      </p:sp>
-      <p:sp>
-        <p:nvSpPr>
-          <p:cNvPr id="3" name="Text Placeholder 2">
-            <a:extLst>
-              <a:ext uri="{FF2B5EF4-FFF2-40B4-BE49-F238E27FC236}">
-                <a16:creationId xmlns:a16="http://schemas.microsoft.com/office/drawing/2014/main" id="{1C4C4117-CBA2-04BA-AECA-73B5EC7B9E70}"/>
-              </a:ext>
-            </a:extLst>
-          </p:cNvPr>
-          <p:cNvSpPr>
-            <a:spLocks noGrp="1"/>
-          </p:cNvSpPr>
-          <p:nvPr>
-            <p:ph type="body" idx="1"/>
-          </p:nvPr>
-        </p:nvSpPr>
-        <p:spPr>
-          <a:xfrm>
-            <a:off x="839788" y="1681163"/>
-            <a:ext cx="5157787" cy="823912"/>
-          </a:xfrm>
-        </p:spPr>
-        <p:txBody>
-          <a:bodyPr anchor="b"/>
+          <a:bodyPr anchor="b" anchorCtr="1">
+            <a:normAutofit/>
+          </a:bodyPr>
           <a:lstStyle>
-            <a:lvl1pPr marL="0" indent="0">
-              <a:buNone/>
-              <a:defRPr sz="2400" b="1"/>
+            <a:lvl1pPr marL="0" indent="0" algn="ctr">
+              <a:buNone/>
+              <a:defRPr sz="1900" b="0" cap="all" spc="100" baseline="0">
+                <a:solidFill>
+                  <a:schemeClr val="accent2">
+                    <a:lumMod val="75000"/>
+                  </a:schemeClr>
+                </a:solidFill>
+              </a:defRPr>
             </a:lvl1pPr>
             <a:lvl2pPr marL="457200" indent="0">
               <a:buNone/>
-              <a:defRPr sz="2000" b="1"/>
+              <a:defRPr sz="1900" b="1"/>
             </a:lvl2pPr>
             <a:lvl3pPr marL="914400" indent="0">
               <a:buNone/>
@@ -2044,13 +1916,7 @@
       </p:sp>
       <p:sp>
         <p:nvSpPr>
-          <p:cNvPr id="4" name="Content Placeholder 3">
-            <a:extLst>
-              <a:ext uri="{FF2B5EF4-FFF2-40B4-BE49-F238E27FC236}">
-                <a16:creationId xmlns:a16="http://schemas.microsoft.com/office/drawing/2014/main" id="{62D2E330-1949-C99A-93FF-6D3EA5BE4776}"/>
-              </a:ext>
-            </a:extLst>
-          </p:cNvPr>
+          <p:cNvPr id="4" name="Content Placeholder 3"/>
           <p:cNvSpPr>
             <a:spLocks noGrp="1"/>
           </p:cNvSpPr>
@@ -2060,8 +1926,8 @@
         </p:nvSpPr>
         <p:spPr>
           <a:xfrm>
-            <a:off x="839788" y="2505075"/>
-            <a:ext cx="5157787" cy="3684588"/>
+            <a:off x="1583436" y="3143250"/>
+            <a:ext cx="4270248" cy="2596776"/>
           </a:xfrm>
         </p:spPr>
         <p:txBody>
@@ -2101,41 +1967,105 @@
               <a:rPr lang="en-US"/>
               <a:t>Fifth level</a:t>
             </a:r>
-          </a:p>
-        </p:txBody>
-      </p:sp>
-      <p:sp>
-        <p:nvSpPr>
-          <p:cNvPr id="5" name="Text Placeholder 4">
-            <a:extLst>
-              <a:ext uri="{FF2B5EF4-FFF2-40B4-BE49-F238E27FC236}">
-                <a16:creationId xmlns:a16="http://schemas.microsoft.com/office/drawing/2014/main" id="{59E0BE19-3DA6-9801-BA2F-FCD308701448}"/>
-              </a:ext>
-            </a:extLst>
-          </p:cNvPr>
-          <p:cNvSpPr>
-            <a:spLocks noGrp="1"/>
-          </p:cNvSpPr>
-          <p:nvPr>
-            <p:ph type="body" sz="quarter" idx="3"/>
+            <a:endParaRPr lang="en-US" dirty="0"/>
+          </a:p>
+        </p:txBody>
+      </p:sp>
+      <p:sp>
+        <p:nvSpPr>
+          <p:cNvPr id="6" name="Content Placeholder 5"/>
+          <p:cNvSpPr>
+            <a:spLocks noGrp="1"/>
+          </p:cNvSpPr>
+          <p:nvPr>
+            <p:ph sz="quarter" idx="4"/>
           </p:nvPr>
         </p:nvSpPr>
         <p:spPr>
           <a:xfrm>
-            <a:off x="6172200" y="1681163"/>
-            <a:ext cx="5183188" cy="823912"/>
+            <a:off x="6338316" y="3143250"/>
+            <a:ext cx="4253484" cy="2596776"/>
           </a:xfrm>
         </p:spPr>
         <p:txBody>
-          <a:bodyPr anchor="b"/>
+          <a:bodyPr/>
           <a:lstStyle>
-            <a:lvl1pPr marL="0" indent="0">
-              <a:buNone/>
-              <a:defRPr sz="2400" b="1"/>
+            <a:lvl5pPr>
+              <a:defRPr/>
+            </a:lvl5pPr>
+          </a:lstStyle>
+          <a:p>
+            <a:pPr lvl="0"/>
+            <a:r>
+              <a:rPr lang="en-US"/>
+              <a:t>Click to edit Master text styles</a:t>
+            </a:r>
+          </a:p>
+          <a:p>
+            <a:pPr lvl="1"/>
+            <a:r>
+              <a:rPr lang="en-US"/>
+              <a:t>Second level</a:t>
+            </a:r>
+          </a:p>
+          <a:p>
+            <a:pPr lvl="2"/>
+            <a:r>
+              <a:rPr lang="en-US"/>
+              <a:t>Third level</a:t>
+            </a:r>
+          </a:p>
+          <a:p>
+            <a:pPr lvl="3"/>
+            <a:r>
+              <a:rPr lang="en-US"/>
+              <a:t>Fourth level</a:t>
+            </a:r>
+          </a:p>
+          <a:p>
+            <a:pPr lvl="4"/>
+            <a:r>
+              <a:rPr lang="en-US"/>
+              <a:t>Fifth level</a:t>
+            </a:r>
+            <a:endParaRPr lang="en-US" dirty="0"/>
+          </a:p>
+        </p:txBody>
+      </p:sp>
+      <p:sp>
+        <p:nvSpPr>
+          <p:cNvPr id="11" name="Text Placeholder 4"/>
+          <p:cNvSpPr>
+            <a:spLocks noGrp="1"/>
+          </p:cNvSpPr>
+          <p:nvPr>
+            <p:ph type="body" sz="quarter" idx="13"/>
+          </p:nvPr>
+        </p:nvSpPr>
+        <p:spPr>
+          <a:xfrm>
+            <a:off x="6338316" y="2313433"/>
+            <a:ext cx="4270248" cy="704087"/>
+          </a:xfrm>
+        </p:spPr>
+        <p:txBody>
+          <a:bodyPr anchor="b" anchorCtr="1">
+            <a:normAutofit/>
+          </a:bodyPr>
+          <a:lstStyle>
+            <a:lvl1pPr marL="0" indent="0" algn="ctr">
+              <a:buNone/>
+              <a:defRPr sz="1900" b="0" cap="all" spc="100" baseline="0">
+                <a:solidFill>
+                  <a:schemeClr val="accent2">
+                    <a:lumMod val="75000"/>
+                  </a:schemeClr>
+                </a:solidFill>
+              </a:defRPr>
             </a:lvl1pPr>
             <a:lvl2pPr marL="457200" indent="0">
               <a:buNone/>
-              <a:defRPr sz="2000" b="1"/>
+              <a:defRPr sz="1900" b="1"/>
             </a:lvl2pPr>
             <a:lvl3pPr marL="914400" indent="0">
               <a:buNone/>
@@ -2177,80 +2107,35 @@
       </p:sp>
       <p:sp>
         <p:nvSpPr>
-          <p:cNvPr id="6" name="Content Placeholder 5">
-            <a:extLst>
-              <a:ext uri="{FF2B5EF4-FFF2-40B4-BE49-F238E27FC236}">
-                <a16:creationId xmlns:a16="http://schemas.microsoft.com/office/drawing/2014/main" id="{0F4C7B5C-0684-ED29-5D2C-A5605A3FEED0}"/>
-              </a:ext>
-            </a:extLst>
-          </p:cNvPr>
-          <p:cNvSpPr>
-            <a:spLocks noGrp="1"/>
-          </p:cNvSpPr>
-          <p:nvPr>
-            <p:ph sz="quarter" idx="4"/>
-          </p:nvPr>
-        </p:nvSpPr>
-        <p:spPr>
-          <a:xfrm>
-            <a:off x="6172200" y="2505075"/>
-            <a:ext cx="5183188" cy="3684588"/>
-          </a:xfrm>
-        </p:spPr>
+          <p:cNvPr id="7" name="Date Placeholder 6"/>
+          <p:cNvSpPr>
+            <a:spLocks noGrp="1"/>
+          </p:cNvSpPr>
+          <p:nvPr>
+            <p:ph type="dt" sz="half" idx="10"/>
+          </p:nvPr>
+        </p:nvSpPr>
+        <p:spPr/>
         <p:txBody>
           <a:bodyPr/>
           <a:lstStyle/>
           <a:p>
-            <a:pPr lvl="0"/>
-            <a:r>
-              <a:rPr lang="en-US"/>
-              <a:t>Click to edit Master text styles</a:t>
-            </a:r>
-          </a:p>
-          <a:p>
-            <a:pPr lvl="1"/>
-            <a:r>
-              <a:rPr lang="en-US"/>
-              <a:t>Second level</a:t>
-            </a:r>
-          </a:p>
-          <a:p>
-            <a:pPr lvl="2"/>
-            <a:r>
-              <a:rPr lang="en-US"/>
-              <a:t>Third level</a:t>
-            </a:r>
-          </a:p>
-          <a:p>
-            <a:pPr lvl="3"/>
-            <a:r>
-              <a:rPr lang="en-US"/>
-              <a:t>Fourth level</a:t>
-            </a:r>
-          </a:p>
-          <a:p>
-            <a:pPr lvl="4"/>
-            <a:r>
-              <a:rPr lang="en-US"/>
-              <a:t>Fifth level</a:t>
-            </a:r>
-          </a:p>
-        </p:txBody>
-      </p:sp>
-      <p:sp>
-        <p:nvSpPr>
-          <p:cNvPr id="7" name="Date Placeholder 6">
-            <a:extLst>
-              <a:ext uri="{FF2B5EF4-FFF2-40B4-BE49-F238E27FC236}">
-                <a16:creationId xmlns:a16="http://schemas.microsoft.com/office/drawing/2014/main" id="{CF4E3DE4-43C7-2B83-36F5-01A07163554F}"/>
-              </a:ext>
-            </a:extLst>
-          </p:cNvPr>
-          <p:cNvSpPr>
-            <a:spLocks noGrp="1"/>
-          </p:cNvSpPr>
-          <p:nvPr>
-            <p:ph type="dt" sz="half" idx="10"/>
+            <a:fld id="{90053C86-C48F-3743-8746-2CA0384683DA}" type="datetimeFigureOut">
+              <a:rPr lang="en-US" smtClean="0"/>
+              <a:t>10/10/23</a:t>
+            </a:fld>
+            <a:endParaRPr lang="en-US"/>
+          </a:p>
+        </p:txBody>
+      </p:sp>
+      <p:sp>
+        <p:nvSpPr>
+          <p:cNvPr id="8" name="Footer Placeholder 7"/>
+          <p:cNvSpPr>
+            <a:spLocks noGrp="1"/>
+          </p:cNvSpPr>
+          <p:nvPr>
+            <p:ph type="ftr" sz="quarter" idx="11"/>
           </p:nvPr>
         </p:nvSpPr>
         <p:spPr/>
@@ -2258,48 +2143,13 @@
           <a:bodyPr/>
           <a:lstStyle/>
           <a:p>
-            <a:fld id="{90053C86-C48F-3743-8746-2CA0384683DA}" type="datetimeFigureOut">
-              <a:rPr lang="en-US" smtClean="0"/>
-              <a:t>10/9/23</a:t>
-            </a:fld>
             <a:endParaRPr lang="en-US"/>
           </a:p>
         </p:txBody>
       </p:sp>
       <p:sp>
         <p:nvSpPr>
-          <p:cNvPr id="8" name="Footer Placeholder 7">
-            <a:extLst>
-              <a:ext uri="{FF2B5EF4-FFF2-40B4-BE49-F238E27FC236}">
-                <a16:creationId xmlns:a16="http://schemas.microsoft.com/office/drawing/2014/main" id="{F71C9BA9-5715-5CD1-6723-CFF3BF02D7DA}"/>
-              </a:ext>
-            </a:extLst>
-          </p:cNvPr>
-          <p:cNvSpPr>
-            <a:spLocks noGrp="1"/>
-          </p:cNvSpPr>
-          <p:nvPr>
-            <p:ph type="ftr" sz="quarter" idx="11"/>
-          </p:nvPr>
-        </p:nvSpPr>
-        <p:spPr/>
-        <p:txBody>
-          <a:bodyPr/>
-          <a:lstStyle/>
-          <a:p>
-            <a:endParaRPr lang="en-US"/>
-          </a:p>
-        </p:txBody>
-      </p:sp>
-      <p:sp>
-        <p:nvSpPr>
-          <p:cNvPr id="9" name="Slide Number Placeholder 8">
-            <a:extLst>
-              <a:ext uri="{FF2B5EF4-FFF2-40B4-BE49-F238E27FC236}">
-                <a16:creationId xmlns:a16="http://schemas.microsoft.com/office/drawing/2014/main" id="{D5230389-BF60-A5BF-39E1-4C6F67C29C30}"/>
-              </a:ext>
-            </a:extLst>
-          </p:cNvPr>
+          <p:cNvPr id="9" name="Slide Number Placeholder 8"/>
           <p:cNvSpPr>
             <a:spLocks noGrp="1"/>
           </p:cNvSpPr>
@@ -2320,10 +2170,33 @@
           </a:p>
         </p:txBody>
       </p:sp>
+      <p:sp>
+        <p:nvSpPr>
+          <p:cNvPr id="10" name="Title 9"/>
+          <p:cNvSpPr>
+            <a:spLocks noGrp="1"/>
+          </p:cNvSpPr>
+          <p:nvPr>
+            <p:ph type="title"/>
+          </p:nvPr>
+        </p:nvSpPr>
+        <p:spPr/>
+        <p:txBody>
+          <a:bodyPr/>
+          <a:lstStyle/>
+          <a:p>
+            <a:r>
+              <a:rPr lang="en-US"/>
+              <a:t>Click to edit Master title style</a:t>
+            </a:r>
+            <a:endParaRPr lang="en-US" dirty="0"/>
+          </a:p>
+        </p:txBody>
+      </p:sp>
     </p:spTree>
     <p:extLst>
       <p:ext uri="{BB962C8B-B14F-4D97-AF65-F5344CB8AC3E}">
-        <p14:creationId xmlns:p14="http://schemas.microsoft.com/office/powerpoint/2010/main" val="255849326"/>
+        <p14:creationId xmlns:p14="http://schemas.microsoft.com/office/powerpoint/2010/main" val="4250995205"/>
       </p:ext>
     </p:extLst>
   </p:cSld>
@@ -2352,13 +2225,7 @@
       </p:grpSpPr>
       <p:sp>
         <p:nvSpPr>
-          <p:cNvPr id="2" name="Title 1">
-            <a:extLst>
-              <a:ext uri="{FF2B5EF4-FFF2-40B4-BE49-F238E27FC236}">
-                <a16:creationId xmlns:a16="http://schemas.microsoft.com/office/drawing/2014/main" id="{905BE87C-D3CE-F4D6-556A-639586D596AD}"/>
-              </a:ext>
-            </a:extLst>
-          </p:cNvPr>
+          <p:cNvPr id="2" name="Title 1"/>
           <p:cNvSpPr>
             <a:spLocks noGrp="1"/>
           </p:cNvSpPr>
@@ -2375,18 +2242,13 @@
               <a:rPr lang="en-US"/>
               <a:t>Click to edit Master title style</a:t>
             </a:r>
-          </a:p>
-        </p:txBody>
-      </p:sp>
-      <p:sp>
-        <p:nvSpPr>
-          <p:cNvPr id="3" name="Date Placeholder 2">
-            <a:extLst>
-              <a:ext uri="{FF2B5EF4-FFF2-40B4-BE49-F238E27FC236}">
-                <a16:creationId xmlns:a16="http://schemas.microsoft.com/office/drawing/2014/main" id="{68A46B89-133D-DD17-F53E-8AF52CD4FD35}"/>
-              </a:ext>
-            </a:extLst>
-          </p:cNvPr>
+            <a:endParaRPr lang="en-US" dirty="0"/>
+          </a:p>
+        </p:txBody>
+      </p:sp>
+      <p:sp>
+        <p:nvSpPr>
+          <p:cNvPr id="3" name="Date Placeholder 2"/>
           <p:cNvSpPr>
             <a:spLocks noGrp="1"/>
           </p:cNvSpPr>
@@ -2401,7 +2263,7 @@
           <a:p>
             <a:fld id="{90053C86-C48F-3743-8746-2CA0384683DA}" type="datetimeFigureOut">
               <a:rPr lang="en-US" smtClean="0"/>
-              <a:t>10/9/23</a:t>
+              <a:t>10/10/23</a:t>
             </a:fld>
             <a:endParaRPr lang="en-US"/>
           </a:p>
@@ -2409,13 +2271,7 @@
       </p:sp>
       <p:sp>
         <p:nvSpPr>
-          <p:cNvPr id="4" name="Footer Placeholder 3">
-            <a:extLst>
-              <a:ext uri="{FF2B5EF4-FFF2-40B4-BE49-F238E27FC236}">
-                <a16:creationId xmlns:a16="http://schemas.microsoft.com/office/drawing/2014/main" id="{E6745E9E-0604-3D9B-ED30-4AA3C3054AED}"/>
-              </a:ext>
-            </a:extLst>
-          </p:cNvPr>
+          <p:cNvPr id="4" name="Footer Placeholder 3"/>
           <p:cNvSpPr>
             <a:spLocks noGrp="1"/>
           </p:cNvSpPr>
@@ -2434,13 +2290,7 @@
       </p:sp>
       <p:sp>
         <p:nvSpPr>
-          <p:cNvPr id="5" name="Slide Number Placeholder 4">
-            <a:extLst>
-              <a:ext uri="{FF2B5EF4-FFF2-40B4-BE49-F238E27FC236}">
-                <a16:creationId xmlns:a16="http://schemas.microsoft.com/office/drawing/2014/main" id="{EDEB66B2-D08D-C267-90EB-CF6311F81DDE}"/>
-              </a:ext>
-            </a:extLst>
-          </p:cNvPr>
+          <p:cNvPr id="5" name="Slide Number Placeholder 4"/>
           <p:cNvSpPr>
             <a:spLocks noGrp="1"/>
           </p:cNvSpPr>
@@ -2464,7 +2314,7 @@
     </p:spTree>
     <p:extLst>
       <p:ext uri="{BB962C8B-B14F-4D97-AF65-F5344CB8AC3E}">
-        <p14:creationId xmlns:p14="http://schemas.microsoft.com/office/powerpoint/2010/main" val="3415687300"/>
+        <p14:creationId xmlns:p14="http://schemas.microsoft.com/office/powerpoint/2010/main" val="3398685512"/>
       </p:ext>
     </p:extLst>
   </p:cSld>
@@ -2493,13 +2343,7 @@
       </p:grpSpPr>
       <p:sp>
         <p:nvSpPr>
-          <p:cNvPr id="2" name="Date Placeholder 1">
-            <a:extLst>
-              <a:ext uri="{FF2B5EF4-FFF2-40B4-BE49-F238E27FC236}">
-                <a16:creationId xmlns:a16="http://schemas.microsoft.com/office/drawing/2014/main" id="{5BC94323-C86D-6501-EA5F-F5492ECEBEAF}"/>
-              </a:ext>
-            </a:extLst>
-          </p:cNvPr>
+          <p:cNvPr id="2" name="Date Placeholder 1"/>
           <p:cNvSpPr>
             <a:spLocks noGrp="1"/>
           </p:cNvSpPr>
@@ -2514,7 +2358,7 @@
           <a:p>
             <a:fld id="{90053C86-C48F-3743-8746-2CA0384683DA}" type="datetimeFigureOut">
               <a:rPr lang="en-US" smtClean="0"/>
-              <a:t>10/9/23</a:t>
+              <a:t>10/10/23</a:t>
             </a:fld>
             <a:endParaRPr lang="en-US"/>
           </a:p>
@@ -2522,13 +2366,7 @@
       </p:sp>
       <p:sp>
         <p:nvSpPr>
-          <p:cNvPr id="3" name="Footer Placeholder 2">
-            <a:extLst>
-              <a:ext uri="{FF2B5EF4-FFF2-40B4-BE49-F238E27FC236}">
-                <a16:creationId xmlns:a16="http://schemas.microsoft.com/office/drawing/2014/main" id="{E5A6031B-773D-89F1-4190-10DD7A93C27C}"/>
-              </a:ext>
-            </a:extLst>
-          </p:cNvPr>
+          <p:cNvPr id="3" name="Footer Placeholder 2"/>
           <p:cNvSpPr>
             <a:spLocks noGrp="1"/>
           </p:cNvSpPr>
@@ -2547,13 +2385,7 @@
       </p:sp>
       <p:sp>
         <p:nvSpPr>
-          <p:cNvPr id="4" name="Slide Number Placeholder 3">
-            <a:extLst>
-              <a:ext uri="{FF2B5EF4-FFF2-40B4-BE49-F238E27FC236}">
-                <a16:creationId xmlns:a16="http://schemas.microsoft.com/office/drawing/2014/main" id="{B4D5082B-DF97-4F1F-FC9D-53591E4F94E1}"/>
-              </a:ext>
-            </a:extLst>
-          </p:cNvPr>
+          <p:cNvPr id="4" name="Slide Number Placeholder 3"/>
           <p:cNvSpPr>
             <a:spLocks noGrp="1"/>
           </p:cNvSpPr>
@@ -2577,7 +2409,7 @@
     </p:spTree>
     <p:extLst>
       <p:ext uri="{BB962C8B-B14F-4D97-AF65-F5344CB8AC3E}">
-        <p14:creationId xmlns:p14="http://schemas.microsoft.com/office/powerpoint/2010/main" val="1683807649"/>
+        <p14:creationId xmlns:p14="http://schemas.microsoft.com/office/powerpoint/2010/main" val="199329111"/>
       </p:ext>
     </p:extLst>
   </p:cSld>
@@ -2606,265 +2438,326 @@
       </p:grpSpPr>
       <p:sp>
         <p:nvSpPr>
-          <p:cNvPr id="2" name="Title 1">
-            <a:extLst>
-              <a:ext uri="{FF2B5EF4-FFF2-40B4-BE49-F238E27FC236}">
-                <a16:creationId xmlns:a16="http://schemas.microsoft.com/office/drawing/2014/main" id="{AE66E42D-F59A-2DFE-9A77-00AFC0638D8D}"/>
-              </a:ext>
-            </a:extLst>
-          </p:cNvPr>
-          <p:cNvSpPr>
-            <a:spLocks noGrp="1"/>
-          </p:cNvSpPr>
-          <p:nvPr>
-            <p:ph type="title"/>
-          </p:nvPr>
+          <p:cNvPr id="26" name="Rectangle 25"/>
+          <p:cNvSpPr/>
+          <p:nvPr/>
         </p:nvSpPr>
         <p:spPr>
           <a:xfrm>
-            <a:off x="839788" y="457200"/>
-            <a:ext cx="3932237" cy="1600200"/>
+            <a:off x="0" y="0"/>
+            <a:ext cx="6096000" cy="6858000"/>
+          </a:xfrm>
+          <a:prstGeom prst="rect">
+            <a:avLst/>
+          </a:prstGeom>
+          <a:solidFill>
+            <a:schemeClr val="accent2"/>
+          </a:solidFill>
+          <a:ln>
+            <a:noFill/>
+          </a:ln>
+        </p:spPr>
+        <p:style>
+          <a:lnRef idx="2">
+            <a:schemeClr val="accent1">
+              <a:shade val="50000"/>
+            </a:schemeClr>
+          </a:lnRef>
+          <a:fillRef idx="1">
+            <a:schemeClr val="accent1"/>
+          </a:fillRef>
+          <a:effectRef idx="0">
+            <a:schemeClr val="accent1"/>
+          </a:effectRef>
+          <a:fontRef idx="minor">
+            <a:schemeClr val="lt1"/>
+          </a:fontRef>
+        </p:style>
+      </p:sp>
+      <p:sp>
+        <p:nvSpPr>
+          <p:cNvPr id="2" name="Title 1"/>
+          <p:cNvSpPr>
+            <a:spLocks noGrp="1"/>
+          </p:cNvSpPr>
+          <p:nvPr>
+            <p:ph type="title"/>
+          </p:nvPr>
+        </p:nvSpPr>
+        <p:spPr bwMode="blackWhite">
+          <a:xfrm>
+            <a:off x="804672" y="2243828"/>
+            <a:ext cx="4486656" cy="1141497"/>
+          </a:xfrm>
+          <a:solidFill>
+            <a:srgbClr val="FFFFFF"/>
+          </a:solidFill>
+          <a:ln>
+            <a:solidFill>
+              <a:srgbClr val="404040"/>
+            </a:solidFill>
+          </a:ln>
+        </p:spPr>
+        <p:txBody>
+          <a:bodyPr anchor="ctr" anchorCtr="1">
+            <a:normAutofit/>
+          </a:bodyPr>
+          <a:lstStyle>
+            <a:lvl1pPr>
+              <a:defRPr sz="2200">
+                <a:solidFill>
+                  <a:srgbClr val="262626"/>
+                </a:solidFill>
+              </a:defRPr>
+            </a:lvl1pPr>
+          </a:lstStyle>
+          <a:p>
+            <a:r>
+              <a:rPr lang="en-US"/>
+              <a:t>Click to edit Master title style</a:t>
+            </a:r>
+            <a:endParaRPr lang="en-US" dirty="0"/>
+          </a:p>
+        </p:txBody>
+      </p:sp>
+      <p:sp>
+        <p:nvSpPr>
+          <p:cNvPr id="3" name="Content Placeholder 2"/>
+          <p:cNvSpPr>
+            <a:spLocks noGrp="1"/>
+          </p:cNvSpPr>
+          <p:nvPr>
+            <p:ph idx="1"/>
+          </p:nvPr>
+        </p:nvSpPr>
+        <p:spPr>
+          <a:xfrm>
+            <a:off x="6736080" y="804672"/>
+            <a:ext cx="4815840" cy="5248656"/>
           </a:xfrm>
         </p:spPr>
         <p:txBody>
-          <a:bodyPr anchor="b"/>
+          <a:bodyPr>
+            <a:normAutofit/>
+          </a:bodyPr>
           <a:lstStyle>
             <a:lvl1pPr>
-              <a:defRPr sz="3200"/>
+              <a:defRPr sz="1900">
+                <a:solidFill>
+                  <a:schemeClr val="tx1"/>
+                </a:solidFill>
+              </a:defRPr>
             </a:lvl1pPr>
+            <a:lvl2pPr>
+              <a:defRPr sz="1600">
+                <a:solidFill>
+                  <a:schemeClr val="tx1"/>
+                </a:solidFill>
+              </a:defRPr>
+            </a:lvl2pPr>
+            <a:lvl3pPr>
+              <a:defRPr sz="1600">
+                <a:solidFill>
+                  <a:schemeClr val="tx1"/>
+                </a:solidFill>
+              </a:defRPr>
+            </a:lvl3pPr>
+            <a:lvl4pPr>
+              <a:defRPr sz="1600">
+                <a:solidFill>
+                  <a:schemeClr val="tx1"/>
+                </a:solidFill>
+              </a:defRPr>
+            </a:lvl4pPr>
+            <a:lvl5pPr>
+              <a:defRPr sz="1600">
+                <a:solidFill>
+                  <a:schemeClr val="tx1"/>
+                </a:solidFill>
+              </a:defRPr>
+            </a:lvl5pPr>
+            <a:lvl6pPr>
+              <a:defRPr sz="1600"/>
+            </a:lvl6pPr>
+            <a:lvl7pPr>
+              <a:defRPr sz="1600"/>
+            </a:lvl7pPr>
+            <a:lvl8pPr>
+              <a:defRPr sz="1600"/>
+            </a:lvl8pPr>
+            <a:lvl9pPr>
+              <a:defRPr sz="1600"/>
+            </a:lvl9pPr>
           </a:lstStyle>
           <a:p>
-            <a:r>
-              <a:rPr lang="en-US"/>
-              <a:t>Click to edit Master title style</a:t>
-            </a:r>
-          </a:p>
-        </p:txBody>
-      </p:sp>
-      <p:sp>
-        <p:nvSpPr>
-          <p:cNvPr id="3" name="Content Placeholder 2">
-            <a:extLst>
-              <a:ext uri="{FF2B5EF4-FFF2-40B4-BE49-F238E27FC236}">
-                <a16:creationId xmlns:a16="http://schemas.microsoft.com/office/drawing/2014/main" id="{F0E234AA-5B65-43BD-702A-E6032B3CD4CD}"/>
-              </a:ext>
-            </a:extLst>
-          </p:cNvPr>
-          <p:cNvSpPr>
-            <a:spLocks noGrp="1"/>
-          </p:cNvSpPr>
-          <p:nvPr>
-            <p:ph idx="1"/>
+            <a:pPr lvl="0"/>
+            <a:r>
+              <a:rPr lang="en-US"/>
+              <a:t>Click to edit Master text styles</a:t>
+            </a:r>
+          </a:p>
+          <a:p>
+            <a:pPr lvl="1"/>
+            <a:r>
+              <a:rPr lang="en-US"/>
+              <a:t>Second level</a:t>
+            </a:r>
+          </a:p>
+          <a:p>
+            <a:pPr lvl="2"/>
+            <a:r>
+              <a:rPr lang="en-US"/>
+              <a:t>Third level</a:t>
+            </a:r>
+          </a:p>
+          <a:p>
+            <a:pPr lvl="3"/>
+            <a:r>
+              <a:rPr lang="en-US"/>
+              <a:t>Fourth level</a:t>
+            </a:r>
+          </a:p>
+          <a:p>
+            <a:pPr lvl="4"/>
+            <a:r>
+              <a:rPr lang="en-US"/>
+              <a:t>Fifth level</a:t>
+            </a:r>
+            <a:endParaRPr lang="en-US" dirty="0"/>
+          </a:p>
+        </p:txBody>
+      </p:sp>
+      <p:sp>
+        <p:nvSpPr>
+          <p:cNvPr id="4" name="Text Placeholder 3"/>
+          <p:cNvSpPr>
+            <a:spLocks noGrp="1"/>
+          </p:cNvSpPr>
+          <p:nvPr>
+            <p:ph type="body" sz="half" idx="2"/>
           </p:nvPr>
         </p:nvSpPr>
         <p:spPr>
           <a:xfrm>
-            <a:off x="5183188" y="987425"/>
-            <a:ext cx="6172200" cy="4873625"/>
+            <a:off x="1115568" y="3549918"/>
+            <a:ext cx="3794760" cy="2194036"/>
+          </a:xfrm>
+        </p:spPr>
+        <p:txBody>
+          <a:bodyPr anchor="t" anchorCtr="1">
+            <a:normAutofit/>
+          </a:bodyPr>
+          <a:lstStyle>
+            <a:lvl1pPr marL="0" indent="0" algn="ctr">
+              <a:buNone/>
+              <a:defRPr sz="1500">
+                <a:solidFill>
+                  <a:srgbClr val="FFFFFF"/>
+                </a:solidFill>
+              </a:defRPr>
+            </a:lvl1pPr>
+            <a:lvl2pPr marL="457200" indent="0">
+              <a:buNone/>
+              <a:defRPr sz="1400"/>
+            </a:lvl2pPr>
+            <a:lvl3pPr marL="914400" indent="0">
+              <a:buNone/>
+              <a:defRPr sz="1200"/>
+            </a:lvl3pPr>
+            <a:lvl4pPr marL="1371600" indent="0">
+              <a:buNone/>
+              <a:defRPr sz="1000"/>
+            </a:lvl4pPr>
+            <a:lvl5pPr marL="1828800" indent="0">
+              <a:buNone/>
+              <a:defRPr sz="1000"/>
+            </a:lvl5pPr>
+            <a:lvl6pPr marL="2286000" indent="0">
+              <a:buNone/>
+              <a:defRPr sz="1000"/>
+            </a:lvl6pPr>
+            <a:lvl7pPr marL="2743200" indent="0">
+              <a:buNone/>
+              <a:defRPr sz="1000"/>
+            </a:lvl7pPr>
+            <a:lvl8pPr marL="3200400" indent="0">
+              <a:buNone/>
+              <a:defRPr sz="1000"/>
+            </a:lvl8pPr>
+            <a:lvl9pPr marL="3657600" indent="0">
+              <a:buNone/>
+              <a:defRPr sz="1000"/>
+            </a:lvl9pPr>
+          </a:lstStyle>
+          <a:p>
+            <a:pPr lvl="0"/>
+            <a:r>
+              <a:rPr lang="en-US"/>
+              <a:t>Click to edit Master text styles</a:t>
+            </a:r>
+          </a:p>
+        </p:txBody>
+      </p:sp>
+      <p:sp>
+        <p:nvSpPr>
+          <p:cNvPr id="9" name="Date Placeholder 8"/>
+          <p:cNvSpPr>
+            <a:spLocks noGrp="1"/>
+          </p:cNvSpPr>
+          <p:nvPr>
+            <p:ph type="dt" sz="half" idx="10"/>
+          </p:nvPr>
+        </p:nvSpPr>
+        <p:spPr/>
+        <p:txBody>
+          <a:bodyPr/>
+          <a:lstStyle/>
+          <a:p>
+            <a:fld id="{90053C86-C48F-3743-8746-2CA0384683DA}" type="datetimeFigureOut">
+              <a:rPr lang="en-US" smtClean="0"/>
+              <a:t>10/10/23</a:t>
+            </a:fld>
+            <a:endParaRPr lang="en-US"/>
+          </a:p>
+        </p:txBody>
+      </p:sp>
+      <p:sp>
+        <p:nvSpPr>
+          <p:cNvPr id="10" name="Footer Placeholder 9"/>
+          <p:cNvSpPr>
+            <a:spLocks noGrp="1"/>
+          </p:cNvSpPr>
+          <p:nvPr>
+            <p:ph type="ftr" sz="quarter" idx="11"/>
+          </p:nvPr>
+        </p:nvSpPr>
+        <p:spPr>
+          <a:xfrm>
+            <a:off x="804672" y="6236208"/>
+            <a:ext cx="5124797" cy="320040"/>
           </a:xfrm>
         </p:spPr>
         <p:txBody>
           <a:bodyPr/>
           <a:lstStyle>
             <a:lvl1pPr>
-              <a:defRPr sz="3200"/>
+              <a:defRPr>
+                <a:solidFill>
+                  <a:srgbClr val="FFFFFF">
+                    <a:alpha val="70000"/>
+                  </a:srgbClr>
+                </a:solidFill>
+              </a:defRPr>
             </a:lvl1pPr>
-            <a:lvl2pPr>
-              <a:defRPr sz="2800"/>
-            </a:lvl2pPr>
-            <a:lvl3pPr>
-              <a:defRPr sz="2400"/>
-            </a:lvl3pPr>
-            <a:lvl4pPr>
-              <a:defRPr sz="2000"/>
-            </a:lvl4pPr>
-            <a:lvl5pPr>
-              <a:defRPr sz="2000"/>
-            </a:lvl5pPr>
-            <a:lvl6pPr>
-              <a:defRPr sz="2000"/>
-            </a:lvl6pPr>
-            <a:lvl7pPr>
-              <a:defRPr sz="2000"/>
-            </a:lvl7pPr>
-            <a:lvl8pPr>
-              <a:defRPr sz="2000"/>
-            </a:lvl8pPr>
-            <a:lvl9pPr>
-              <a:defRPr sz="2000"/>
-            </a:lvl9pPr>
           </a:lstStyle>
           <a:p>
-            <a:pPr lvl="0"/>
-            <a:r>
-              <a:rPr lang="en-US"/>
-              <a:t>Click to edit Master text styles</a:t>
-            </a:r>
-          </a:p>
-          <a:p>
-            <a:pPr lvl="1"/>
-            <a:r>
-              <a:rPr lang="en-US"/>
-              <a:t>Second level</a:t>
-            </a:r>
-          </a:p>
-          <a:p>
-            <a:pPr lvl="2"/>
-            <a:r>
-              <a:rPr lang="en-US"/>
-              <a:t>Third level</a:t>
-            </a:r>
-          </a:p>
-          <a:p>
-            <a:pPr lvl="3"/>
-            <a:r>
-              <a:rPr lang="en-US"/>
-              <a:t>Fourth level</a:t>
-            </a:r>
-          </a:p>
-          <a:p>
-            <a:pPr lvl="4"/>
-            <a:r>
-              <a:rPr lang="en-US"/>
-              <a:t>Fifth level</a:t>
-            </a:r>
-          </a:p>
-        </p:txBody>
-      </p:sp>
-      <p:sp>
-        <p:nvSpPr>
-          <p:cNvPr id="4" name="Text Placeholder 3">
-            <a:extLst>
-              <a:ext uri="{FF2B5EF4-FFF2-40B4-BE49-F238E27FC236}">
-                <a16:creationId xmlns:a16="http://schemas.microsoft.com/office/drawing/2014/main" id="{2D38CBCE-102F-8EFF-7083-B6A4B3939CB1}"/>
-              </a:ext>
-            </a:extLst>
-          </p:cNvPr>
-          <p:cNvSpPr>
-            <a:spLocks noGrp="1"/>
-          </p:cNvSpPr>
-          <p:nvPr>
-            <p:ph type="body" sz="half" idx="2"/>
-          </p:nvPr>
-        </p:nvSpPr>
-        <p:spPr>
-          <a:xfrm>
-            <a:off x="839788" y="2057400"/>
-            <a:ext cx="3932237" cy="3811588"/>
-          </a:xfrm>
-        </p:spPr>
-        <p:txBody>
-          <a:bodyPr/>
-          <a:lstStyle>
-            <a:lvl1pPr marL="0" indent="0">
-              <a:buNone/>
-              <a:defRPr sz="1600"/>
-            </a:lvl1pPr>
-            <a:lvl2pPr marL="457200" indent="0">
-              <a:buNone/>
-              <a:defRPr sz="1400"/>
-            </a:lvl2pPr>
-            <a:lvl3pPr marL="914400" indent="0">
-              <a:buNone/>
-              <a:defRPr sz="1200"/>
-            </a:lvl3pPr>
-            <a:lvl4pPr marL="1371600" indent="0">
-              <a:buNone/>
-              <a:defRPr sz="1000"/>
-            </a:lvl4pPr>
-            <a:lvl5pPr marL="1828800" indent="0">
-              <a:buNone/>
-              <a:defRPr sz="1000"/>
-            </a:lvl5pPr>
-            <a:lvl6pPr marL="2286000" indent="0">
-              <a:buNone/>
-              <a:defRPr sz="1000"/>
-            </a:lvl6pPr>
-            <a:lvl7pPr marL="2743200" indent="0">
-              <a:buNone/>
-              <a:defRPr sz="1000"/>
-            </a:lvl7pPr>
-            <a:lvl8pPr marL="3200400" indent="0">
-              <a:buNone/>
-              <a:defRPr sz="1000"/>
-            </a:lvl8pPr>
-            <a:lvl9pPr marL="3657600" indent="0">
-              <a:buNone/>
-              <a:defRPr sz="1000"/>
-            </a:lvl9pPr>
-          </a:lstStyle>
-          <a:p>
-            <a:pPr lvl="0"/>
-            <a:r>
-              <a:rPr lang="en-US"/>
-              <a:t>Click to edit Master text styles</a:t>
-            </a:r>
-          </a:p>
-        </p:txBody>
-      </p:sp>
-      <p:sp>
-        <p:nvSpPr>
-          <p:cNvPr id="5" name="Date Placeholder 4">
-            <a:extLst>
-              <a:ext uri="{FF2B5EF4-FFF2-40B4-BE49-F238E27FC236}">
-                <a16:creationId xmlns:a16="http://schemas.microsoft.com/office/drawing/2014/main" id="{E00D0FD9-393A-1A0F-BD68-C32FB3D5CD38}"/>
-              </a:ext>
-            </a:extLst>
-          </p:cNvPr>
-          <p:cNvSpPr>
-            <a:spLocks noGrp="1"/>
-          </p:cNvSpPr>
-          <p:nvPr>
-            <p:ph type="dt" sz="half" idx="10"/>
-          </p:nvPr>
-        </p:nvSpPr>
-        <p:spPr/>
-        <p:txBody>
-          <a:bodyPr/>
-          <a:lstStyle/>
-          <a:p>
-            <a:fld id="{90053C86-C48F-3743-8746-2CA0384683DA}" type="datetimeFigureOut">
-              <a:rPr lang="en-US" smtClean="0"/>
-              <a:t>10/9/23</a:t>
-            </a:fld>
             <a:endParaRPr lang="en-US"/>
           </a:p>
         </p:txBody>
       </p:sp>
       <p:sp>
         <p:nvSpPr>
-          <p:cNvPr id="6" name="Footer Placeholder 5">
-            <a:extLst>
-              <a:ext uri="{FF2B5EF4-FFF2-40B4-BE49-F238E27FC236}">
-                <a16:creationId xmlns:a16="http://schemas.microsoft.com/office/drawing/2014/main" id="{1B52573C-558D-127F-86C1-8D14AD123023}"/>
-              </a:ext>
-            </a:extLst>
-          </p:cNvPr>
-          <p:cNvSpPr>
-            <a:spLocks noGrp="1"/>
-          </p:cNvSpPr>
-          <p:nvPr>
-            <p:ph type="ftr" sz="quarter" idx="11"/>
-          </p:nvPr>
-        </p:nvSpPr>
-        <p:spPr/>
-        <p:txBody>
-          <a:bodyPr/>
-          <a:lstStyle/>
-          <a:p>
-            <a:endParaRPr lang="en-US"/>
-          </a:p>
-        </p:txBody>
-      </p:sp>
-      <p:sp>
-        <p:nvSpPr>
-          <p:cNvPr id="7" name="Slide Number Placeholder 6">
-            <a:extLst>
-              <a:ext uri="{FF2B5EF4-FFF2-40B4-BE49-F238E27FC236}">
-                <a16:creationId xmlns:a16="http://schemas.microsoft.com/office/drawing/2014/main" id="{E7851560-322E-C0CF-9EB5-F99EC558A9F8}"/>
-              </a:ext>
-            </a:extLst>
-          </p:cNvPr>
+          <p:cNvPr id="11" name="Slide Number Placeholder 10"/>
           <p:cNvSpPr>
             <a:spLocks noGrp="1"/>
           </p:cNvSpPr>
@@ -2888,7 +2781,7 @@
     </p:spTree>
     <p:extLst>
       <p:ext uri="{BB962C8B-B14F-4D97-AF65-F5344CB8AC3E}">
-        <p14:creationId xmlns:p14="http://schemas.microsoft.com/office/powerpoint/2010/main" val="3528130977"/>
+        <p14:creationId xmlns:p14="http://schemas.microsoft.com/office/powerpoint/2010/main" val="2643694949"/>
       </p:ext>
     </p:extLst>
   </p:cSld>
@@ -2917,31 +2810,77 @@
       </p:grpSpPr>
       <p:sp>
         <p:nvSpPr>
-          <p:cNvPr id="2" name="Title 1">
-            <a:extLst>
-              <a:ext uri="{FF2B5EF4-FFF2-40B4-BE49-F238E27FC236}">
-                <a16:creationId xmlns:a16="http://schemas.microsoft.com/office/drawing/2014/main" id="{BEBA40CB-3DDE-9301-CECC-97664D0223A9}"/>
-              </a:ext>
-            </a:extLst>
-          </p:cNvPr>
-          <p:cNvSpPr>
-            <a:spLocks noGrp="1"/>
-          </p:cNvSpPr>
-          <p:nvPr>
-            <p:ph type="title"/>
-          </p:nvPr>
+          <p:cNvPr id="18" name="Rectangle 17"/>
+          <p:cNvSpPr/>
+          <p:nvPr/>
         </p:nvSpPr>
         <p:spPr>
           <a:xfrm>
-            <a:off x="839788" y="457200"/>
-            <a:ext cx="3932237" cy="1600200"/>
+            <a:off x="0" y="0"/>
+            <a:ext cx="6095999" cy="6858000"/>
           </a:xfrm>
+          <a:prstGeom prst="rect">
+            <a:avLst/>
+          </a:prstGeom>
+          <a:solidFill>
+            <a:schemeClr val="accent2"/>
+          </a:solidFill>
+          <a:ln>
+            <a:noFill/>
+          </a:ln>
         </p:spPr>
-        <p:txBody>
-          <a:bodyPr anchor="b"/>
+        <p:style>
+          <a:lnRef idx="2">
+            <a:schemeClr val="accent1">
+              <a:shade val="50000"/>
+            </a:schemeClr>
+          </a:lnRef>
+          <a:fillRef idx="1">
+            <a:schemeClr val="accent1"/>
+          </a:fillRef>
+          <a:effectRef idx="0">
+            <a:schemeClr val="accent1"/>
+          </a:effectRef>
+          <a:fontRef idx="minor">
+            <a:schemeClr val="lt1"/>
+          </a:fontRef>
+        </p:style>
+      </p:sp>
+      <p:sp>
+        <p:nvSpPr>
+          <p:cNvPr id="2" name="Title 1"/>
+          <p:cNvSpPr>
+            <a:spLocks noGrp="1"/>
+          </p:cNvSpPr>
+          <p:nvPr>
+            <p:ph type="title"/>
+          </p:nvPr>
+        </p:nvSpPr>
+        <p:spPr bwMode="blackWhite">
+          <a:xfrm>
+            <a:off x="808523" y="2243828"/>
+            <a:ext cx="4494998" cy="1134640"/>
+          </a:xfrm>
+          <a:solidFill>
+            <a:srgbClr val="FFFFFF"/>
+          </a:solidFill>
+          <a:ln>
+            <a:solidFill>
+              <a:srgbClr val="404040"/>
+            </a:solidFill>
+          </a:ln>
+        </p:spPr>
+        <p:txBody>
+          <a:bodyPr anchor="ctr" anchorCtr="1">
+            <a:noAutofit/>
+          </a:bodyPr>
           <a:lstStyle>
             <a:lvl1pPr>
-              <a:defRPr sz="3200"/>
+              <a:defRPr sz="2200">
+                <a:solidFill>
+                  <a:srgbClr val="262626"/>
+                </a:solidFill>
+              </a:defRPr>
             </a:lvl1pPr>
           </a:lstStyle>
           <a:p>
@@ -2949,20 +2888,15 @@
               <a:rPr lang="en-US"/>
               <a:t>Click to edit Master title style</a:t>
             </a:r>
-          </a:p>
-        </p:txBody>
-      </p:sp>
-      <p:sp>
-        <p:nvSpPr>
-          <p:cNvPr id="3" name="Picture Placeholder 2">
-            <a:extLst>
-              <a:ext uri="{FF2B5EF4-FFF2-40B4-BE49-F238E27FC236}">
-                <a16:creationId xmlns:a16="http://schemas.microsoft.com/office/drawing/2014/main" id="{87EEFA5C-558F-34D7-420C-4AF5433023F7}"/>
-              </a:ext>
-            </a:extLst>
-          </p:cNvPr>
-          <p:cNvSpPr>
-            <a:spLocks noGrp="1"/>
+            <a:endParaRPr lang="en-US" dirty="0"/>
+          </a:p>
+        </p:txBody>
+      </p:sp>
+      <p:sp>
+        <p:nvSpPr>
+          <p:cNvPr id="3" name="Picture Placeholder 2"/>
+          <p:cNvSpPr>
+            <a:spLocks noGrp="1" noChangeAspect="1"/>
           </p:cNvSpPr>
           <p:nvPr>
             <p:ph type="pic" idx="1"/>
@@ -2970,16 +2904,28 @@
         </p:nvSpPr>
         <p:spPr>
           <a:xfrm>
-            <a:off x="5183188" y="987425"/>
-            <a:ext cx="6172200" cy="4873625"/>
+            <a:off x="6095999" y="0"/>
+            <a:ext cx="6102097" cy="6858000"/>
           </a:xfrm>
+          <a:solidFill>
+            <a:schemeClr val="bg1">
+              <a:lumMod val="75000"/>
+            </a:schemeClr>
+          </a:solidFill>
         </p:spPr>
         <p:txBody>
-          <a:bodyPr/>
+          <a:bodyPr anchor="t"/>
           <a:lstStyle>
             <a:lvl1pPr marL="0" indent="0">
               <a:buNone/>
-              <a:defRPr sz="3200"/>
+              <a:defRPr sz="3200">
+                <a:solidFill>
+                  <a:schemeClr val="bg1">
+                    <a:lumMod val="85000"/>
+                    <a:lumOff val="15000"/>
+                  </a:schemeClr>
+                </a:solidFill>
+              </a:defRPr>
             </a:lvl1pPr>
             <a:lvl2pPr marL="457200" indent="0">
               <a:buNone/>
@@ -3015,19 +2961,17 @@
             </a:lvl9pPr>
           </a:lstStyle>
           <a:p>
-            <a:endParaRPr lang="en-US"/>
-          </a:p>
-        </p:txBody>
-      </p:sp>
-      <p:sp>
-        <p:nvSpPr>
-          <p:cNvPr id="4" name="Text Placeholder 3">
-            <a:extLst>
-              <a:ext uri="{FF2B5EF4-FFF2-40B4-BE49-F238E27FC236}">
-                <a16:creationId xmlns:a16="http://schemas.microsoft.com/office/drawing/2014/main" id="{1D93B4FC-2C4B-C606-6782-337075313CC7}"/>
-              </a:ext>
-            </a:extLst>
-          </p:cNvPr>
+            <a:r>
+              <a:rPr lang="en-US"/>
+              <a:t>Click icon to add picture</a:t>
+            </a:r>
+            <a:endParaRPr lang="en-US" dirty="0"/>
+          </a:p>
+        </p:txBody>
+      </p:sp>
+      <p:sp>
+        <p:nvSpPr>
+          <p:cNvPr id="4" name="Text Placeholder 3"/>
           <p:cNvSpPr>
             <a:spLocks noGrp="1"/>
           </p:cNvSpPr>
@@ -3037,16 +2981,22 @@
         </p:nvSpPr>
         <p:spPr>
           <a:xfrm>
-            <a:off x="839788" y="2057400"/>
-            <a:ext cx="3932237" cy="3811588"/>
+            <a:off x="1115568" y="3549918"/>
+            <a:ext cx="3794760" cy="2194037"/>
           </a:xfrm>
         </p:spPr>
         <p:txBody>
-          <a:bodyPr/>
+          <a:bodyPr anchor="t" anchorCtr="1">
+            <a:normAutofit/>
+          </a:bodyPr>
           <a:lstStyle>
-            <a:lvl1pPr marL="0" indent="0">
-              <a:buNone/>
-              <a:defRPr sz="1600"/>
+            <a:lvl1pPr marL="0" indent="0" algn="ctr">
+              <a:buNone/>
+              <a:defRPr sz="1500">
+                <a:solidFill>
+                  <a:srgbClr val="FFFFFF"/>
+                </a:solidFill>
+              </a:defRPr>
             </a:lvl1pPr>
             <a:lvl2pPr marL="457200" indent="0">
               <a:buNone/>
@@ -3092,13 +3042,7 @@
       </p:sp>
       <p:sp>
         <p:nvSpPr>
-          <p:cNvPr id="5" name="Date Placeholder 4">
-            <a:extLst>
-              <a:ext uri="{FF2B5EF4-FFF2-40B4-BE49-F238E27FC236}">
-                <a16:creationId xmlns:a16="http://schemas.microsoft.com/office/drawing/2014/main" id="{4E1D07B6-5596-CECC-F550-A41D64D05077}"/>
-              </a:ext>
-            </a:extLst>
-          </p:cNvPr>
+          <p:cNvPr id="8" name="Date Placeholder 7"/>
           <p:cNvSpPr>
             <a:spLocks noGrp="1"/>
           </p:cNvSpPr>
@@ -3109,11 +3053,26 @@
         <p:spPr/>
         <p:txBody>
           <a:bodyPr/>
-          <a:lstStyle/>
+          <a:lstStyle>
+            <a:lvl1pPr>
+              <a:defRPr>
+                <a:solidFill>
+                  <a:srgbClr val="FFFFFF"/>
+                </a:solidFill>
+                <a:effectLst>
+                  <a:outerShdw blurRad="50800" dist="38100" dir="2700000" algn="tl" rotWithShape="0">
+                    <a:prstClr val="black">
+                      <a:alpha val="43000"/>
+                    </a:prstClr>
+                  </a:outerShdw>
+                </a:effectLst>
+              </a:defRPr>
+            </a:lvl1pPr>
+          </a:lstStyle>
           <a:p>
             <a:fld id="{90053C86-C48F-3743-8746-2CA0384683DA}" type="datetimeFigureOut">
               <a:rPr lang="en-US" smtClean="0"/>
-              <a:t>10/9/23</a:t>
+              <a:t>10/10/23</a:t>
             </a:fld>
             <a:endParaRPr lang="en-US"/>
           </a:p>
@@ -3121,13 +3080,7 @@
       </p:sp>
       <p:sp>
         <p:nvSpPr>
-          <p:cNvPr id="6" name="Footer Placeholder 5">
-            <a:extLst>
-              <a:ext uri="{FF2B5EF4-FFF2-40B4-BE49-F238E27FC236}">
-                <a16:creationId xmlns:a16="http://schemas.microsoft.com/office/drawing/2014/main" id="{F71D8A4D-CDE8-1091-4D64-C8495C2057F4}"/>
-              </a:ext>
-            </a:extLst>
-          </p:cNvPr>
+          <p:cNvPr id="9" name="Footer Placeholder 8"/>
           <p:cNvSpPr>
             <a:spLocks noGrp="1"/>
           </p:cNvSpPr>
@@ -3135,24 +3088,33 @@
             <p:ph type="ftr" sz="quarter" idx="11"/>
           </p:nvPr>
         </p:nvSpPr>
-        <p:spPr/>
+        <p:spPr>
+          <a:xfrm>
+            <a:off x="804672" y="6236208"/>
+            <a:ext cx="5124797" cy="320040"/>
+          </a:xfrm>
+        </p:spPr>
         <p:txBody>
           <a:bodyPr/>
-          <a:lstStyle/>
-          <a:p>
-            <a:endParaRPr lang="en-US"/>
-          </a:p>
-        </p:txBody>
-      </p:sp>
-      <p:sp>
-        <p:nvSpPr>
-          <p:cNvPr id="7" name="Slide Number Placeholder 6">
-            <a:extLst>
-              <a:ext uri="{FF2B5EF4-FFF2-40B4-BE49-F238E27FC236}">
-                <a16:creationId xmlns:a16="http://schemas.microsoft.com/office/drawing/2014/main" id="{F0552100-17D6-238F-126B-F961AF3EFF56}"/>
-              </a:ext>
-            </a:extLst>
-          </p:cNvPr>
+          <a:lstStyle>
+            <a:lvl1pPr>
+              <a:defRPr>
+                <a:solidFill>
+                  <a:srgbClr val="FFFFFF">
+                    <a:alpha val="70000"/>
+                  </a:srgbClr>
+                </a:solidFill>
+              </a:defRPr>
+            </a:lvl1pPr>
+          </a:lstStyle>
+          <a:p>
+            <a:endParaRPr lang="en-US" dirty="0"/>
+          </a:p>
+        </p:txBody>
+      </p:sp>
+      <p:sp>
+        <p:nvSpPr>
+          <p:cNvPr id="10" name="Slide Number Placeholder 9"/>
           <p:cNvSpPr>
             <a:spLocks noGrp="1"/>
           </p:cNvSpPr>
@@ -3176,7 +3138,7 @@
     </p:spTree>
     <p:extLst>
       <p:ext uri="{BB962C8B-B14F-4D97-AF65-F5344CB8AC3E}">
-        <p14:creationId xmlns:p14="http://schemas.microsoft.com/office/powerpoint/2010/main" val="1505408664"/>
+        <p14:creationId xmlns:p14="http://schemas.microsoft.com/office/powerpoint/2010/main" val="3438400897"/>
       </p:ext>
     </p:extLst>
   </p:cSld>
@@ -3190,9 +3152,14 @@
 <p:sldMaster xmlns:a="http://schemas.openxmlformats.org/drawingml/2006/main" xmlns:r="http://schemas.openxmlformats.org/officeDocument/2006/relationships" xmlns:p="http://schemas.openxmlformats.org/presentationml/2006/main">
   <p:cSld>
     <p:bg>
-      <p:bgRef idx="1001">
-        <a:schemeClr val="bg1"/>
-      </p:bgRef>
+      <p:bgPr>
+        <a:solidFill>
+          <a:schemeClr val="bg1">
+            <a:lumMod val="95000"/>
+          </a:schemeClr>
+        </a:solidFill>
+        <a:effectLst/>
+      </p:bgPr>
     </p:bg>
     <p:spTree>
       <p:nvGrpSpPr>
@@ -3210,129 +3177,163 @@
       </p:grpSpPr>
       <p:sp>
         <p:nvSpPr>
-          <p:cNvPr id="2" name="Title Placeholder 1">
-            <a:extLst>
-              <a:ext uri="{FF2B5EF4-FFF2-40B4-BE49-F238E27FC236}">
-                <a16:creationId xmlns:a16="http://schemas.microsoft.com/office/drawing/2014/main" id="{96F2F902-4D11-292B-AED7-71E1796DA761}"/>
-              </a:ext>
-            </a:extLst>
-          </p:cNvPr>
+          <p:cNvPr id="2" name="Title Placeholder 1"/>
           <p:cNvSpPr>
             <a:spLocks noGrp="1"/>
           </p:cNvSpPr>
           <p:nvPr>
             <p:ph type="title"/>
+          </p:nvPr>
+        </p:nvSpPr>
+        <p:spPr bwMode="black">
+          <a:xfrm>
+            <a:off x="2231136" y="964692"/>
+            <a:ext cx="7729728" cy="1188720"/>
+          </a:xfrm>
+          <a:prstGeom prst="rect">
+            <a:avLst/>
+          </a:prstGeom>
+          <a:solidFill>
+            <a:srgbClr val="FFFFFF"/>
+          </a:solidFill>
+          <a:ln w="31750" cap="sq">
+            <a:solidFill>
+              <a:srgbClr val="404040"/>
+            </a:solidFill>
+            <a:miter lim="800000"/>
+          </a:ln>
+        </p:spPr>
+        <p:txBody>
+          <a:bodyPr vert="horz" lIns="182880" tIns="182880" rIns="182880" bIns="182880" rtlCol="0" anchor="ctr">
+            <a:normAutofit/>
+          </a:bodyPr>
+          <a:lstStyle/>
+          <a:p>
+            <a:r>
+              <a:rPr lang="en-US"/>
+              <a:t>Click to edit Master title style</a:t>
+            </a:r>
+            <a:endParaRPr lang="en-US" dirty="0"/>
+          </a:p>
+        </p:txBody>
+      </p:sp>
+      <p:sp>
+        <p:nvSpPr>
+          <p:cNvPr id="3" name="Text Placeholder 2"/>
+          <p:cNvSpPr>
+            <a:spLocks noGrp="1"/>
+          </p:cNvSpPr>
+          <p:nvPr>
+            <p:ph type="body" idx="1"/>
           </p:nvPr>
         </p:nvSpPr>
         <p:spPr>
           <a:xfrm>
-            <a:off x="838200" y="365125"/>
-            <a:ext cx="10515600" cy="1325563"/>
+            <a:off x="2231136" y="2638044"/>
+            <a:ext cx="7729728" cy="3101983"/>
           </a:xfrm>
           <a:prstGeom prst="rect">
             <a:avLst/>
           </a:prstGeom>
         </p:spPr>
         <p:txBody>
-          <a:bodyPr vert="horz" lIns="91440" tIns="45720" rIns="91440" bIns="45720" rtlCol="0" anchor="ctr">
+          <a:bodyPr vert="horz" lIns="91440" tIns="45720" rIns="91440" bIns="45720" rtlCol="0">
             <a:normAutofit/>
           </a:bodyPr>
           <a:lstStyle/>
           <a:p>
-            <a:r>
-              <a:rPr lang="en-US"/>
-              <a:t>Click to edit Master title style</a:t>
-            </a:r>
-          </a:p>
-        </p:txBody>
-      </p:sp>
-      <p:sp>
-        <p:nvSpPr>
-          <p:cNvPr id="3" name="Text Placeholder 2">
-            <a:extLst>
-              <a:ext uri="{FF2B5EF4-FFF2-40B4-BE49-F238E27FC236}">
-                <a16:creationId xmlns:a16="http://schemas.microsoft.com/office/drawing/2014/main" id="{1521729E-B035-B863-64F6-AE82DC247599}"/>
-              </a:ext>
-            </a:extLst>
-          </p:cNvPr>
-          <p:cNvSpPr>
-            <a:spLocks noGrp="1"/>
-          </p:cNvSpPr>
-          <p:nvPr>
-            <p:ph type="body" idx="1"/>
+            <a:pPr lvl="0"/>
+            <a:r>
+              <a:rPr lang="en-US"/>
+              <a:t>Click to edit Master text styles</a:t>
+            </a:r>
+          </a:p>
+          <a:p>
+            <a:pPr lvl="1"/>
+            <a:r>
+              <a:rPr lang="en-US"/>
+              <a:t>Second level</a:t>
+            </a:r>
+          </a:p>
+          <a:p>
+            <a:pPr lvl="2"/>
+            <a:r>
+              <a:rPr lang="en-US"/>
+              <a:t>Third level</a:t>
+            </a:r>
+          </a:p>
+          <a:p>
+            <a:pPr lvl="3"/>
+            <a:r>
+              <a:rPr lang="en-US"/>
+              <a:t>Fourth level</a:t>
+            </a:r>
+          </a:p>
+          <a:p>
+            <a:pPr lvl="4"/>
+            <a:r>
+              <a:rPr lang="en-US"/>
+              <a:t>Fifth level</a:t>
+            </a:r>
+            <a:endParaRPr lang="en-US" dirty="0"/>
+          </a:p>
+        </p:txBody>
+      </p:sp>
+      <p:sp>
+        <p:nvSpPr>
+          <p:cNvPr id="4" name="Date Placeholder 3"/>
+          <p:cNvSpPr>
+            <a:spLocks noGrp="1"/>
+          </p:cNvSpPr>
+          <p:nvPr>
+            <p:ph type="dt" sz="half" idx="2"/>
           </p:nvPr>
         </p:nvSpPr>
         <p:spPr>
           <a:xfrm>
-            <a:off x="838200" y="1825625"/>
-            <a:ext cx="10515600" cy="4351338"/>
+            <a:off x="7821429" y="6238816"/>
+            <a:ext cx="2753746" cy="323968"/>
           </a:xfrm>
           <a:prstGeom prst="rect">
             <a:avLst/>
           </a:prstGeom>
         </p:spPr>
         <p:txBody>
-          <a:bodyPr vert="horz" lIns="91440" tIns="45720" rIns="91440" bIns="45720" rtlCol="0">
-            <a:normAutofit/>
-          </a:bodyPr>
-          <a:lstStyle/>
-          <a:p>
-            <a:pPr lvl="0"/>
-            <a:r>
-              <a:rPr lang="en-US"/>
-              <a:t>Click to edit Master text styles</a:t>
-            </a:r>
-          </a:p>
-          <a:p>
-            <a:pPr lvl="1"/>
-            <a:r>
-              <a:rPr lang="en-US"/>
-              <a:t>Second level</a:t>
-            </a:r>
-          </a:p>
-          <a:p>
-            <a:pPr lvl="2"/>
-            <a:r>
-              <a:rPr lang="en-US"/>
-              <a:t>Third level</a:t>
-            </a:r>
-          </a:p>
-          <a:p>
-            <a:pPr lvl="3"/>
-            <a:r>
-              <a:rPr lang="en-US"/>
-              <a:t>Fourth level</a:t>
-            </a:r>
-          </a:p>
-          <a:p>
-            <a:pPr lvl="4"/>
-            <a:r>
-              <a:rPr lang="en-US"/>
-              <a:t>Fifth level</a:t>
-            </a:r>
-          </a:p>
-        </p:txBody>
-      </p:sp>
-      <p:sp>
-        <p:nvSpPr>
-          <p:cNvPr id="4" name="Date Placeholder 3">
-            <a:extLst>
-              <a:ext uri="{FF2B5EF4-FFF2-40B4-BE49-F238E27FC236}">
-                <a16:creationId xmlns:a16="http://schemas.microsoft.com/office/drawing/2014/main" id="{05787956-2F0E-2502-ACF8-EAC7CBC696A4}"/>
-              </a:ext>
-            </a:extLst>
-          </p:cNvPr>
-          <p:cNvSpPr>
-            <a:spLocks noGrp="1"/>
-          </p:cNvSpPr>
-          <p:nvPr>
-            <p:ph type="dt" sz="half" idx="2"/>
+          <a:bodyPr vert="horz" lIns="91440" tIns="45720" rIns="91440" bIns="45720" rtlCol="0" anchor="ctr"/>
+          <a:lstStyle>
+            <a:lvl1pPr algn="r">
+              <a:defRPr sz="1050">
+                <a:solidFill>
+                  <a:schemeClr val="tx1">
+                    <a:alpha val="70000"/>
+                  </a:schemeClr>
+                </a:solidFill>
+              </a:defRPr>
+            </a:lvl1pPr>
+          </a:lstStyle>
+          <a:p>
+            <a:fld id="{90053C86-C48F-3743-8746-2CA0384683DA}" type="datetimeFigureOut">
+              <a:rPr lang="en-US" smtClean="0"/>
+              <a:t>10/10/23</a:t>
+            </a:fld>
+            <a:endParaRPr lang="en-US"/>
+          </a:p>
+        </p:txBody>
+      </p:sp>
+      <p:sp>
+        <p:nvSpPr>
+          <p:cNvPr id="5" name="Footer Placeholder 4"/>
+          <p:cNvSpPr>
+            <a:spLocks noGrp="1"/>
+          </p:cNvSpPr>
+          <p:nvPr>
+            <p:ph type="ftr" sz="quarter" idx="3"/>
           </p:nvPr>
         </p:nvSpPr>
         <p:spPr>
           <a:xfrm>
-            <a:off x="838200" y="6356350"/>
-            <a:ext cx="2743200" cy="365125"/>
+            <a:off x="1600200" y="6236208"/>
+            <a:ext cx="5901189" cy="320040"/>
           </a:xfrm>
           <a:prstGeom prst="rect">
             <a:avLst/>
@@ -3342,101 +3343,53 @@
           <a:bodyPr vert="horz" lIns="91440" tIns="45720" rIns="91440" bIns="45720" rtlCol="0" anchor="ctr"/>
           <a:lstStyle>
             <a:lvl1pPr algn="l">
-              <a:defRPr sz="1200">
+              <a:defRPr sz="1050">
                 <a:solidFill>
                   <a:schemeClr val="tx1">
-                    <a:tint val="75000"/>
+                    <a:alpha val="70000"/>
                   </a:schemeClr>
                 </a:solidFill>
               </a:defRPr>
             </a:lvl1pPr>
           </a:lstStyle>
           <a:p>
-            <a:fld id="{90053C86-C48F-3743-8746-2CA0384683DA}" type="datetimeFigureOut">
-              <a:rPr lang="en-US" smtClean="0"/>
-              <a:t>10/9/23</a:t>
-            </a:fld>
             <a:endParaRPr lang="en-US"/>
           </a:p>
         </p:txBody>
       </p:sp>
       <p:sp>
         <p:nvSpPr>
-          <p:cNvPr id="5" name="Footer Placeholder 4">
-            <a:extLst>
-              <a:ext uri="{FF2B5EF4-FFF2-40B4-BE49-F238E27FC236}">
-                <a16:creationId xmlns:a16="http://schemas.microsoft.com/office/drawing/2014/main" id="{9F53B9B7-049A-B57D-E4F5-F1965C23B1DA}"/>
-              </a:ext>
-            </a:extLst>
-          </p:cNvPr>
-          <p:cNvSpPr>
-            <a:spLocks noGrp="1"/>
-          </p:cNvSpPr>
-          <p:nvPr>
-            <p:ph type="ftr" sz="quarter" idx="3"/>
+          <p:cNvPr id="6" name="Slide Number Placeholder 5"/>
+          <p:cNvSpPr>
+            <a:spLocks noGrp="1"/>
+          </p:cNvSpPr>
+          <p:nvPr>
+            <p:ph type="sldNum" sz="quarter" idx="4"/>
           </p:nvPr>
         </p:nvSpPr>
         <p:spPr>
           <a:xfrm>
-            <a:off x="4038600" y="6356350"/>
-            <a:ext cx="4114800" cy="365125"/>
+            <a:off x="10758922" y="6217920"/>
+            <a:ext cx="365760" cy="365760"/>
           </a:xfrm>
-          <a:prstGeom prst="rect">
+          <a:prstGeom prst="ellipse">
             <a:avLst/>
           </a:prstGeom>
+          <a:solidFill>
+            <a:srgbClr val="1D1D1D">
+              <a:alpha val="70000"/>
+            </a:srgbClr>
+          </a:solidFill>
         </p:spPr>
         <p:txBody>
-          <a:bodyPr vert="horz" lIns="91440" tIns="45720" rIns="91440" bIns="45720" rtlCol="0" anchor="ctr"/>
+          <a:bodyPr vert="horz" lIns="18288" tIns="45720" rIns="18288" bIns="45720" rtlCol="0" anchor="ctr">
+            <a:noAutofit/>
+          </a:bodyPr>
           <a:lstStyle>
             <a:lvl1pPr algn="ctr">
-              <a:defRPr sz="1200">
+              <a:defRPr sz="1100" spc="0" baseline="0">
                 <a:solidFill>
-                  <a:schemeClr val="tx1">
-                    <a:tint val="75000"/>
-                  </a:schemeClr>
-                </a:solidFill>
-              </a:defRPr>
-            </a:lvl1pPr>
-          </a:lstStyle>
-          <a:p>
-            <a:endParaRPr lang="en-US"/>
-          </a:p>
-        </p:txBody>
-      </p:sp>
-      <p:sp>
-        <p:nvSpPr>
-          <p:cNvPr id="6" name="Slide Number Placeholder 5">
-            <a:extLst>
-              <a:ext uri="{FF2B5EF4-FFF2-40B4-BE49-F238E27FC236}">
-                <a16:creationId xmlns:a16="http://schemas.microsoft.com/office/drawing/2014/main" id="{99C2F5C5-4898-81EE-B72F-645265126D07}"/>
-              </a:ext>
-            </a:extLst>
-          </p:cNvPr>
-          <p:cNvSpPr>
-            <a:spLocks noGrp="1"/>
-          </p:cNvSpPr>
-          <p:nvPr>
-            <p:ph type="sldNum" sz="quarter" idx="4"/>
-          </p:nvPr>
-        </p:nvSpPr>
-        <p:spPr>
-          <a:xfrm>
-            <a:off x="8610600" y="6356350"/>
-            <a:ext cx="2743200" cy="365125"/>
-          </a:xfrm>
-          <a:prstGeom prst="rect">
-            <a:avLst/>
-          </a:prstGeom>
-        </p:spPr>
-        <p:txBody>
-          <a:bodyPr vert="horz" lIns="91440" tIns="45720" rIns="91440" bIns="45720" rtlCol="0" anchor="ctr"/>
-          <a:lstStyle>
-            <a:lvl1pPr algn="r">
-              <a:defRPr sz="1200">
-                <a:solidFill>
-                  <a:schemeClr val="tx1">
-                    <a:tint val="75000"/>
-                  </a:schemeClr>
+                  <a:srgbClr val="FFFFFF"/>
                 </a:solidFill>
               </a:defRPr>
             </a:lvl1pPr>
@@ -3453,27 +3406,27 @@
     </p:spTree>
     <p:extLst>
       <p:ext uri="{BB962C8B-B14F-4D97-AF65-F5344CB8AC3E}">
-        <p14:creationId xmlns:p14="http://schemas.microsoft.com/office/powerpoint/2010/main" val="1304002903"/>
+        <p14:creationId xmlns:p14="http://schemas.microsoft.com/office/powerpoint/2010/main" val="2364780458"/>
       </p:ext>
     </p:extLst>
   </p:cSld>
   <p:clrMap bg1="lt1" tx1="dk1" bg2="lt2" tx2="dk2" accent1="accent1" accent2="accent2" accent3="accent3" accent4="accent4" accent5="accent5" accent6="accent6" hlink="hlink" folHlink="folHlink"/>
   <p:sldLayoutIdLst>
-    <p:sldLayoutId id="2147483649" r:id="rId1"/>
-    <p:sldLayoutId id="2147483650" r:id="rId2"/>
-    <p:sldLayoutId id="2147483651" r:id="rId3"/>
-    <p:sldLayoutId id="2147483652" r:id="rId4"/>
-    <p:sldLayoutId id="2147483653" r:id="rId5"/>
-    <p:sldLayoutId id="2147483654" r:id="rId6"/>
-    <p:sldLayoutId id="2147483655" r:id="rId7"/>
-    <p:sldLayoutId id="2147483656" r:id="rId8"/>
-    <p:sldLayoutId id="2147483657" r:id="rId9"/>
-    <p:sldLayoutId id="2147483658" r:id="rId10"/>
-    <p:sldLayoutId id="2147483659" r:id="rId11"/>
+    <p:sldLayoutId id="2147483721" r:id="rId1"/>
+    <p:sldLayoutId id="2147483722" r:id="rId2"/>
+    <p:sldLayoutId id="2147483723" r:id="rId3"/>
+    <p:sldLayoutId id="2147483724" r:id="rId4"/>
+    <p:sldLayoutId id="2147483725" r:id="rId5"/>
+    <p:sldLayoutId id="2147483726" r:id="rId6"/>
+    <p:sldLayoutId id="2147483727" r:id="rId7"/>
+    <p:sldLayoutId id="2147483728" r:id="rId8"/>
+    <p:sldLayoutId id="2147483729" r:id="rId9"/>
+    <p:sldLayoutId id="2147483730" r:id="rId10"/>
+    <p:sldLayoutId id="2147483731" r:id="rId11"/>
   </p:sldLayoutIdLst>
   <p:txStyles>
     <p:titleStyle>
-      <a:lvl1pPr algn="l" defTabSz="914400" rtl="0" eaLnBrk="1" latinLnBrk="0" hangingPunct="1">
+      <a:lvl1pPr algn="ctr" defTabSz="914400" rtl="0" eaLnBrk="1" latinLnBrk="0" hangingPunct="1">
         <a:lnSpc>
           <a:spcPct val="90000"/>
         </a:lnSpc>
@@ -3481,9 +3434,9 @@
           <a:spcPct val="0"/>
         </a:spcBef>
         <a:buNone/>
-        <a:defRPr sz="4400" kern="1200">
+        <a:defRPr sz="2800" kern="1200" cap="all" spc="200" baseline="0">
           <a:solidFill>
-            <a:schemeClr val="tx1"/>
+            <a:srgbClr val="262626"/>
           </a:solidFill>
           <a:latin typeface="+mj-lt"/>
           <a:ea typeface="+mj-ea"/>
@@ -3494,104 +3447,137 @@
     <p:bodyStyle>
       <a:lvl1pPr marL="228600" indent="-228600" algn="l" defTabSz="914400" rtl="0" eaLnBrk="1" latinLnBrk="0" hangingPunct="1">
         <a:lnSpc>
-          <a:spcPct val="90000"/>
+          <a:spcPct val="100000"/>
         </a:lnSpc>
         <a:spcBef>
           <a:spcPts val="1000"/>
         </a:spcBef>
+        <a:buClr>
+          <a:schemeClr val="accent2"/>
+        </a:buClr>
         <a:buFont typeface="Arial" panose="020B0604020202020204" pitchFamily="34" charset="0"/>
         <a:buChar char="•"/>
-        <a:defRPr sz="2800" kern="1200">
+        <a:defRPr sz="1800" kern="1200">
           <a:solidFill>
-            <a:schemeClr val="tx1"/>
+            <a:schemeClr val="tx1">
+              <a:lumMod val="85000"/>
+              <a:lumOff val="15000"/>
+            </a:schemeClr>
           </a:solidFill>
           <a:latin typeface="+mn-lt"/>
           <a:ea typeface="+mn-ea"/>
           <a:cs typeface="+mn-cs"/>
         </a:defRPr>
       </a:lvl1pPr>
-      <a:lvl2pPr marL="685800" indent="-228600" algn="l" defTabSz="914400" rtl="0" eaLnBrk="1" latinLnBrk="0" hangingPunct="1">
+      <a:lvl2pPr marL="457200" indent="-228600" algn="l" defTabSz="914400" rtl="0" eaLnBrk="1" latinLnBrk="0" hangingPunct="1">
         <a:lnSpc>
-          <a:spcPct val="90000"/>
+          <a:spcPct val="100000"/>
         </a:lnSpc>
         <a:spcBef>
-          <a:spcPts val="500"/>
+          <a:spcPts val="1000"/>
         </a:spcBef>
+        <a:buClr>
+          <a:schemeClr val="accent2"/>
+        </a:buClr>
         <a:buFont typeface="Arial" panose="020B0604020202020204" pitchFamily="34" charset="0"/>
         <a:buChar char="•"/>
-        <a:defRPr sz="2400" kern="1200">
+        <a:defRPr sz="1600" kern="1200">
           <a:solidFill>
-            <a:schemeClr val="tx1"/>
+            <a:schemeClr val="tx1">
+              <a:lumMod val="85000"/>
+              <a:lumOff val="15000"/>
+            </a:schemeClr>
           </a:solidFill>
           <a:latin typeface="+mn-lt"/>
           <a:ea typeface="+mn-ea"/>
           <a:cs typeface="+mn-cs"/>
         </a:defRPr>
       </a:lvl2pPr>
-      <a:lvl3pPr marL="1143000" indent="-228600" algn="l" defTabSz="914400" rtl="0" eaLnBrk="1" latinLnBrk="0" hangingPunct="1">
+      <a:lvl3pPr marL="685800" indent="-228600" algn="l" defTabSz="914400" rtl="0" eaLnBrk="1" latinLnBrk="0" hangingPunct="1">
         <a:lnSpc>
-          <a:spcPct val="90000"/>
+          <a:spcPct val="100000"/>
         </a:lnSpc>
         <a:spcBef>
-          <a:spcPts val="500"/>
+          <a:spcPts val="1000"/>
         </a:spcBef>
+        <a:buClr>
+          <a:schemeClr val="accent2"/>
+        </a:buClr>
         <a:buFont typeface="Arial" panose="020B0604020202020204" pitchFamily="34" charset="0"/>
         <a:buChar char="•"/>
-        <a:defRPr sz="2000" kern="1200">
+        <a:defRPr sz="1600" kern="1200">
           <a:solidFill>
-            <a:schemeClr val="tx1"/>
+            <a:schemeClr val="tx1">
+              <a:lumMod val="85000"/>
+              <a:lumOff val="15000"/>
+            </a:schemeClr>
           </a:solidFill>
           <a:latin typeface="+mn-lt"/>
           <a:ea typeface="+mn-ea"/>
           <a:cs typeface="+mn-cs"/>
         </a:defRPr>
       </a:lvl3pPr>
-      <a:lvl4pPr marL="1600200" indent="-228600" algn="l" defTabSz="914400" rtl="0" eaLnBrk="1" latinLnBrk="0" hangingPunct="1">
+      <a:lvl4pPr marL="914400" indent="-228600" algn="l" defTabSz="914400" rtl="0" eaLnBrk="1" latinLnBrk="0" hangingPunct="1">
         <a:lnSpc>
-          <a:spcPct val="90000"/>
+          <a:spcPct val="100000"/>
         </a:lnSpc>
         <a:spcBef>
-          <a:spcPts val="500"/>
+          <a:spcPts val="1000"/>
         </a:spcBef>
+        <a:buClr>
+          <a:schemeClr val="accent2"/>
+        </a:buClr>
         <a:buFont typeface="Arial" panose="020B0604020202020204" pitchFamily="34" charset="0"/>
         <a:buChar char="•"/>
-        <a:defRPr sz="1800" kern="1200">
+        <a:defRPr sz="1600" kern="1200">
           <a:solidFill>
-            <a:schemeClr val="tx1"/>
+            <a:schemeClr val="tx1">
+              <a:lumMod val="85000"/>
+              <a:lumOff val="15000"/>
+            </a:schemeClr>
           </a:solidFill>
           <a:latin typeface="+mn-lt"/>
           <a:ea typeface="+mn-ea"/>
           <a:cs typeface="+mn-cs"/>
         </a:defRPr>
       </a:lvl4pPr>
-      <a:lvl5pPr marL="2057400" indent="-228600" algn="l" defTabSz="914400" rtl="0" eaLnBrk="1" latinLnBrk="0" hangingPunct="1">
+      <a:lvl5pPr marL="1143000" indent="-228600" algn="l" defTabSz="914400" rtl="0" eaLnBrk="1" latinLnBrk="0" hangingPunct="1">
         <a:lnSpc>
-          <a:spcPct val="90000"/>
+          <a:spcPct val="100000"/>
         </a:lnSpc>
         <a:spcBef>
-          <a:spcPts val="500"/>
+          <a:spcPts val="1000"/>
         </a:spcBef>
+        <a:buClr>
+          <a:schemeClr val="accent2"/>
+        </a:buClr>
         <a:buFont typeface="Arial" panose="020B0604020202020204" pitchFamily="34" charset="0"/>
         <a:buChar char="•"/>
-        <a:defRPr sz="1800" kern="1200">
+        <a:defRPr sz="1600" kern="1200">
           <a:solidFill>
-            <a:schemeClr val="tx1"/>
+            <a:schemeClr val="tx1">
+              <a:lumMod val="85000"/>
+              <a:lumOff val="15000"/>
+            </a:schemeClr>
           </a:solidFill>
           <a:latin typeface="+mn-lt"/>
           <a:ea typeface="+mn-ea"/>
           <a:cs typeface="+mn-cs"/>
         </a:defRPr>
       </a:lvl5pPr>
-      <a:lvl6pPr marL="2514600" indent="-228600" algn="l" defTabSz="914400" rtl="0" eaLnBrk="1" latinLnBrk="0" hangingPunct="1">
+      <a:lvl6pPr marL="1312863" indent="-228600" algn="l" defTabSz="914400" rtl="0" eaLnBrk="1" latinLnBrk="0" hangingPunct="1">
         <a:lnSpc>
-          <a:spcPct val="90000"/>
+          <a:spcPct val="100000"/>
         </a:lnSpc>
         <a:spcBef>
-          <a:spcPts val="500"/>
+          <a:spcPts val="1000"/>
         </a:spcBef>
+        <a:buClr>
+          <a:schemeClr val="accent2"/>
+        </a:buClr>
         <a:buFont typeface="Arial" panose="020B0604020202020204" pitchFamily="34" charset="0"/>
         <a:buChar char="•"/>
-        <a:defRPr sz="1800" kern="1200">
+        <a:defRPr sz="1600" kern="1200">
           <a:solidFill>
             <a:schemeClr val="tx1"/>
           </a:solidFill>
@@ -3600,16 +3586,19 @@
           <a:cs typeface="+mn-cs"/>
         </a:defRPr>
       </a:lvl6pPr>
-      <a:lvl7pPr marL="2971800" indent="-228600" algn="l" defTabSz="914400" rtl="0" eaLnBrk="1" latinLnBrk="0" hangingPunct="1">
+      <a:lvl7pPr marL="1484313" indent="-228600" algn="l" defTabSz="914400" rtl="0" eaLnBrk="1" latinLnBrk="0" hangingPunct="1">
         <a:lnSpc>
-          <a:spcPct val="90000"/>
+          <a:spcPct val="100000"/>
         </a:lnSpc>
         <a:spcBef>
-          <a:spcPts val="500"/>
+          <a:spcPts val="1000"/>
         </a:spcBef>
+        <a:buClr>
+          <a:schemeClr val="accent2"/>
+        </a:buClr>
         <a:buFont typeface="Arial" panose="020B0604020202020204" pitchFamily="34" charset="0"/>
         <a:buChar char="•"/>
-        <a:defRPr sz="1800" kern="1200">
+        <a:defRPr sz="1600" kern="1200">
           <a:solidFill>
             <a:schemeClr val="tx1"/>
           </a:solidFill>
@@ -3618,16 +3607,19 @@
           <a:cs typeface="+mn-cs"/>
         </a:defRPr>
       </a:lvl7pPr>
-      <a:lvl8pPr marL="3429000" indent="-228600" algn="l" defTabSz="914400" rtl="0" eaLnBrk="1" latinLnBrk="0" hangingPunct="1">
+      <a:lvl8pPr marL="1657350" indent="-228600" algn="l" defTabSz="914400" rtl="0" eaLnBrk="1" latinLnBrk="0" hangingPunct="1">
         <a:lnSpc>
-          <a:spcPct val="90000"/>
+          <a:spcPct val="100000"/>
         </a:lnSpc>
         <a:spcBef>
-          <a:spcPts val="500"/>
+          <a:spcPts val="1000"/>
         </a:spcBef>
+        <a:buClr>
+          <a:schemeClr val="accent2"/>
+        </a:buClr>
         <a:buFont typeface="Arial" panose="020B0604020202020204" pitchFamily="34" charset="0"/>
         <a:buChar char="•"/>
-        <a:defRPr sz="1800" kern="1200">
+        <a:defRPr sz="1600" kern="1200" baseline="0">
           <a:solidFill>
             <a:schemeClr val="tx1"/>
           </a:solidFill>
@@ -3636,16 +3628,19 @@
           <a:cs typeface="+mn-cs"/>
         </a:defRPr>
       </a:lvl8pPr>
-      <a:lvl9pPr marL="3886200" indent="-228600" algn="l" defTabSz="914400" rtl="0" eaLnBrk="1" latinLnBrk="0" hangingPunct="1">
+      <a:lvl9pPr marL="1882775" indent="-228600" algn="l" defTabSz="914400" rtl="0" eaLnBrk="1" latinLnBrk="0" hangingPunct="1">
         <a:lnSpc>
-          <a:spcPct val="90000"/>
+          <a:spcPct val="100000"/>
         </a:lnSpc>
         <a:spcBef>
-          <a:spcPts val="500"/>
+          <a:spcPts val="1000"/>
         </a:spcBef>
+        <a:buClr>
+          <a:schemeClr val="accent2"/>
+        </a:buClr>
         <a:buFont typeface="Arial" panose="020B0604020202020204" pitchFamily="34" charset="0"/>
         <a:buChar char="•"/>
-        <a:defRPr sz="1800" kern="1200">
+        <a:defRPr sz="1600" kern="1200" baseline="0">
           <a:solidFill>
             <a:schemeClr val="tx1"/>
           </a:solidFill>
@@ -3773,6 +3768,66 @@
       </p:grpSpPr>
       <p:sp>
         <p:nvSpPr>
+          <p:cNvPr id="4" name="Title 1">
+            <a:extLst>
+              <a:ext uri="{FF2B5EF4-FFF2-40B4-BE49-F238E27FC236}">
+                <a16:creationId xmlns:a16="http://schemas.microsoft.com/office/drawing/2014/main" id="{5E306B65-B80B-FBB3-3F2E-55E9C64C7F68}"/>
+              </a:ext>
+            </a:extLst>
+          </p:cNvPr>
+          <p:cNvSpPr txBox="1">
+            <a:spLocks/>
+          </p:cNvSpPr>
+          <p:nvPr/>
+        </p:nvSpPr>
+        <p:spPr bwMode="blackWhite">
+          <a:xfrm>
+            <a:off x="3407002" y="4307308"/>
+            <a:ext cx="5377995" cy="1043138"/>
+          </a:xfrm>
+          <a:prstGeom prst="rect">
+            <a:avLst/>
+          </a:prstGeom>
+          <a:solidFill>
+            <a:srgbClr val="FFFFFF"/>
+          </a:solidFill>
+          <a:ln w="38100" cap="sq">
+            <a:solidFill>
+              <a:srgbClr val="404040"/>
+            </a:solidFill>
+            <a:miter lim="800000"/>
+          </a:ln>
+        </p:spPr>
+        <p:txBody>
+          <a:bodyPr vert="horz" lIns="274320" tIns="182880" rIns="274320" bIns="182880" rtlCol="0" anchor="ctr" anchorCtr="1">
+            <a:normAutofit/>
+          </a:bodyPr>
+          <a:lstStyle>
+            <a:lvl1pPr algn="ctr" defTabSz="914400" rtl="0" eaLnBrk="1" latinLnBrk="0" hangingPunct="1">
+              <a:lnSpc>
+                <a:spcPct val="90000"/>
+              </a:lnSpc>
+              <a:spcBef>
+                <a:spcPct val="0"/>
+              </a:spcBef>
+              <a:buNone/>
+              <a:defRPr sz="3800" kern="1200" cap="all" spc="200" baseline="0">
+                <a:solidFill>
+                  <a:srgbClr val="262626"/>
+                </a:solidFill>
+                <a:latin typeface="+mj-lt"/>
+                <a:ea typeface="+mj-ea"/>
+                <a:cs typeface="+mj-cs"/>
+              </a:defRPr>
+            </a:lvl1pPr>
+          </a:lstStyle>
+          <a:p>
+            <a:endParaRPr lang="en-US" dirty="0"/>
+          </a:p>
+        </p:txBody>
+      </p:sp>
+      <p:sp>
+        <p:nvSpPr>
           <p:cNvPr id="2" name="Title 1">
             <a:extLst>
               <a:ext uri="{FF2B5EF4-FFF2-40B4-BE49-F238E27FC236}">
@@ -3787,7 +3842,9 @@
             <p:ph type="ctrTitle"/>
           </p:nvPr>
         </p:nvSpPr>
-        <p:spPr/>
+        <p:spPr>
+          <a:ln w="57150"/>
+        </p:spPr>
         <p:txBody>
           <a:bodyPr/>
           <a:lstStyle/>
@@ -3829,10 +3886,17 @@
               </a:spcAft>
             </a:pPr>
             <a:r>
-              <a:rPr lang="en-US" dirty="0"/>
+              <a:rPr lang="en-US" dirty="0">
+                <a:solidFill>
+                  <a:schemeClr val="bg1"/>
+                </a:solidFill>
+              </a:rPr>
               <a:t>Group 4:</a:t>
             </a:r>
             <a:endParaRPr lang="en-US" b="0" dirty="0">
+              <a:solidFill>
+                <a:schemeClr val="bg1"/>
+              </a:solidFill>
               <a:effectLst/>
             </a:endParaRPr>
           </a:p>
@@ -3840,14 +3904,18 @@
             <a:r>
               <a:rPr lang="en-US" b="0" i="0" dirty="0">
                 <a:solidFill>
-                  <a:srgbClr val="000000"/>
+                  <a:schemeClr val="bg1"/>
                 </a:solidFill>
                 <a:effectLst/>
                 <a:latin typeface="Arial" panose="020B0604020202020204" pitchFamily="34" charset="0"/>
               </a:rPr>
               <a:t>Isaiah Martinez, Joycelyn Tuazon</a:t>
             </a:r>
-            <a:endParaRPr lang="en-US" dirty="0"/>
+            <a:endParaRPr lang="en-US" dirty="0">
+              <a:solidFill>
+                <a:schemeClr val="bg1"/>
+              </a:solidFill>
+            </a:endParaRPr>
           </a:p>
         </p:txBody>
       </p:sp>
@@ -3925,7 +3993,12 @@
             <p:ph idx="1"/>
           </p:nvPr>
         </p:nvSpPr>
-        <p:spPr/>
+        <p:spPr>
+          <a:xfrm>
+            <a:off x="1415716" y="2638044"/>
+            <a:ext cx="9360568" cy="3101983"/>
+          </a:xfrm>
+        </p:spPr>
         <p:txBody>
           <a:bodyPr/>
           <a:lstStyle/>
@@ -4033,6 +4106,16 @@
 <file path=ppt/slides/slide3.xml><?xml version="1.0" encoding="utf-8"?>
 <p:sld xmlns:a="http://schemas.openxmlformats.org/drawingml/2006/main" xmlns:r="http://schemas.openxmlformats.org/officeDocument/2006/relationships" xmlns:p="http://schemas.openxmlformats.org/presentationml/2006/main">
   <p:cSld>
+    <p:bg>
+      <p:bgPr>
+        <a:solidFill>
+          <a:schemeClr val="bg1">
+            <a:lumMod val="95000"/>
+          </a:schemeClr>
+        </a:solidFill>
+        <a:effectLst/>
+      </p:bgPr>
+    </p:bg>
     <p:spTree>
       <p:nvGrpSpPr>
         <p:cNvPr id="1" name=""/>
@@ -4063,9 +4146,16 @@
             <p:ph type="title"/>
           </p:nvPr>
         </p:nvSpPr>
-        <p:spPr/>
-        <p:txBody>
-          <a:bodyPr/>
+        <p:spPr>
+          <a:xfrm>
+            <a:off x="2231136" y="964692"/>
+            <a:ext cx="7729728" cy="1188720"/>
+          </a:xfrm>
+        </p:spPr>
+        <p:txBody>
+          <a:bodyPr>
+            <a:normAutofit/>
+          </a:bodyPr>
           <a:lstStyle/>
           <a:p>
             <a:r>
@@ -4075,201 +4165,303 @@
           </a:p>
         </p:txBody>
       </p:sp>
-      <p:pic>
-        <p:nvPicPr>
-          <p:cNvPr id="5" name="Picture 4" descr="A cat standing on a chair&#10;&#10;Description automatically generated">
+      <p:grpSp>
+        <p:nvGrpSpPr>
+          <p:cNvPr id="8" name="Group 7">
             <a:extLst>
               <a:ext uri="{FF2B5EF4-FFF2-40B4-BE49-F238E27FC236}">
-                <a16:creationId xmlns:a16="http://schemas.microsoft.com/office/drawing/2014/main" id="{BD259E25-0EA9-8FEF-D590-49F25C5C8A8D}"/>
+                <a16:creationId xmlns:a16="http://schemas.microsoft.com/office/drawing/2014/main" id="{9BC51F67-C151-42DB-7CB4-873695888028}"/>
               </a:ext>
             </a:extLst>
           </p:cNvPr>
-          <p:cNvPicPr>
-            <a:picLocks noChangeAspect="1"/>
-          </p:cNvPicPr>
+          <p:cNvGrpSpPr/>
           <p:nvPr/>
-        </p:nvPicPr>
-        <p:blipFill>
-          <a:blip r:embed="rId2"/>
-          <a:stretch>
-            <a:fillRect/>
-          </a:stretch>
-        </p:blipFill>
-        <p:spPr>
+        </p:nvGrpSpPr>
+        <p:grpSpPr>
           <a:xfrm>
-            <a:off x="496304" y="2394284"/>
-            <a:ext cx="3175000" cy="2374900"/>
+            <a:off x="759323" y="3120430"/>
+            <a:ext cx="3254445" cy="2772878"/>
+            <a:chOff x="2501971" y="3308753"/>
+            <a:chExt cx="2037797" cy="1736260"/>
           </a:xfrm>
-          <a:prstGeom prst="rect">
-            <a:avLst/>
-          </a:prstGeom>
-        </p:spPr>
-      </p:pic>
-      <p:pic>
-        <p:nvPicPr>
-          <p:cNvPr id="7" name="Picture 6" descr="A black dog standing on grass&#10;&#10;Description automatically generated">
+        </p:grpSpPr>
+        <p:pic>
+          <p:nvPicPr>
+            <p:cNvPr id="5" name="Picture 4" descr="A cat standing on a chair&#10;&#10;Description automatically generated">
+              <a:extLst>
+                <a:ext uri="{FF2B5EF4-FFF2-40B4-BE49-F238E27FC236}">
+                  <a16:creationId xmlns:a16="http://schemas.microsoft.com/office/drawing/2014/main" id="{BD259E25-0EA9-8FEF-D590-49F25C5C8A8D}"/>
+                </a:ext>
+              </a:extLst>
+            </p:cNvPr>
+            <p:cNvPicPr>
+              <a:picLocks noChangeAspect="1"/>
+            </p:cNvPicPr>
+            <p:nvPr/>
+          </p:nvPicPr>
+          <p:blipFill>
+            <a:blip r:embed="rId2"/>
+            <a:stretch>
+              <a:fillRect/>
+            </a:stretch>
+          </p:blipFill>
+          <p:spPr>
+            <a:xfrm>
+              <a:off x="2501971" y="3308753"/>
+              <a:ext cx="2037797" cy="1524272"/>
+            </a:xfrm>
+            <a:prstGeom prst="rect">
+              <a:avLst/>
+            </a:prstGeom>
+          </p:spPr>
+        </p:pic>
+        <p:sp>
+          <p:nvSpPr>
+            <p:cNvPr id="3" name="TextBox 2">
+              <a:extLst>
+                <a:ext uri="{FF2B5EF4-FFF2-40B4-BE49-F238E27FC236}">
+                  <a16:creationId xmlns:a16="http://schemas.microsoft.com/office/drawing/2014/main" id="{F54715E2-9FE5-1A2C-0934-D34283234875}"/>
+                </a:ext>
+              </a:extLst>
+            </p:cNvPr>
+            <p:cNvSpPr txBox="1"/>
+            <p:nvPr/>
+          </p:nvSpPr>
+          <p:spPr>
+            <a:xfrm>
+              <a:off x="3106408" y="4833025"/>
+              <a:ext cx="904415" cy="211988"/>
+            </a:xfrm>
+            <a:prstGeom prst="rect">
+              <a:avLst/>
+            </a:prstGeom>
+            <a:noFill/>
+          </p:spPr>
+          <p:txBody>
+            <a:bodyPr wrap="square" rtlCol="0">
+              <a:spAutoFit/>
+            </a:bodyPr>
+            <a:lstStyle/>
+            <a:p>
+              <a:pPr defTabSz="292608">
+                <a:spcAft>
+                  <a:spcPts val="600"/>
+                </a:spcAft>
+              </a:pPr>
+              <a:r>
+                <a:rPr lang="en-US" sz="1600" kern="1200" dirty="0">
+                  <a:solidFill>
+                    <a:schemeClr val="tx1"/>
+                  </a:solidFill>
+                  <a:latin typeface="+mn-lt"/>
+                  <a:ea typeface="+mn-ea"/>
+                  <a:cs typeface="+mn-cs"/>
+                </a:rPr>
+                <a:t>Cat Image 1</a:t>
+              </a:r>
+              <a:endParaRPr lang="en-US" sz="1600" dirty="0"/>
+            </a:p>
+          </p:txBody>
+        </p:sp>
+      </p:grpSp>
+      <p:grpSp>
+        <p:nvGrpSpPr>
+          <p:cNvPr id="11" name="Group 10">
             <a:extLst>
               <a:ext uri="{FF2B5EF4-FFF2-40B4-BE49-F238E27FC236}">
-                <a16:creationId xmlns:a16="http://schemas.microsoft.com/office/drawing/2014/main" id="{2C819F52-CDC0-3E5C-03D3-FF0D5ADEB757}"/>
+                <a16:creationId xmlns:a16="http://schemas.microsoft.com/office/drawing/2014/main" id="{931B33C3-61DE-DC4A-5B22-92DDE774F8B4}"/>
               </a:ext>
             </a:extLst>
           </p:cNvPr>
-          <p:cNvPicPr>
-            <a:picLocks noChangeAspect="1"/>
-          </p:cNvPicPr>
+          <p:cNvGrpSpPr/>
           <p:nvPr/>
-        </p:nvPicPr>
-        <p:blipFill>
-          <a:blip r:embed="rId3"/>
-          <a:stretch>
-            <a:fillRect/>
-          </a:stretch>
-        </p:blipFill>
-        <p:spPr>
+        </p:nvGrpSpPr>
+        <p:grpSpPr>
           <a:xfrm>
-            <a:off x="4328066" y="2064084"/>
-            <a:ext cx="2425700" cy="3035300"/>
+            <a:off x="8014549" y="2506090"/>
+            <a:ext cx="3418128" cy="3981307"/>
+            <a:chOff x="6939699" y="2638425"/>
+            <a:chExt cx="2750331" cy="3203482"/>
           </a:xfrm>
-          <a:prstGeom prst="rect">
-            <a:avLst/>
-          </a:prstGeom>
-        </p:spPr>
-      </p:pic>
-      <p:pic>
-        <p:nvPicPr>
-          <p:cNvPr id="9" name="Picture 8" descr="A panda bear walking on the ground&#10;&#10;Description automatically generated">
+        </p:grpSpPr>
+        <p:pic>
+          <p:nvPicPr>
+            <p:cNvPr id="9" name="Picture 8" descr="A panda bear walking on the ground&#10;&#10;Description automatically generated">
+              <a:extLst>
+                <a:ext uri="{FF2B5EF4-FFF2-40B4-BE49-F238E27FC236}">
+                  <a16:creationId xmlns:a16="http://schemas.microsoft.com/office/drawing/2014/main" id="{03D6AC88-8ED9-95C3-0DD8-D75348CEAFBB}"/>
+                </a:ext>
+              </a:extLst>
+            </p:cNvPr>
+            <p:cNvPicPr>
+              <a:picLocks noChangeAspect="1"/>
+            </p:cNvPicPr>
+            <p:nvPr/>
+          </p:nvPicPr>
+          <p:blipFill>
+            <a:blip r:embed="rId3"/>
+            <a:stretch>
+              <a:fillRect/>
+            </a:stretch>
+          </p:blipFill>
+          <p:spPr>
+            <a:xfrm>
+              <a:off x="6939699" y="2638425"/>
+              <a:ext cx="2750331" cy="2864928"/>
+            </a:xfrm>
+            <a:prstGeom prst="rect">
+              <a:avLst/>
+            </a:prstGeom>
+          </p:spPr>
+        </p:pic>
+        <p:sp>
+          <p:nvSpPr>
+            <p:cNvPr id="4" name="TextBox 3">
+              <a:extLst>
+                <a:ext uri="{FF2B5EF4-FFF2-40B4-BE49-F238E27FC236}">
+                  <a16:creationId xmlns:a16="http://schemas.microsoft.com/office/drawing/2014/main" id="{AFD2B38F-5D80-FC24-9FEF-401132EECB0D}"/>
+                </a:ext>
+              </a:extLst>
+            </p:cNvPr>
+            <p:cNvSpPr txBox="1"/>
+            <p:nvPr/>
+          </p:nvSpPr>
+          <p:spPr>
+            <a:xfrm>
+              <a:off x="7813856" y="5503353"/>
+              <a:ext cx="1374094" cy="338554"/>
+            </a:xfrm>
+            <a:prstGeom prst="rect">
+              <a:avLst/>
+            </a:prstGeom>
+            <a:noFill/>
+          </p:spPr>
+          <p:txBody>
+            <a:bodyPr wrap="none" rtlCol="0">
+              <a:spAutoFit/>
+            </a:bodyPr>
+            <a:lstStyle/>
+            <a:p>
+              <a:pPr defTabSz="292608">
+                <a:spcAft>
+                  <a:spcPts val="600"/>
+                </a:spcAft>
+              </a:pPr>
+              <a:r>
+                <a:rPr lang="en-US" sz="1600" kern="1200" dirty="0">
+                  <a:solidFill>
+                    <a:schemeClr val="tx1"/>
+                  </a:solidFill>
+                  <a:latin typeface="+mn-lt"/>
+                  <a:ea typeface="+mn-ea"/>
+                  <a:cs typeface="+mn-cs"/>
+                </a:rPr>
+                <a:t>Panda Image 1</a:t>
+              </a:r>
+              <a:endParaRPr lang="en-US" sz="1600" dirty="0"/>
+            </a:p>
+          </p:txBody>
+        </p:sp>
+      </p:grpSp>
+      <p:grpSp>
+        <p:nvGrpSpPr>
+          <p:cNvPr id="10" name="Group 9">
             <a:extLst>
               <a:ext uri="{FF2B5EF4-FFF2-40B4-BE49-F238E27FC236}">
-                <a16:creationId xmlns:a16="http://schemas.microsoft.com/office/drawing/2014/main" id="{03D6AC88-8ED9-95C3-0DD8-D75348CEAFBB}"/>
+                <a16:creationId xmlns:a16="http://schemas.microsoft.com/office/drawing/2014/main" id="{5A8CAA12-BEF8-2225-0FF0-8DC30FF42ED3}"/>
               </a:ext>
             </a:extLst>
           </p:cNvPr>
-          <p:cNvPicPr>
-            <a:picLocks noChangeAspect="1"/>
-          </p:cNvPicPr>
+          <p:cNvGrpSpPr/>
           <p:nvPr/>
-        </p:nvPicPr>
-        <p:blipFill>
-          <a:blip r:embed="rId4"/>
-          <a:stretch>
-            <a:fillRect/>
-          </a:stretch>
-        </p:blipFill>
-        <p:spPr>
+        </p:nvGrpSpPr>
+        <p:grpSpPr>
           <a:xfrm>
-            <a:off x="7410529" y="1349876"/>
-            <a:ext cx="4285167" cy="4463716"/>
+            <a:off x="4855253" y="2851259"/>
+            <a:ext cx="2317810" cy="3340566"/>
+            <a:chOff x="4961295" y="3096822"/>
+            <a:chExt cx="1585883" cy="2285669"/>
           </a:xfrm>
-          <a:prstGeom prst="rect">
-            <a:avLst/>
-          </a:prstGeom>
-        </p:spPr>
-      </p:pic>
-      <p:sp>
-        <p:nvSpPr>
-          <p:cNvPr id="3" name="TextBox 2">
-            <a:extLst>
-              <a:ext uri="{FF2B5EF4-FFF2-40B4-BE49-F238E27FC236}">
-                <a16:creationId xmlns:a16="http://schemas.microsoft.com/office/drawing/2014/main" id="{F54715E2-9FE5-1A2C-0934-D34283234875}"/>
-              </a:ext>
-            </a:extLst>
-          </p:cNvPr>
-          <p:cNvSpPr txBox="1"/>
-          <p:nvPr/>
-        </p:nvSpPr>
-        <p:spPr>
-          <a:xfrm>
-            <a:off x="1438050" y="4769184"/>
-            <a:ext cx="1291507" cy="369332"/>
-          </a:xfrm>
-          <a:prstGeom prst="rect">
-            <a:avLst/>
-          </a:prstGeom>
-          <a:noFill/>
-        </p:spPr>
-        <p:txBody>
-          <a:bodyPr wrap="none" rtlCol="0">
-            <a:spAutoFit/>
-          </a:bodyPr>
-          <a:lstStyle/>
-          <a:p>
-            <a:r>
-              <a:rPr lang="en-US" dirty="0"/>
-              <a:t>Cat Image 1</a:t>
-            </a:r>
-          </a:p>
-        </p:txBody>
-      </p:sp>
-      <p:sp>
-        <p:nvSpPr>
-          <p:cNvPr id="4" name="TextBox 3">
-            <a:extLst>
-              <a:ext uri="{FF2B5EF4-FFF2-40B4-BE49-F238E27FC236}">
-                <a16:creationId xmlns:a16="http://schemas.microsoft.com/office/drawing/2014/main" id="{AFD2B38F-5D80-FC24-9FEF-401132EECB0D}"/>
-              </a:ext>
-            </a:extLst>
-          </p:cNvPr>
-          <p:cNvSpPr txBox="1"/>
-          <p:nvPr/>
-        </p:nvSpPr>
-        <p:spPr>
-          <a:xfrm>
-            <a:off x="8772513" y="5813592"/>
-            <a:ext cx="1561197" cy="369332"/>
-          </a:xfrm>
-          <a:prstGeom prst="rect">
-            <a:avLst/>
-          </a:prstGeom>
-          <a:noFill/>
-        </p:spPr>
-        <p:txBody>
-          <a:bodyPr wrap="none" rtlCol="0">
-            <a:spAutoFit/>
-          </a:bodyPr>
-          <a:lstStyle/>
-          <a:p>
-            <a:r>
-              <a:rPr lang="en-US" dirty="0"/>
-              <a:t>Panda Image 1</a:t>
-            </a:r>
-          </a:p>
-        </p:txBody>
-      </p:sp>
-      <p:sp>
-        <p:nvSpPr>
-          <p:cNvPr id="6" name="TextBox 5">
-            <a:extLst>
-              <a:ext uri="{FF2B5EF4-FFF2-40B4-BE49-F238E27FC236}">
-                <a16:creationId xmlns:a16="http://schemas.microsoft.com/office/drawing/2014/main" id="{C982F5AC-654A-6A85-6DB5-23EA439018F7}"/>
-              </a:ext>
-            </a:extLst>
-          </p:cNvPr>
-          <p:cNvSpPr txBox="1"/>
-          <p:nvPr/>
-        </p:nvSpPr>
-        <p:spPr>
-          <a:xfrm>
-            <a:off x="4862846" y="5097796"/>
-            <a:ext cx="1356140" cy="369332"/>
-          </a:xfrm>
-          <a:prstGeom prst="rect">
-            <a:avLst/>
-          </a:prstGeom>
-          <a:noFill/>
-        </p:spPr>
-        <p:txBody>
-          <a:bodyPr wrap="none" rtlCol="0">
-            <a:spAutoFit/>
-          </a:bodyPr>
-          <a:lstStyle/>
-          <a:p>
-            <a:r>
-              <a:rPr lang="en-US" dirty="0"/>
-              <a:t>Dog Image 1</a:t>
-            </a:r>
-          </a:p>
-        </p:txBody>
-      </p:sp>
+        </p:grpSpPr>
+        <p:pic>
+          <p:nvPicPr>
+            <p:cNvPr id="7" name="Picture 6" descr="A black dog standing on grass&#10;&#10;Description automatically generated">
+              <a:extLst>
+                <a:ext uri="{FF2B5EF4-FFF2-40B4-BE49-F238E27FC236}">
+                  <a16:creationId xmlns:a16="http://schemas.microsoft.com/office/drawing/2014/main" id="{2C819F52-CDC0-3E5C-03D3-FF0D5ADEB757}"/>
+                </a:ext>
+              </a:extLst>
+            </p:cNvPr>
+            <p:cNvPicPr>
+              <a:picLocks noChangeAspect="1"/>
+            </p:cNvPicPr>
+            <p:nvPr/>
+          </p:nvPicPr>
+          <p:blipFill>
+            <a:blip r:embed="rId4"/>
+            <a:stretch>
+              <a:fillRect/>
+            </a:stretch>
+          </p:blipFill>
+          <p:spPr>
+            <a:xfrm>
+              <a:off x="4961295" y="3096822"/>
+              <a:ext cx="1556877" cy="1948134"/>
+            </a:xfrm>
+            <a:prstGeom prst="rect">
+              <a:avLst/>
+            </a:prstGeom>
+          </p:spPr>
+        </p:pic>
+        <p:sp>
+          <p:nvSpPr>
+            <p:cNvPr id="6" name="TextBox 5">
+              <a:extLst>
+                <a:ext uri="{FF2B5EF4-FFF2-40B4-BE49-F238E27FC236}">
+                  <a16:creationId xmlns:a16="http://schemas.microsoft.com/office/drawing/2014/main" id="{C982F5AC-654A-6A85-6DB5-23EA439018F7}"/>
+                </a:ext>
+              </a:extLst>
+            </p:cNvPr>
+            <p:cNvSpPr txBox="1"/>
+            <p:nvPr/>
+          </p:nvSpPr>
+          <p:spPr>
+            <a:xfrm>
+              <a:off x="5304530" y="5043937"/>
+              <a:ext cx="1242648" cy="338554"/>
+            </a:xfrm>
+            <a:prstGeom prst="rect">
+              <a:avLst/>
+            </a:prstGeom>
+            <a:noFill/>
+          </p:spPr>
+          <p:txBody>
+            <a:bodyPr wrap="none" rtlCol="0">
+              <a:spAutoFit/>
+            </a:bodyPr>
+            <a:lstStyle/>
+            <a:p>
+              <a:pPr defTabSz="292608">
+                <a:spcAft>
+                  <a:spcPts val="600"/>
+                </a:spcAft>
+              </a:pPr>
+              <a:r>
+                <a:rPr lang="en-US" sz="1600" kern="1200" dirty="0">
+                  <a:solidFill>
+                    <a:schemeClr val="tx1"/>
+                  </a:solidFill>
+                  <a:latin typeface="+mn-lt"/>
+                  <a:ea typeface="+mn-ea"/>
+                  <a:cs typeface="+mn-cs"/>
+                </a:rPr>
+                <a:t>Dog Image 1</a:t>
+              </a:r>
+              <a:endParaRPr lang="en-US" sz="1600" dirty="0"/>
+            </a:p>
+          </p:txBody>
+        </p:sp>
+      </p:grpSp>
     </p:spTree>
     <p:extLst>
       <p:ext uri="{BB962C8B-B14F-4D97-AF65-F5344CB8AC3E}">
@@ -4346,8 +4538,8 @@
         </p:nvSpPr>
         <p:spPr>
           <a:xfrm>
-            <a:off x="838200" y="1690689"/>
-            <a:ext cx="10515600" cy="4661986"/>
+            <a:off x="838200" y="2671011"/>
+            <a:ext cx="7233988" cy="3681664"/>
           </a:xfrm>
         </p:spPr>
         <p:txBody>
@@ -4388,13 +4580,6 @@
             <a:r>
               <a:rPr lang="en-US" dirty="0"/>
               <a:t>No animal photographed</a:t>
-            </a:r>
-          </a:p>
-          <a:p>
-            <a:pPr lvl="1"/>
-            <a:r>
-              <a:rPr lang="en-US" dirty="0"/>
-              <a:t>No corrupt images</a:t>
             </a:r>
           </a:p>
           <a:p>
@@ -4434,7 +4619,7 @@
         </p:nvGrpSpPr>
         <p:grpSpPr>
           <a:xfrm>
-            <a:off x="8864599" y="721894"/>
+            <a:off x="5288046" y="4119374"/>
             <a:ext cx="1803400" cy="1570068"/>
             <a:chOff x="8986243" y="4710275"/>
             <a:chExt cx="1803400" cy="1570068"/>
@@ -4520,7 +4705,7 @@
         </p:nvGrpSpPr>
         <p:grpSpPr>
           <a:xfrm>
-            <a:off x="8178800" y="3628144"/>
+            <a:off x="8178800" y="3149577"/>
             <a:ext cx="3175000" cy="2724531"/>
             <a:chOff x="5811244" y="2985509"/>
             <a:chExt cx="3175000" cy="2724531"/>
@@ -4668,8 +4853,8 @@
         </p:nvSpPr>
         <p:spPr>
           <a:xfrm>
-            <a:off x="838200" y="1825625"/>
-            <a:ext cx="6055895" cy="4351338"/>
+            <a:off x="838200" y="2478505"/>
+            <a:ext cx="6055895" cy="3698458"/>
           </a:xfrm>
         </p:spPr>
         <p:txBody>
@@ -4685,7 +4870,7 @@
             <a:pPr lvl="1"/>
             <a:r>
               <a:rPr lang="en-US" dirty="0"/>
-              <a:t>Standardizing image size and resolution ~(500,500) </a:t>
+              <a:t>Standardizing image size ~(500,500) </a:t>
             </a:r>
           </a:p>
           <a:p>
@@ -4695,94 +4880,15 @@
               <a:t>Removing non-photograph images of animals</a:t>
             </a:r>
           </a:p>
-        </p:txBody>
-      </p:sp>
-      <p:grpSp>
-        <p:nvGrpSpPr>
-          <p:cNvPr id="10" name="Group 9">
-            <a:extLst>
-              <a:ext uri="{FF2B5EF4-FFF2-40B4-BE49-F238E27FC236}">
-                <a16:creationId xmlns:a16="http://schemas.microsoft.com/office/drawing/2014/main" id="{0322B974-DD80-8F84-FA49-46A9F6E8D693}"/>
-              </a:ext>
-            </a:extLst>
-          </p:cNvPr>
-          <p:cNvGrpSpPr/>
-          <p:nvPr/>
-        </p:nvGrpSpPr>
-        <p:grpSpPr>
-          <a:xfrm>
-            <a:off x="8608971" y="4615290"/>
-            <a:ext cx="1520737" cy="1172607"/>
-            <a:chOff x="1471613" y="4354513"/>
-            <a:chExt cx="1520737" cy="1172607"/>
-          </a:xfrm>
-        </p:grpSpPr>
-        <p:pic>
-          <p:nvPicPr>
-            <p:cNvPr id="5" name="Picture 4" descr="A close up of a sign&#10;&#10;Description automatically generated">
-              <a:extLst>
-                <a:ext uri="{FF2B5EF4-FFF2-40B4-BE49-F238E27FC236}">
-                  <a16:creationId xmlns:a16="http://schemas.microsoft.com/office/drawing/2014/main" id="{300E3335-6DF2-1587-FBB1-6EEE8A35C76A}"/>
-                </a:ext>
-              </a:extLst>
-            </p:cNvPr>
-            <p:cNvPicPr>
-              <a:picLocks noChangeAspect="1"/>
-            </p:cNvPicPr>
-            <p:nvPr/>
-          </p:nvPicPr>
-          <p:blipFill>
-            <a:blip r:embed="rId2"/>
-            <a:stretch>
-              <a:fillRect/>
-            </a:stretch>
-          </p:blipFill>
-          <p:spPr>
-            <a:xfrm>
-              <a:off x="1743031" y="4354513"/>
-              <a:ext cx="977900" cy="698500"/>
-            </a:xfrm>
-            <a:prstGeom prst="rect">
-              <a:avLst/>
-            </a:prstGeom>
-          </p:spPr>
-        </p:pic>
-        <p:sp>
-          <p:nvSpPr>
-            <p:cNvPr id="6" name="TextBox 5">
-              <a:extLst>
-                <a:ext uri="{FF2B5EF4-FFF2-40B4-BE49-F238E27FC236}">
-                  <a16:creationId xmlns:a16="http://schemas.microsoft.com/office/drawing/2014/main" id="{C1EA62B2-8941-F5A7-A9C3-05DCC0F1E04B}"/>
-                </a:ext>
-              </a:extLst>
-            </p:cNvPr>
-            <p:cNvSpPr txBox="1"/>
-            <p:nvPr/>
-          </p:nvSpPr>
-          <p:spPr>
-            <a:xfrm>
-              <a:off x="1471613" y="5157788"/>
-              <a:ext cx="1520737" cy="369332"/>
-            </a:xfrm>
-            <a:prstGeom prst="rect">
-              <a:avLst/>
-            </a:prstGeom>
-            <a:noFill/>
-          </p:spPr>
-          <p:txBody>
-            <a:bodyPr wrap="none" rtlCol="0">
-              <a:spAutoFit/>
-            </a:bodyPr>
-            <a:lstStyle/>
-            <a:p>
-              <a:r>
-                <a:rPr lang="en-US" dirty="0"/>
-                <a:t>Cat image 374</a:t>
-              </a:r>
-            </a:p>
-          </p:txBody>
-        </p:sp>
-      </p:grpSp>
+          <a:p>
+            <a:pPr lvl="1"/>
+            <a:r>
+              <a:rPr lang="en-US" dirty="0"/>
+              <a:t>Removing photographs with difficult to spot subjects</a:t>
+            </a:r>
+          </a:p>
+        </p:txBody>
+      </p:sp>
       <p:grpSp>
         <p:nvGrpSpPr>
           <p:cNvPr id="11" name="Group 10">
@@ -4797,7 +4903,7 @@
         </p:nvGrpSpPr>
         <p:grpSpPr>
           <a:xfrm>
-            <a:off x="7781841" y="499741"/>
+            <a:off x="7614352" y="2688459"/>
             <a:ext cx="3175000" cy="3592731"/>
             <a:chOff x="6951662" y="3230563"/>
             <a:chExt cx="3175000" cy="3592731"/>
@@ -4818,7 +4924,7 @@
             <p:nvPr/>
           </p:nvPicPr>
           <p:blipFill>
-            <a:blip r:embed="rId3"/>
+            <a:blip r:embed="rId2"/>
             <a:stretch>
               <a:fillRect/>
             </a:stretch>
@@ -4874,10 +4980,10 @@
       </p:grpSp>
       <p:grpSp>
         <p:nvGrpSpPr>
-          <p:cNvPr id="16" name="Group 15">
+          <p:cNvPr id="4" name="Group 3">
             <a:extLst>
               <a:ext uri="{FF2B5EF4-FFF2-40B4-BE49-F238E27FC236}">
-                <a16:creationId xmlns:a16="http://schemas.microsoft.com/office/drawing/2014/main" id="{82304349-5A40-B61A-335B-BD5524BED45C}"/>
+                <a16:creationId xmlns:a16="http://schemas.microsoft.com/office/drawing/2014/main" id="{A357A76C-E359-D9C8-04CE-4B1B6E9526E7}"/>
               </a:ext>
             </a:extLst>
           </p:cNvPr>
@@ -4886,18 +4992,104 @@
         </p:nvGrpSpPr>
         <p:grpSpPr>
           <a:xfrm>
-            <a:off x="2333711" y="3918126"/>
-            <a:ext cx="3637561" cy="2791328"/>
-            <a:chOff x="7816502" y="174709"/>
-            <a:chExt cx="3981129" cy="3034476"/>
+            <a:off x="1119258" y="4627968"/>
+            <a:ext cx="1520737" cy="1172607"/>
+            <a:chOff x="1471613" y="4354513"/>
+            <a:chExt cx="1520737" cy="1172607"/>
           </a:xfrm>
         </p:grpSpPr>
         <p:pic>
           <p:nvPicPr>
-            <p:cNvPr id="17" name="Picture 16" descr="A person looking at a panda&#10;&#10;Description automatically generated">
+            <p:cNvPr id="7" name="Picture 6" descr="A close up of a sign&#10;&#10;Description automatically generated">
               <a:extLst>
                 <a:ext uri="{FF2B5EF4-FFF2-40B4-BE49-F238E27FC236}">
-                  <a16:creationId xmlns:a16="http://schemas.microsoft.com/office/drawing/2014/main" id="{70BA795C-A357-E4C5-1ED7-7F80082BD68B}"/>
+                  <a16:creationId xmlns:a16="http://schemas.microsoft.com/office/drawing/2014/main" id="{079F2DED-04F1-B963-B58E-0D5DE3861247}"/>
+                </a:ext>
+              </a:extLst>
+            </p:cNvPr>
+            <p:cNvPicPr>
+              <a:picLocks noChangeAspect="1"/>
+            </p:cNvPicPr>
+            <p:nvPr/>
+          </p:nvPicPr>
+          <p:blipFill>
+            <a:blip r:embed="rId3"/>
+            <a:stretch>
+              <a:fillRect/>
+            </a:stretch>
+          </p:blipFill>
+          <p:spPr>
+            <a:xfrm>
+              <a:off x="1743031" y="4354513"/>
+              <a:ext cx="977900" cy="698500"/>
+            </a:xfrm>
+            <a:prstGeom prst="rect">
+              <a:avLst/>
+            </a:prstGeom>
+          </p:spPr>
+        </p:pic>
+        <p:sp>
+          <p:nvSpPr>
+            <p:cNvPr id="12" name="TextBox 11">
+              <a:extLst>
+                <a:ext uri="{FF2B5EF4-FFF2-40B4-BE49-F238E27FC236}">
+                  <a16:creationId xmlns:a16="http://schemas.microsoft.com/office/drawing/2014/main" id="{CCA200D7-6915-3165-6EA2-510F742F677F}"/>
+                </a:ext>
+              </a:extLst>
+            </p:cNvPr>
+            <p:cNvSpPr txBox="1"/>
+            <p:nvPr/>
+          </p:nvSpPr>
+          <p:spPr>
+            <a:xfrm>
+              <a:off x="1471613" y="5157788"/>
+              <a:ext cx="1520737" cy="369332"/>
+            </a:xfrm>
+            <a:prstGeom prst="rect">
+              <a:avLst/>
+            </a:prstGeom>
+            <a:noFill/>
+          </p:spPr>
+          <p:txBody>
+            <a:bodyPr wrap="none" rtlCol="0">
+              <a:spAutoFit/>
+            </a:bodyPr>
+            <a:lstStyle/>
+            <a:p>
+              <a:r>
+                <a:rPr lang="en-US" dirty="0"/>
+                <a:t>Cat image 374</a:t>
+              </a:r>
+            </a:p>
+          </p:txBody>
+        </p:sp>
+      </p:grpSp>
+      <p:grpSp>
+        <p:nvGrpSpPr>
+          <p:cNvPr id="15" name="Group 14">
+            <a:extLst>
+              <a:ext uri="{FF2B5EF4-FFF2-40B4-BE49-F238E27FC236}">
+                <a16:creationId xmlns:a16="http://schemas.microsoft.com/office/drawing/2014/main" id="{39678E1B-4E1E-54BC-97A8-87781FE33E4F}"/>
+              </a:ext>
+            </a:extLst>
+          </p:cNvPr>
+          <p:cNvGrpSpPr/>
+          <p:nvPr/>
+        </p:nvGrpSpPr>
+        <p:grpSpPr>
+          <a:xfrm>
+            <a:off x="3866147" y="4210513"/>
+            <a:ext cx="2676690" cy="2367699"/>
+            <a:chOff x="3419310" y="3846729"/>
+            <a:chExt cx="2676690" cy="2367699"/>
+          </a:xfrm>
+        </p:grpSpPr>
+        <p:pic>
+          <p:nvPicPr>
+            <p:cNvPr id="13" name="Picture 12" descr="A person in a forest with pandas&#10;&#10;Description automatically generated">
+              <a:extLst>
+                <a:ext uri="{FF2B5EF4-FFF2-40B4-BE49-F238E27FC236}">
+                  <a16:creationId xmlns:a16="http://schemas.microsoft.com/office/drawing/2014/main" id="{7F1ECBB6-4D30-3A6F-C71A-5FB5E08EBF9F}"/>
                 </a:ext>
               </a:extLst>
             </p:cNvPr>
@@ -4914,8 +5106,8 @@
           </p:blipFill>
           <p:spPr>
             <a:xfrm>
-              <a:off x="7816502" y="174709"/>
-              <a:ext cx="3981129" cy="2659394"/>
+              <a:off x="3419310" y="3846729"/>
+              <a:ext cx="2676690" cy="2007518"/>
             </a:xfrm>
             <a:prstGeom prst="rect">
               <a:avLst/>
@@ -4924,10 +5116,10 @@
         </p:pic>
         <p:sp>
           <p:nvSpPr>
-            <p:cNvPr id="18" name="TextBox 17">
+            <p:cNvPr id="14" name="TextBox 13">
               <a:extLst>
                 <a:ext uri="{FF2B5EF4-FFF2-40B4-BE49-F238E27FC236}">
-                  <a16:creationId xmlns:a16="http://schemas.microsoft.com/office/drawing/2014/main" id="{483F1150-7884-377A-20E1-3A5D6066F8AE}"/>
+                  <a16:creationId xmlns:a16="http://schemas.microsoft.com/office/drawing/2014/main" id="{0FC1A211-2947-5A13-5F21-9D10B0AFE407}"/>
                 </a:ext>
               </a:extLst>
             </p:cNvPr>
@@ -4936,8 +5128,8 @@
           </p:nvSpPr>
           <p:spPr>
             <a:xfrm>
-              <a:off x="8967958" y="2839853"/>
-              <a:ext cx="1678216" cy="369332"/>
+              <a:off x="3890580" y="5845096"/>
+              <a:ext cx="1745991" cy="369332"/>
             </a:xfrm>
             <a:prstGeom prst="rect">
               <a:avLst/>
@@ -4952,7 +5144,7 @@
             <a:p>
               <a:r>
                 <a:rPr lang="en-US" dirty="0"/>
-                <a:t>Panda Image 56</a:t>
+                <a:t>Panda Image 475</a:t>
               </a:r>
             </a:p>
           </p:txBody>
@@ -5038,12 +5230,14 @@
         </p:nvSpPr>
         <p:spPr>
           <a:xfrm>
-            <a:off x="838200" y="2860674"/>
-            <a:ext cx="5257800" cy="1325564"/>
+            <a:off x="1855453" y="2848642"/>
+            <a:ext cx="5257800" cy="2613694"/>
           </a:xfrm>
         </p:spPr>
         <p:txBody>
-          <a:bodyPr/>
+          <a:bodyPr>
+            <a:normAutofit/>
+          </a:bodyPr>
           <a:lstStyle/>
           <a:p>
             <a:r>
@@ -5055,9 +5249,34 @@
             <a:endParaRPr lang="en-US" dirty="0"/>
           </a:p>
           <a:p>
-            <a:endParaRPr lang="en-US" dirty="0"/>
-          </a:p>
-          <a:p>
+            <a:r>
+              <a:rPr lang="en-US" dirty="0"/>
+              <a:t>Separated by file type:</a:t>
+            </a:r>
+          </a:p>
+          <a:p>
+            <a:pPr lvl="1"/>
+            <a:r>
+              <a:rPr lang="en-US" dirty="0"/>
+              <a:t>Images</a:t>
+            </a:r>
+          </a:p>
+          <a:p>
+            <a:pPr lvl="1"/>
+            <a:r>
+              <a:rPr lang="en-US" dirty="0"/>
+              <a:t>PPTX</a:t>
+            </a:r>
+          </a:p>
+          <a:p>
+            <a:pPr lvl="1"/>
+            <a:r>
+              <a:rPr lang="en-US" dirty="0"/>
+              <a:t>Project Files</a:t>
+            </a:r>
+          </a:p>
+          <a:p>
+            <a:pPr lvl="1"/>
             <a:endParaRPr lang="en-US" dirty="0"/>
           </a:p>
         </p:txBody>
@@ -5084,8 +5303,8 @@
         </p:blipFill>
         <p:spPr>
           <a:xfrm>
-            <a:off x="7106069" y="1027906"/>
-            <a:ext cx="3708400" cy="4991100"/>
+            <a:off x="7223213" y="2406317"/>
+            <a:ext cx="3113334" cy="4190206"/>
           </a:xfrm>
           <a:prstGeom prst="rect">
             <a:avLst/>
@@ -5124,10 +5343,74 @@
       </p:grpSpPr>
       <p:sp>
         <p:nvSpPr>
+          <p:cNvPr id="7" name="Title 1">
+            <a:extLst>
+              <a:ext uri="{FF2B5EF4-FFF2-40B4-BE49-F238E27FC236}">
+                <a16:creationId xmlns:a16="http://schemas.microsoft.com/office/drawing/2014/main" id="{2958DF31-9AD7-6A84-2795-8AA3925283AB}"/>
+              </a:ext>
+            </a:extLst>
+          </p:cNvPr>
+          <p:cNvSpPr txBox="1">
+            <a:spLocks/>
+          </p:cNvSpPr>
+          <p:nvPr/>
+        </p:nvSpPr>
+        <p:spPr bwMode="blackWhite">
+          <a:xfrm>
+            <a:off x="690813" y="1058779"/>
+            <a:ext cx="10810373" cy="4308656"/>
+          </a:xfrm>
+          <a:prstGeom prst="rect">
+            <a:avLst/>
+          </a:prstGeom>
+          <a:solidFill>
+            <a:srgbClr val="FFFFFF">
+              <a:alpha val="10000"/>
+            </a:srgbClr>
+          </a:solidFill>
+          <a:ln w="38100" cap="sq">
+            <a:solidFill>
+              <a:srgbClr val="FFFFFF">
+                <a:alpha val="10000"/>
+              </a:srgbClr>
+            </a:solidFill>
+            <a:miter lim="800000"/>
+          </a:ln>
+        </p:spPr>
+        <p:txBody>
+          <a:bodyPr vert="horz" lIns="274320" tIns="182880" rIns="274320" bIns="182880" rtlCol="0" anchor="ctr" anchorCtr="1">
+            <a:normAutofit/>
+          </a:bodyPr>
+          <a:lstStyle>
+            <a:lvl1pPr algn="ctr" defTabSz="914400" rtl="0" eaLnBrk="1" latinLnBrk="0" hangingPunct="1">
+              <a:lnSpc>
+                <a:spcPct val="90000"/>
+              </a:lnSpc>
+              <a:spcBef>
+                <a:spcPct val="0"/>
+              </a:spcBef>
+              <a:buNone/>
+              <a:defRPr sz="3800" kern="1200" cap="all" spc="200" baseline="0">
+                <a:solidFill>
+                  <a:srgbClr val="262626"/>
+                </a:solidFill>
+                <a:latin typeface="+mj-lt"/>
+                <a:ea typeface="+mj-ea"/>
+                <a:cs typeface="+mj-cs"/>
+              </a:defRPr>
+            </a:lvl1pPr>
+          </a:lstStyle>
+          <a:p>
+            <a:endParaRPr lang="en-US" dirty="0"/>
+          </a:p>
+        </p:txBody>
+      </p:sp>
+      <p:sp>
+        <p:nvSpPr>
           <p:cNvPr id="2" name="Title 1">
             <a:extLst>
               <a:ext uri="{FF2B5EF4-FFF2-40B4-BE49-F238E27FC236}">
-                <a16:creationId xmlns:a16="http://schemas.microsoft.com/office/drawing/2014/main" id="{C6838AC0-98CE-DC40-6CE4-679A59783DC6}"/>
+                <a16:creationId xmlns:a16="http://schemas.microsoft.com/office/drawing/2014/main" id="{AF755AED-A382-72F6-C59E-B4E1FC1F9AF7}"/>
               </a:ext>
             </a:extLst>
           </p:cNvPr>
@@ -5135,10 +5418,16 @@
             <a:spLocks noGrp="1"/>
           </p:cNvSpPr>
           <p:nvPr>
-            <p:ph type="title"/>
-          </p:nvPr>
-        </p:nvSpPr>
-        <p:spPr/>
+            <p:ph type="ctrTitle"/>
+          </p:nvPr>
+        </p:nvSpPr>
+        <p:spPr>
+          <a:ln w="76200">
+            <a:solidFill>
+              <a:srgbClr val="272727"/>
+            </a:solidFill>
+          </a:ln>
+        </p:spPr>
         <p:txBody>
           <a:bodyPr/>
           <a:lstStyle/>
@@ -5152,33 +5441,72 @@
       </p:sp>
       <p:sp>
         <p:nvSpPr>
-          <p:cNvPr id="3" name="Content Placeholder 2">
+          <p:cNvPr id="8" name="Title 1">
             <a:extLst>
               <a:ext uri="{FF2B5EF4-FFF2-40B4-BE49-F238E27FC236}">
-                <a16:creationId xmlns:a16="http://schemas.microsoft.com/office/drawing/2014/main" id="{A8BAB405-603A-D156-0091-D357BB71AD1B}"/>
+                <a16:creationId xmlns:a16="http://schemas.microsoft.com/office/drawing/2014/main" id="{869F5907-3DE9-96AA-5726-6D064EAF0140}"/>
               </a:ext>
             </a:extLst>
           </p:cNvPr>
-          <p:cNvSpPr>
-            <a:spLocks noGrp="1"/>
-          </p:cNvSpPr>
-          <p:nvPr>
-            <p:ph idx="1"/>
-          </p:nvPr>
-        </p:nvSpPr>
-        <p:spPr/>
-        <p:txBody>
-          <a:bodyPr/>
-          <a:lstStyle/>
-          <a:p>
-            <a:endParaRPr lang="en-US"/>
+          <p:cNvSpPr txBox="1">
+            <a:spLocks/>
+          </p:cNvSpPr>
+          <p:nvPr/>
+        </p:nvSpPr>
+        <p:spPr bwMode="blackWhite">
+          <a:xfrm>
+            <a:off x="1227221" y="2054125"/>
+            <a:ext cx="9781674" cy="2311158"/>
+          </a:xfrm>
+          <a:prstGeom prst="rect">
+            <a:avLst/>
+          </a:prstGeom>
+          <a:solidFill>
+            <a:srgbClr val="FFFFFF">
+              <a:alpha val="10000"/>
+            </a:srgbClr>
+          </a:solidFill>
+          <a:ln w="38100" cap="sq">
+            <a:solidFill>
+              <a:srgbClr val="FFFFFF">
+                <a:alpha val="10000"/>
+              </a:srgbClr>
+            </a:solidFill>
+            <a:miter lim="800000"/>
+          </a:ln>
+        </p:spPr>
+        <p:txBody>
+          <a:bodyPr vert="horz" lIns="274320" tIns="182880" rIns="274320" bIns="182880" rtlCol="0" anchor="ctr" anchorCtr="1">
+            <a:normAutofit/>
+          </a:bodyPr>
+          <a:lstStyle>
+            <a:lvl1pPr algn="ctr" defTabSz="914400" rtl="0" eaLnBrk="1" latinLnBrk="0" hangingPunct="1">
+              <a:lnSpc>
+                <a:spcPct val="90000"/>
+              </a:lnSpc>
+              <a:spcBef>
+                <a:spcPct val="0"/>
+              </a:spcBef>
+              <a:buNone/>
+              <a:defRPr sz="3800" kern="1200" cap="all" spc="200" baseline="0">
+                <a:solidFill>
+                  <a:srgbClr val="262626"/>
+                </a:solidFill>
+                <a:latin typeface="+mj-lt"/>
+                <a:ea typeface="+mj-ea"/>
+                <a:cs typeface="+mj-cs"/>
+              </a:defRPr>
+            </a:lvl1pPr>
+          </a:lstStyle>
+          <a:p>
+            <a:endParaRPr lang="en-US" dirty="0"/>
           </a:p>
         </p:txBody>
       </p:sp>
     </p:spTree>
     <p:extLst>
       <p:ext uri="{BB962C8B-B14F-4D97-AF65-F5344CB8AC3E}">
-        <p14:creationId xmlns:p14="http://schemas.microsoft.com/office/powerpoint/2010/main" val="1662469434"/>
+        <p14:creationId xmlns:p14="http://schemas.microsoft.com/office/powerpoint/2010/main" val="2719211162"/>
       </p:ext>
     </p:extLst>
   </p:cSld>
@@ -5189,108 +5517,58 @@
 </file>
 
 <file path=ppt/theme/theme1.xml><?xml version="1.0" encoding="utf-8"?>
-<a:theme xmlns:a="http://schemas.openxmlformats.org/drawingml/2006/main" name="Office Theme">
+<a:theme xmlns:a="http://schemas.openxmlformats.org/drawingml/2006/main" name="Parcel">
   <a:themeElements>
-    <a:clrScheme name="Office">
+    <a:clrScheme name="Parcel">
       <a:dk1>
-        <a:sysClr val="windowText" lastClr="000000"/>
+        <a:srgbClr val="000000"/>
       </a:dk1>
       <a:lt1>
-        <a:sysClr val="window" lastClr="FFFFFF"/>
+        <a:srgbClr val="FFFFFF"/>
       </a:lt1>
       <a:dk2>
-        <a:srgbClr val="44546A"/>
+        <a:srgbClr val="4A5356"/>
       </a:dk2>
       <a:lt2>
-        <a:srgbClr val="E7E6E6"/>
+        <a:srgbClr val="E8E3CE"/>
       </a:lt2>
       <a:accent1>
-        <a:srgbClr val="4472C4"/>
+        <a:srgbClr val="F6A21D"/>
       </a:accent1>
       <a:accent2>
-        <a:srgbClr val="ED7D31"/>
+        <a:srgbClr val="9BAFB5"/>
       </a:accent2>
       <a:accent3>
-        <a:srgbClr val="A5A5A5"/>
+        <a:srgbClr val="C96731"/>
       </a:accent3>
       <a:accent4>
-        <a:srgbClr val="FFC000"/>
+        <a:srgbClr val="9CA383"/>
       </a:accent4>
       <a:accent5>
-        <a:srgbClr val="5B9BD5"/>
+        <a:srgbClr val="87795D"/>
       </a:accent5>
       <a:accent6>
-        <a:srgbClr val="70AD47"/>
+        <a:srgbClr val="A0988C"/>
       </a:accent6>
       <a:hlink>
-        <a:srgbClr val="0563C1"/>
+        <a:srgbClr val="00B0F0"/>
       </a:hlink>
       <a:folHlink>
-        <a:srgbClr val="954F72"/>
+        <a:srgbClr val="738F97"/>
       </a:folHlink>
     </a:clrScheme>
-    <a:fontScheme name="Office">
+    <a:fontScheme name="Parcel">
       <a:majorFont>
-        <a:latin typeface="Calibri Light" panose="020F0302020204030204"/>
+        <a:latin typeface="Gill Sans MT" panose="020B0502020104020203"/>
         <a:ea typeface=""/>
         <a:cs typeface=""/>
-        <a:font script="Jpan" typeface="游ゴシック Light"/>
-        <a:font script="Hang" typeface="맑은 고딕"/>
-        <a:font script="Hans" typeface="等线 Light"/>
-        <a:font script="Hant" typeface="新細明體"/>
-        <a:font script="Arab" typeface="Times New Roman"/>
-        <a:font script="Hebr" typeface="Times New Roman"/>
-        <a:font script="Thai" typeface="Angsana New"/>
-        <a:font script="Ethi" typeface="Nyala"/>
-        <a:font script="Beng" typeface="Vrinda"/>
-        <a:font script="Gujr" typeface="Shruti"/>
-        <a:font script="Khmr" typeface="MoolBoran"/>
-        <a:font script="Knda" typeface="Tunga"/>
-        <a:font script="Guru" typeface="Raavi"/>
-        <a:font script="Cans" typeface="Euphemia"/>
-        <a:font script="Cher" typeface="Plantagenet Cherokee"/>
-        <a:font script="Yiii" typeface="Microsoft Yi Baiti"/>
-        <a:font script="Tibt" typeface="Microsoft Himalaya"/>
-        <a:font script="Thaa" typeface="MV Boli"/>
-        <a:font script="Deva" typeface="Mangal"/>
-        <a:font script="Telu" typeface="Gautami"/>
-        <a:font script="Taml" typeface="Latha"/>
-        <a:font script="Syrc" typeface="Estrangelo Edessa"/>
-        <a:font script="Orya" typeface="Kalinga"/>
-        <a:font script="Mlym" typeface="Kartika"/>
-        <a:font script="Laoo" typeface="DokChampa"/>
-        <a:font script="Sinh" typeface="Iskoola Pota"/>
-        <a:font script="Mong" typeface="Mongolian Baiti"/>
-        <a:font script="Viet" typeface="Times New Roman"/>
-        <a:font script="Uigh" typeface="Microsoft Uighur"/>
-        <a:font script="Geor" typeface="Sylfaen"/>
-        <a:font script="Armn" typeface="Arial"/>
-        <a:font script="Bugi" typeface="Leelawadee UI"/>
-        <a:font script="Bopo" typeface="Microsoft JhengHei"/>
-        <a:font script="Java" typeface="Javanese Text"/>
-        <a:font script="Lisu" typeface="Segoe UI"/>
-        <a:font script="Mymr" typeface="Myanmar Text"/>
-        <a:font script="Nkoo" typeface="Ebrima"/>
-        <a:font script="Olck" typeface="Nirmala UI"/>
-        <a:font script="Osma" typeface="Ebrima"/>
-        <a:font script="Phag" typeface="Phagspa"/>
-        <a:font script="Syrn" typeface="Estrangelo Edessa"/>
-        <a:font script="Syrj" typeface="Estrangelo Edessa"/>
-        <a:font script="Syre" typeface="Estrangelo Edessa"/>
-        <a:font script="Sora" typeface="Nirmala UI"/>
-        <a:font script="Tale" typeface="Microsoft Tai Le"/>
-        <a:font script="Talu" typeface="Microsoft New Tai Lue"/>
-        <a:font script="Tfng" typeface="Ebrima"/>
-      </a:majorFont>
-      <a:minorFont>
-        <a:latin typeface="Calibri" panose="020F0502020204030204"/>
-        <a:ea typeface=""/>
-        <a:cs typeface=""/>
-        <a:font script="Jpan" typeface="游ゴシック"/>
-        <a:font script="Hang" typeface="맑은 고딕"/>
-        <a:font script="Hans" typeface="等线"/>
-        <a:font script="Hant" typeface="新細明體"/>
-        <a:font script="Arab" typeface="Arial"/>
+        <a:font script="Grek" typeface="Corbel"/>
+        <a:font script="Cyrl" typeface="Corbel"/>
+        <a:font script="Jpan" typeface="HGｺﾞｼｯｸE"/>
+        <a:font script="Hang" typeface="휴먼매직체"/>
+        <a:font script="Hans" typeface="华文中宋"/>
+        <a:font script="Hant" typeface="微軟正黑體"/>
+        <a:font script="Arab" typeface="Majalla UI"/>
         <a:font script="Hebr" typeface="Arial"/>
         <a:font script="Thai" typeface="Cordia New"/>
         <a:font script="Ethi" typeface="Nyala"/>
@@ -5313,29 +5591,49 @@
         <a:font script="Laoo" typeface="DokChampa"/>
         <a:font script="Sinh" typeface="Iskoola Pota"/>
         <a:font script="Mong" typeface="Mongolian Baiti"/>
-        <a:font script="Viet" typeface="Arial"/>
+        <a:font script="Viet" typeface="Tahoma"/>
         <a:font script="Uigh" typeface="Microsoft Uighur"/>
         <a:font script="Geor" typeface="Sylfaen"/>
-        <a:font script="Armn" typeface="Arial"/>
-        <a:font script="Bugi" typeface="Leelawadee UI"/>
-        <a:font script="Bopo" typeface="Microsoft JhengHei"/>
-        <a:font script="Java" typeface="Javanese Text"/>
-        <a:font script="Lisu" typeface="Segoe UI"/>
-        <a:font script="Mymr" typeface="Myanmar Text"/>
-        <a:font script="Nkoo" typeface="Ebrima"/>
-        <a:font script="Olck" typeface="Nirmala UI"/>
-        <a:font script="Osma" typeface="Ebrima"/>
-        <a:font script="Phag" typeface="Phagspa"/>
-        <a:font script="Syrn" typeface="Estrangelo Edessa"/>
-        <a:font script="Syrj" typeface="Estrangelo Edessa"/>
-        <a:font script="Syre" typeface="Estrangelo Edessa"/>
-        <a:font script="Sora" typeface="Nirmala UI"/>
-        <a:font script="Tale" typeface="Microsoft Tai Le"/>
-        <a:font script="Talu" typeface="Microsoft New Tai Lue"/>
-        <a:font script="Tfng" typeface="Ebrima"/>
+      </a:majorFont>
+      <a:minorFont>
+        <a:latin typeface="Gill Sans MT" panose="020B0502020104020203"/>
+        <a:ea typeface=""/>
+        <a:cs typeface=""/>
+        <a:font script="Grek" typeface="Corbel"/>
+        <a:font script="Cyrl" typeface="Corbel"/>
+        <a:font script="Jpan" typeface="HGｺﾞｼｯｸE"/>
+        <a:font script="Hang" typeface="휴먼매직체"/>
+        <a:font script="Hans" typeface="华文中宋"/>
+        <a:font script="Hant" typeface="微軟正黑體"/>
+        <a:font script="Arab" typeface="Majalla UI"/>
+        <a:font script="Hebr" typeface="Arial"/>
+        <a:font script="Thai" typeface="Cordia New"/>
+        <a:font script="Ethi" typeface="Nyala"/>
+        <a:font script="Beng" typeface="Vrinda"/>
+        <a:font script="Gujr" typeface="Shruti"/>
+        <a:font script="Khmr" typeface="DaunPenh"/>
+        <a:font script="Knda" typeface="Tunga"/>
+        <a:font script="Guru" typeface="Raavi"/>
+        <a:font script="Cans" typeface="Euphemia"/>
+        <a:font script="Cher" typeface="Plantagenet Cherokee"/>
+        <a:font script="Yiii" typeface="Microsoft Yi Baiti"/>
+        <a:font script="Tibt" typeface="Microsoft Himalaya"/>
+        <a:font script="Thaa" typeface="MV Boli"/>
+        <a:font script="Deva" typeface="Mangal"/>
+        <a:font script="Telu" typeface="Gautami"/>
+        <a:font script="Taml" typeface="Latha"/>
+        <a:font script="Syrc" typeface="Estrangelo Edessa"/>
+        <a:font script="Orya" typeface="Kalinga"/>
+        <a:font script="Mlym" typeface="Kartika"/>
+        <a:font script="Laoo" typeface="DokChampa"/>
+        <a:font script="Sinh" typeface="Iskoola Pota"/>
+        <a:font script="Mong" typeface="Mongolian Baiti"/>
+        <a:font script="Viet" typeface="Tahoma"/>
+        <a:font script="Uigh" typeface="Microsoft Uighur"/>
+        <a:font script="Geor" typeface="Sylfaen"/>
       </a:minorFont>
     </a:fontScheme>
-    <a:fmtScheme name="Office">
+    <a:fmtScheme name="Parcel">
       <a:fillStyleLst>
         <a:solidFill>
           <a:schemeClr val="phClr"/>
@@ -5344,23 +5642,16 @@
           <a:gsLst>
             <a:gs pos="0">
               <a:schemeClr val="phClr">
-                <a:lumMod val="110000"/>
-                <a:satMod val="105000"/>
-                <a:tint val="67000"/>
-              </a:schemeClr>
-            </a:gs>
-            <a:gs pos="50000">
-              <a:schemeClr val="phClr">
-                <a:lumMod val="105000"/>
-                <a:satMod val="103000"/>
-                <a:tint val="73000"/>
+                <a:tint val="80000"/>
+                <a:satMod val="107000"/>
+                <a:lumMod val="103000"/>
               </a:schemeClr>
             </a:gs>
             <a:gs pos="100000">
               <a:schemeClr val="phClr">
-                <a:lumMod val="105000"/>
+                <a:tint val="82000"/>
                 <a:satMod val="109000"/>
-                <a:tint val="81000"/>
+                <a:lumMod val="103000"/>
               </a:schemeClr>
             </a:gs>
           </a:gsLst>
@@ -5370,23 +5661,23 @@
           <a:gsLst>
             <a:gs pos="0">
               <a:schemeClr val="phClr">
-                <a:satMod val="103000"/>
+                <a:tint val="97000"/>
+                <a:satMod val="100000"/>
                 <a:lumMod val="102000"/>
-                <a:tint val="94000"/>
               </a:schemeClr>
             </a:gs>
             <a:gs pos="50000">
               <a:schemeClr val="phClr">
-                <a:satMod val="110000"/>
+                <a:shade val="100000"/>
+                <a:satMod val="103000"/>
                 <a:lumMod val="100000"/>
-                <a:shade val="100000"/>
               </a:schemeClr>
             </a:gs>
             <a:gs pos="100000">
               <a:schemeClr val="phClr">
+                <a:shade val="93000"/>
+                <a:satMod val="110000"/>
                 <a:lumMod val="99000"/>
-                <a:satMod val="120000"/>
-                <a:shade val="78000"/>
               </a:schemeClr>
             </a:gs>
           </a:gsLst>
@@ -5399,21 +5690,18 @@
             <a:schemeClr val="phClr"/>
           </a:solidFill>
           <a:prstDash val="solid"/>
-          <a:miter lim="800000"/>
         </a:ln>
         <a:ln w="12700" cap="flat" cmpd="sng" algn="ctr">
           <a:solidFill>
             <a:schemeClr val="phClr"/>
           </a:solidFill>
           <a:prstDash val="solid"/>
-          <a:miter lim="800000"/>
         </a:ln>
-        <a:ln w="19050" cap="flat" cmpd="sng" algn="ctr">
+        <a:ln w="31750" cap="flat" cmpd="sng" algn="ctr">
           <a:solidFill>
             <a:schemeClr val="phClr"/>
           </a:solidFill>
           <a:prstDash val="solid"/>
-          <a:miter lim="800000"/>
         </a:ln>
       </a:lnStyleLst>
       <a:effectStyleLst>
@@ -5425,12 +5713,21 @@
         </a:effectStyle>
         <a:effectStyle>
           <a:effectLst>
-            <a:outerShdw blurRad="57150" dist="19050" dir="5400000" algn="ctr" rotWithShape="0">
+            <a:outerShdw blurRad="55880" dist="15240" dir="5400000" algn="ctr" rotWithShape="0">
               <a:srgbClr val="000000">
-                <a:alpha val="63000"/>
+                <a:alpha val="45000"/>
               </a:srgbClr>
             </a:outerShdw>
           </a:effectLst>
+          <a:scene3d>
+            <a:camera prst="orthographicFront">
+              <a:rot lat="0" lon="0" rev="0"/>
+            </a:camera>
+            <a:lightRig rig="brightRoom" dir="tl"/>
+          </a:scene3d>
+          <a:sp3d prstMaterial="dkEdge">
+            <a:bevelT w="0" h="0"/>
+          </a:sp3d>
         </a:effectStyle>
       </a:effectStyleLst>
       <a:bgFillStyleLst>
@@ -5447,28 +5744,24 @@
           <a:gsLst>
             <a:gs pos="0">
               <a:schemeClr val="phClr">
-                <a:tint val="93000"/>
-                <a:satMod val="150000"/>
-                <a:shade val="98000"/>
-                <a:lumMod val="102000"/>
-              </a:schemeClr>
-            </a:gs>
-            <a:gs pos="50000">
-              <a:schemeClr val="phClr">
-                <a:tint val="98000"/>
-                <a:satMod val="130000"/>
-                <a:shade val="90000"/>
-                <a:lumMod val="103000"/>
+                <a:tint val="97000"/>
+                <a:shade val="100000"/>
+                <a:satMod val="185000"/>
+                <a:lumMod val="120000"/>
               </a:schemeClr>
             </a:gs>
             <a:gs pos="100000">
               <a:schemeClr val="phClr">
-                <a:shade val="63000"/>
-                <a:satMod val="120000"/>
+                <a:tint val="96000"/>
+                <a:shade val="95000"/>
+                <a:satMod val="215000"/>
+                <a:lumMod val="80000"/>
               </a:schemeClr>
             </a:gs>
           </a:gsLst>
-          <a:lin ang="5400000" scaled="0"/>
+          <a:path path="circle">
+            <a:fillToRect l="50000" t="55000" r="125000" b="100000"/>
+          </a:path>
         </a:gradFill>
       </a:bgFillStyleLst>
     </a:fmtScheme>
@@ -5477,7 +5770,7 @@
   <a:extraClrSchemeLst/>
   <a:extLst>
     <a:ext uri="{05A4C25C-085E-4340-85A3-A5531E510DB2}">
-      <thm15:themeFamily xmlns:thm15="http://schemas.microsoft.com/office/thememl/2012/main" name="Office Theme" id="{62F939B6-93AF-4DB8-9C6B-D6C7DFDC589F}" vid="{4A3C46E8-61CC-4603-A589-7422A47A8E4A}"/>
+      <thm15:themeFamily xmlns:thm15="http://schemas.microsoft.com/office/thememl/2012/main" name="Parcel" id="{8BEC4385-4EB9-4D53-BFB5-0EA123736B6D}" vid="{4DB32801-28C0-48B0-8C1D-A9A58613615A}"/>
     </a:ext>
   </a:extLst>
 </a:theme>

</xml_diff>

<commit_message>
updated ppt to label all imgs
</commit_message>
<xml_diff>
--- a/group_proj/presentations/projPres1.pptx
+++ b/group_proj/presentations/projPres1.pptx
@@ -203,7 +203,7 @@
           <a:p>
             <a:fld id="{B4F796A9-8EC0-5141-B45F-E32396FCD01A}" type="datetimeFigureOut">
               <a:rPr lang="en-US" smtClean="0"/>
-              <a:t>10/10/23</a:t>
+              <a:t>10/11/23</a:t>
             </a:fld>
             <a:endParaRPr lang="en-US"/>
           </a:p>
@@ -743,7 +743,7 @@
           <a:p>
             <a:fld id="{90053C86-C48F-3743-8746-2CA0384683DA}" type="datetimeFigureOut">
               <a:rPr lang="en-US" smtClean="0"/>
-              <a:t>10/10/23</a:t>
+              <a:t>10/11/23</a:t>
             </a:fld>
             <a:endParaRPr lang="en-US"/>
           </a:p>
@@ -913,7 +913,7 @@
           <a:p>
             <a:fld id="{90053C86-C48F-3743-8746-2CA0384683DA}" type="datetimeFigureOut">
               <a:rPr lang="en-US" smtClean="0"/>
-              <a:t>10/10/23</a:t>
+              <a:t>10/11/23</a:t>
             </a:fld>
             <a:endParaRPr lang="en-US"/>
           </a:p>
@@ -1093,7 +1093,7 @@
           <a:p>
             <a:fld id="{90053C86-C48F-3743-8746-2CA0384683DA}" type="datetimeFigureOut">
               <a:rPr lang="en-US" smtClean="0"/>
-              <a:t>10/10/23</a:t>
+              <a:t>10/11/23</a:t>
             </a:fld>
             <a:endParaRPr lang="en-US"/>
           </a:p>
@@ -1263,7 +1263,7 @@
           <a:p>
             <a:fld id="{90053C86-C48F-3743-8746-2CA0384683DA}" type="datetimeFigureOut">
               <a:rPr lang="en-US" smtClean="0"/>
-              <a:t>10/10/23</a:t>
+              <a:t>10/11/23</a:t>
             </a:fld>
             <a:endParaRPr lang="en-US"/>
           </a:p>
@@ -1531,7 +1531,7 @@
           <a:p>
             <a:fld id="{90053C86-C48F-3743-8746-2CA0384683DA}" type="datetimeFigureOut">
               <a:rPr lang="en-US" smtClean="0"/>
-              <a:t>10/10/23</a:t>
+              <a:t>10/11/23</a:t>
             </a:fld>
             <a:endParaRPr lang="en-US"/>
           </a:p>
@@ -1763,7 +1763,7 @@
           <a:p>
             <a:fld id="{90053C86-C48F-3743-8746-2CA0384683DA}" type="datetimeFigureOut">
               <a:rPr lang="en-US" smtClean="0"/>
-              <a:t>10/10/23</a:t>
+              <a:t>10/11/23</a:t>
             </a:fld>
             <a:endParaRPr lang="en-US"/>
           </a:p>
@@ -2122,7 +2122,7 @@
           <a:p>
             <a:fld id="{90053C86-C48F-3743-8746-2CA0384683DA}" type="datetimeFigureOut">
               <a:rPr lang="en-US" smtClean="0"/>
-              <a:t>10/10/23</a:t>
+              <a:t>10/11/23</a:t>
             </a:fld>
             <a:endParaRPr lang="en-US"/>
           </a:p>
@@ -2263,7 +2263,7 @@
           <a:p>
             <a:fld id="{90053C86-C48F-3743-8746-2CA0384683DA}" type="datetimeFigureOut">
               <a:rPr lang="en-US" smtClean="0"/>
-              <a:t>10/10/23</a:t>
+              <a:t>10/11/23</a:t>
             </a:fld>
             <a:endParaRPr lang="en-US"/>
           </a:p>
@@ -2358,7 +2358,7 @@
           <a:p>
             <a:fld id="{90053C86-C48F-3743-8746-2CA0384683DA}" type="datetimeFigureOut">
               <a:rPr lang="en-US" smtClean="0"/>
-              <a:t>10/10/23</a:t>
+              <a:t>10/11/23</a:t>
             </a:fld>
             <a:endParaRPr lang="en-US"/>
           </a:p>
@@ -2715,7 +2715,7 @@
           <a:p>
             <a:fld id="{90053C86-C48F-3743-8746-2CA0384683DA}" type="datetimeFigureOut">
               <a:rPr lang="en-US" smtClean="0"/>
-              <a:t>10/10/23</a:t>
+              <a:t>10/11/23</a:t>
             </a:fld>
             <a:endParaRPr lang="en-US"/>
           </a:p>
@@ -3072,7 +3072,7 @@
           <a:p>
             <a:fld id="{90053C86-C48F-3743-8746-2CA0384683DA}" type="datetimeFigureOut">
               <a:rPr lang="en-US" smtClean="0"/>
-              <a:t>10/10/23</a:t>
+              <a:t>10/11/23</a:t>
             </a:fld>
             <a:endParaRPr lang="en-US"/>
           </a:p>
@@ -3314,7 +3314,7 @@
           <a:p>
             <a:fld id="{90053C86-C48F-3743-8746-2CA0384683DA}" type="datetimeFigureOut">
               <a:rPr lang="en-US" smtClean="0"/>
-              <a:t>10/10/23</a:t>
+              <a:t>10/11/23</a:t>
             </a:fld>
             <a:endParaRPr lang="en-US"/>
           </a:p>
@@ -4090,6 +4090,41 @@
           </a:prstGeom>
         </p:spPr>
       </p:pic>
+      <p:sp>
+        <p:nvSpPr>
+          <p:cNvPr id="4" name="TextBox 3">
+            <a:extLst>
+              <a:ext uri="{FF2B5EF4-FFF2-40B4-BE49-F238E27FC236}">
+                <a16:creationId xmlns:a16="http://schemas.microsoft.com/office/drawing/2014/main" id="{F48EDE0D-AF94-69D4-064D-7B77077D4002}"/>
+              </a:ext>
+            </a:extLst>
+          </p:cNvPr>
+          <p:cNvSpPr txBox="1"/>
+          <p:nvPr/>
+        </p:nvSpPr>
+        <p:spPr>
+          <a:xfrm>
+            <a:off x="7395934" y="5615521"/>
+            <a:ext cx="1731500" cy="369332"/>
+          </a:xfrm>
+          <a:prstGeom prst="rect">
+            <a:avLst/>
+          </a:prstGeom>
+          <a:noFill/>
+        </p:spPr>
+        <p:txBody>
+          <a:bodyPr wrap="none" rtlCol="0">
+            <a:spAutoFit/>
+          </a:bodyPr>
+          <a:lstStyle/>
+          <a:p>
+            <a:r>
+              <a:rPr lang="en-US" dirty="0"/>
+              <a:t>Folder Structure</a:t>
+            </a:r>
+          </a:p>
+        </p:txBody>
+      </p:sp>
     </p:spTree>
     <p:extLst>
       <p:ext uri="{BB962C8B-B14F-4D97-AF65-F5344CB8AC3E}">
@@ -5303,14 +5338,53 @@
         </p:blipFill>
         <p:spPr>
           <a:xfrm>
-            <a:off x="7223213" y="2406317"/>
-            <a:ext cx="3113334" cy="4190206"/>
+            <a:off x="7551862" y="2391441"/>
+            <a:ext cx="2784685" cy="3747881"/>
           </a:xfrm>
           <a:prstGeom prst="rect">
             <a:avLst/>
           </a:prstGeom>
         </p:spPr>
       </p:pic>
+      <p:sp>
+        <p:nvSpPr>
+          <p:cNvPr id="4" name="TextBox 3">
+            <a:extLst>
+              <a:ext uri="{FF2B5EF4-FFF2-40B4-BE49-F238E27FC236}">
+                <a16:creationId xmlns:a16="http://schemas.microsoft.com/office/drawing/2014/main" id="{23DE95DF-B036-9F27-75EC-702E09729555}"/>
+              </a:ext>
+            </a:extLst>
+          </p:cNvPr>
+          <p:cNvSpPr txBox="1"/>
+          <p:nvPr/>
+        </p:nvSpPr>
+        <p:spPr>
+          <a:xfrm>
+            <a:off x="8056685" y="6139322"/>
+            <a:ext cx="1775038" cy="369332"/>
+          </a:xfrm>
+          <a:prstGeom prst="rect">
+            <a:avLst/>
+          </a:prstGeom>
+          <a:noFill/>
+        </p:spPr>
+        <p:txBody>
+          <a:bodyPr wrap="none" rtlCol="0">
+            <a:spAutoFit/>
+          </a:bodyPr>
+          <a:lstStyle/>
+          <a:p>
+            <a:r>
+              <a:rPr lang="en-US" dirty="0" err="1"/>
+              <a:t>Github</a:t>
+            </a:r>
+            <a:r>
+              <a:rPr lang="en-US" dirty="0"/>
+              <a:t> Structure</a:t>
+            </a:r>
+          </a:p>
+        </p:txBody>
+      </p:sp>
     </p:spTree>
     <p:extLst>
       <p:ext uri="{BB962C8B-B14F-4D97-AF65-F5344CB8AC3E}">

</xml_diff>

<commit_message>
final fixes for ppt and jyptr nb.Suggestions added
</commit_message>
<xml_diff>
--- a/group_proj/presentations/projPres1.pptx
+++ b/group_proj/presentations/projPres1.pptx
@@ -4125,6 +4125,41 @@
           </a:p>
         </p:txBody>
       </p:sp>
+      <p:sp>
+        <p:nvSpPr>
+          <p:cNvPr id="6" name="TextBox 5">
+            <a:extLst>
+              <a:ext uri="{FF2B5EF4-FFF2-40B4-BE49-F238E27FC236}">
+                <a16:creationId xmlns:a16="http://schemas.microsoft.com/office/drawing/2014/main" id="{10AAB14A-17F3-F77D-748E-575A93FE1228}"/>
+              </a:ext>
+            </a:extLst>
+          </p:cNvPr>
+          <p:cNvSpPr txBox="1"/>
+          <p:nvPr/>
+        </p:nvSpPr>
+        <p:spPr>
+          <a:xfrm>
+            <a:off x="0" y="6488668"/>
+            <a:ext cx="300082" cy="369332"/>
+          </a:xfrm>
+          <a:prstGeom prst="rect">
+            <a:avLst/>
+          </a:prstGeom>
+          <a:noFill/>
+        </p:spPr>
+        <p:txBody>
+          <a:bodyPr wrap="none" rtlCol="0">
+            <a:spAutoFit/>
+          </a:bodyPr>
+          <a:lstStyle/>
+          <a:p>
+            <a:r>
+              <a:rPr lang="en-US" dirty="0"/>
+              <a:t>1</a:t>
+            </a:r>
+          </a:p>
+        </p:txBody>
+      </p:sp>
     </p:spTree>
     <p:extLst>
       <p:ext uri="{BB962C8B-B14F-4D97-AF65-F5344CB8AC3E}">
@@ -4497,6 +4532,41 @@
           </p:txBody>
         </p:sp>
       </p:grpSp>
+      <p:sp>
+        <p:nvSpPr>
+          <p:cNvPr id="12" name="TextBox 11">
+            <a:extLst>
+              <a:ext uri="{FF2B5EF4-FFF2-40B4-BE49-F238E27FC236}">
+                <a16:creationId xmlns:a16="http://schemas.microsoft.com/office/drawing/2014/main" id="{2B12AC69-2843-CD0F-D26C-C31AA687AC07}"/>
+              </a:ext>
+            </a:extLst>
+          </p:cNvPr>
+          <p:cNvSpPr txBox="1"/>
+          <p:nvPr/>
+        </p:nvSpPr>
+        <p:spPr>
+          <a:xfrm>
+            <a:off x="0" y="6488668"/>
+            <a:ext cx="300082" cy="369332"/>
+          </a:xfrm>
+          <a:prstGeom prst="rect">
+            <a:avLst/>
+          </a:prstGeom>
+          <a:noFill/>
+        </p:spPr>
+        <p:txBody>
+          <a:bodyPr wrap="none" rtlCol="0">
+            <a:spAutoFit/>
+          </a:bodyPr>
+          <a:lstStyle/>
+          <a:p>
+            <a:r>
+              <a:rPr lang="en-US" dirty="0"/>
+              <a:t>2</a:t>
+            </a:r>
+          </a:p>
+        </p:txBody>
+      </p:sp>
     </p:spTree>
     <p:extLst>
       <p:ext uri="{BB962C8B-B14F-4D97-AF65-F5344CB8AC3E}">
@@ -4812,6 +4882,41 @@
           </p:txBody>
         </p:sp>
       </p:grpSp>
+      <p:sp>
+        <p:nvSpPr>
+          <p:cNvPr id="4" name="TextBox 3">
+            <a:extLst>
+              <a:ext uri="{FF2B5EF4-FFF2-40B4-BE49-F238E27FC236}">
+                <a16:creationId xmlns:a16="http://schemas.microsoft.com/office/drawing/2014/main" id="{95CE7C39-410F-B8EB-0A23-2D138ACE93B2}"/>
+              </a:ext>
+            </a:extLst>
+          </p:cNvPr>
+          <p:cNvSpPr txBox="1"/>
+          <p:nvPr/>
+        </p:nvSpPr>
+        <p:spPr>
+          <a:xfrm>
+            <a:off x="0" y="6488668"/>
+            <a:ext cx="300082" cy="369332"/>
+          </a:xfrm>
+          <a:prstGeom prst="rect">
+            <a:avLst/>
+          </a:prstGeom>
+          <a:noFill/>
+        </p:spPr>
+        <p:txBody>
+          <a:bodyPr wrap="none" rtlCol="0">
+            <a:spAutoFit/>
+          </a:bodyPr>
+          <a:lstStyle/>
+          <a:p>
+            <a:r>
+              <a:rPr lang="en-US" dirty="0"/>
+              <a:t>3</a:t>
+            </a:r>
+          </a:p>
+        </p:txBody>
+      </p:sp>
     </p:spTree>
     <p:extLst>
       <p:ext uri="{BB962C8B-B14F-4D97-AF65-F5344CB8AC3E}">
@@ -5185,6 +5290,41 @@
           </p:txBody>
         </p:sp>
       </p:grpSp>
+      <p:sp>
+        <p:nvSpPr>
+          <p:cNvPr id="5" name="TextBox 4">
+            <a:extLst>
+              <a:ext uri="{FF2B5EF4-FFF2-40B4-BE49-F238E27FC236}">
+                <a16:creationId xmlns:a16="http://schemas.microsoft.com/office/drawing/2014/main" id="{BACA73EA-2B3E-CFD9-E7A9-686B93E028BD}"/>
+              </a:ext>
+            </a:extLst>
+          </p:cNvPr>
+          <p:cNvSpPr txBox="1"/>
+          <p:nvPr/>
+        </p:nvSpPr>
+        <p:spPr>
+          <a:xfrm>
+            <a:off x="0" y="6488668"/>
+            <a:ext cx="300082" cy="369332"/>
+          </a:xfrm>
+          <a:prstGeom prst="rect">
+            <a:avLst/>
+          </a:prstGeom>
+          <a:noFill/>
+        </p:spPr>
+        <p:txBody>
+          <a:bodyPr wrap="none" rtlCol="0">
+            <a:spAutoFit/>
+          </a:bodyPr>
+          <a:lstStyle/>
+          <a:p>
+            <a:r>
+              <a:rPr lang="en-US" dirty="0"/>
+              <a:t>4</a:t>
+            </a:r>
+          </a:p>
+        </p:txBody>
+      </p:sp>
     </p:spTree>
     <p:extLst>
       <p:ext uri="{BB962C8B-B14F-4D97-AF65-F5344CB8AC3E}">
@@ -5381,6 +5521,41 @@
             <a:r>
               <a:rPr lang="en-US" dirty="0"/>
               <a:t> Structure</a:t>
+            </a:r>
+          </a:p>
+        </p:txBody>
+      </p:sp>
+      <p:sp>
+        <p:nvSpPr>
+          <p:cNvPr id="5" name="TextBox 4">
+            <a:extLst>
+              <a:ext uri="{FF2B5EF4-FFF2-40B4-BE49-F238E27FC236}">
+                <a16:creationId xmlns:a16="http://schemas.microsoft.com/office/drawing/2014/main" id="{D536B9CB-66A9-0541-4A81-DEE150199927}"/>
+              </a:ext>
+            </a:extLst>
+          </p:cNvPr>
+          <p:cNvSpPr txBox="1"/>
+          <p:nvPr/>
+        </p:nvSpPr>
+        <p:spPr>
+          <a:xfrm>
+            <a:off x="0" y="6488668"/>
+            <a:ext cx="300082" cy="369332"/>
+          </a:xfrm>
+          <a:prstGeom prst="rect">
+            <a:avLst/>
+          </a:prstGeom>
+          <a:noFill/>
+        </p:spPr>
+        <p:txBody>
+          <a:bodyPr wrap="none" rtlCol="0">
+            <a:spAutoFit/>
+          </a:bodyPr>
+          <a:lstStyle/>
+          <a:p>
+            <a:r>
+              <a:rPr lang="en-US" dirty="0"/>
+              <a:t>5</a:t>
             </a:r>
           </a:p>
         </p:txBody>

</xml_diff>